<commit_message>
Error reading byte, invalid list position
</commit_message>
<xml_diff>
--- a/eclipse workspace/java_library/sumo_implementation recording.pptx
+++ b/eclipse workspace/java_library/sumo_implementation recording.pptx
@@ -260,7 +260,7 @@
           <a:p>
             <a:fld id="{0D31214C-D292-456A-85AA-94C340B15432}" type="datetimeFigureOut">
               <a:rPr lang="zh-TW" altLang="en-US" smtClean="0"/>
-              <a:t>2019/4/23</a:t>
+              <a:t>2019/4/24</a:t>
             </a:fld>
             <a:endParaRPr lang="zh-TW" altLang="en-US"/>
           </a:p>
@@ -430,7 +430,7 @@
           <a:p>
             <a:fld id="{0D31214C-D292-456A-85AA-94C340B15432}" type="datetimeFigureOut">
               <a:rPr lang="zh-TW" altLang="en-US" smtClean="0"/>
-              <a:t>2019/4/23</a:t>
+              <a:t>2019/4/24</a:t>
             </a:fld>
             <a:endParaRPr lang="zh-TW" altLang="en-US"/>
           </a:p>
@@ -610,7 +610,7 @@
           <a:p>
             <a:fld id="{0D31214C-D292-456A-85AA-94C340B15432}" type="datetimeFigureOut">
               <a:rPr lang="zh-TW" altLang="en-US" smtClean="0"/>
-              <a:t>2019/4/23</a:t>
+              <a:t>2019/4/24</a:t>
             </a:fld>
             <a:endParaRPr lang="zh-TW" altLang="en-US"/>
           </a:p>
@@ -780,7 +780,7 @@
           <a:p>
             <a:fld id="{0D31214C-D292-456A-85AA-94C340B15432}" type="datetimeFigureOut">
               <a:rPr lang="zh-TW" altLang="en-US" smtClean="0"/>
-              <a:t>2019/4/23</a:t>
+              <a:t>2019/4/24</a:t>
             </a:fld>
             <a:endParaRPr lang="zh-TW" altLang="en-US"/>
           </a:p>
@@ -1026,7 +1026,7 @@
           <a:p>
             <a:fld id="{0D31214C-D292-456A-85AA-94C340B15432}" type="datetimeFigureOut">
               <a:rPr lang="zh-TW" altLang="en-US" smtClean="0"/>
-              <a:t>2019/4/23</a:t>
+              <a:t>2019/4/24</a:t>
             </a:fld>
             <a:endParaRPr lang="zh-TW" altLang="en-US"/>
           </a:p>
@@ -1258,7 +1258,7 @@
           <a:p>
             <a:fld id="{0D31214C-D292-456A-85AA-94C340B15432}" type="datetimeFigureOut">
               <a:rPr lang="zh-TW" altLang="en-US" smtClean="0"/>
-              <a:t>2019/4/23</a:t>
+              <a:t>2019/4/24</a:t>
             </a:fld>
             <a:endParaRPr lang="zh-TW" altLang="en-US"/>
           </a:p>
@@ -1625,7 +1625,7 @@
           <a:p>
             <a:fld id="{0D31214C-D292-456A-85AA-94C340B15432}" type="datetimeFigureOut">
               <a:rPr lang="zh-TW" altLang="en-US" smtClean="0"/>
-              <a:t>2019/4/23</a:t>
+              <a:t>2019/4/24</a:t>
             </a:fld>
             <a:endParaRPr lang="zh-TW" altLang="en-US"/>
           </a:p>
@@ -1743,7 +1743,7 @@
           <a:p>
             <a:fld id="{0D31214C-D292-456A-85AA-94C340B15432}" type="datetimeFigureOut">
               <a:rPr lang="zh-TW" altLang="en-US" smtClean="0"/>
-              <a:t>2019/4/23</a:t>
+              <a:t>2019/4/24</a:t>
             </a:fld>
             <a:endParaRPr lang="zh-TW" altLang="en-US"/>
           </a:p>
@@ -1838,7 +1838,7 @@
           <a:p>
             <a:fld id="{0D31214C-D292-456A-85AA-94C340B15432}" type="datetimeFigureOut">
               <a:rPr lang="zh-TW" altLang="en-US" smtClean="0"/>
-              <a:t>2019/4/23</a:t>
+              <a:t>2019/4/24</a:t>
             </a:fld>
             <a:endParaRPr lang="zh-TW" altLang="en-US"/>
           </a:p>
@@ -2115,7 +2115,7 @@
           <a:p>
             <a:fld id="{0D31214C-D292-456A-85AA-94C340B15432}" type="datetimeFigureOut">
               <a:rPr lang="zh-TW" altLang="en-US" smtClean="0"/>
-              <a:t>2019/4/23</a:t>
+              <a:t>2019/4/24</a:t>
             </a:fld>
             <a:endParaRPr lang="zh-TW" altLang="en-US"/>
           </a:p>
@@ -2368,7 +2368,7 @@
           <a:p>
             <a:fld id="{0D31214C-D292-456A-85AA-94C340B15432}" type="datetimeFigureOut">
               <a:rPr lang="zh-TW" altLang="en-US" smtClean="0"/>
-              <a:t>2019/4/23</a:t>
+              <a:t>2019/4/24</a:t>
             </a:fld>
             <a:endParaRPr lang="zh-TW" altLang="en-US"/>
           </a:p>
@@ -2581,7 +2581,7 @@
           <a:p>
             <a:fld id="{0D31214C-D292-456A-85AA-94C340B15432}" type="datetimeFigureOut">
               <a:rPr lang="zh-TW" altLang="en-US" smtClean="0"/>
-              <a:t>2019/4/23</a:t>
+              <a:t>2019/4/24</a:t>
             </a:fld>
             <a:endParaRPr lang="zh-TW" altLang="en-US"/>
           </a:p>
@@ -5979,18 +5979,41 @@
           <a:bodyPr/>
           <a:lstStyle/>
           <a:p>
+            <a:r>
+              <a:rPr lang="en-US" altLang="zh-TW" dirty="0" smtClean="0"/>
+              <a:t>2019-04-24</a:t>
+            </a:r>
+            <a:endParaRPr lang="zh-TW" altLang="en-US" dirty="0"/>
+          </a:p>
+        </p:txBody>
+      </p:sp>
+      <p:sp>
+        <p:nvSpPr>
+          <p:cNvPr id="3" name="文字版面配置區 2"/>
+          <p:cNvSpPr>
+            <a:spLocks noGrp="1"/>
+          </p:cNvSpPr>
+          <p:nvPr>
+            <p:ph type="body" idx="1"/>
+          </p:nvPr>
+        </p:nvSpPr>
+        <p:spPr/>
+        <p:txBody>
+          <a:bodyPr/>
+          <a:lstStyle/>
+          <a:p>
             <a:endParaRPr lang="zh-TW" altLang="en-US"/>
           </a:p>
         </p:txBody>
       </p:sp>
       <p:sp>
         <p:nvSpPr>
-          <p:cNvPr id="3" name="文字版面配置區 2"/>
-          <p:cNvSpPr>
-            <a:spLocks noGrp="1"/>
-          </p:cNvSpPr>
-          <p:nvPr>
-            <p:ph type="body" idx="1"/>
+          <p:cNvPr id="4" name="內容版面配置區 3"/>
+          <p:cNvSpPr>
+            <a:spLocks noGrp="1"/>
+          </p:cNvSpPr>
+          <p:nvPr>
+            <p:ph sz="half" idx="2"/>
           </p:nvPr>
         </p:nvSpPr>
         <p:spPr/>
@@ -5998,18 +6021,61 @@
           <a:bodyPr/>
           <a:lstStyle/>
           <a:p>
+            <a:r>
+              <a:rPr lang="en-US" altLang="zh-TW" dirty="0"/>
+              <a:t>Error: Answered with error to command 0xab: </a:t>
+            </a:r>
+          </a:p>
+          <a:p>
+            <a:r>
+              <a:rPr lang="en-US" altLang="zh-TW" dirty="0"/>
+              <a:t>Wrong position in </a:t>
+            </a:r>
+            <a:r>
+              <a:rPr lang="en-US" altLang="zh-TW" dirty="0" err="1"/>
+              <a:t>requestMessage</a:t>
+            </a:r>
+            <a:r>
+              <a:rPr lang="en-US" altLang="zh-TW" dirty="0"/>
+              <a:t> after dispatching command. </a:t>
+            </a:r>
+          </a:p>
+          <a:p>
+            <a:r>
+              <a:rPr lang="en-US" altLang="zh-TW" dirty="0"/>
+              <a:t>Expected command length was 152 but 82 Bytes were read.</a:t>
+            </a:r>
+            <a:endParaRPr lang="zh-TW" altLang="en-US" dirty="0"/>
+          </a:p>
+        </p:txBody>
+      </p:sp>
+      <p:sp>
+        <p:nvSpPr>
+          <p:cNvPr id="5" name="文字版面配置區 4"/>
+          <p:cNvSpPr>
+            <a:spLocks noGrp="1"/>
+          </p:cNvSpPr>
+          <p:nvPr>
+            <p:ph type="body" sz="quarter" idx="3"/>
+          </p:nvPr>
+        </p:nvSpPr>
+        <p:spPr/>
+        <p:txBody>
+          <a:bodyPr/>
+          <a:lstStyle/>
+          <a:p>
             <a:endParaRPr lang="zh-TW" altLang="en-US"/>
           </a:p>
         </p:txBody>
       </p:sp>
       <p:sp>
         <p:nvSpPr>
-          <p:cNvPr id="4" name="內容版面配置區 3"/>
-          <p:cNvSpPr>
-            <a:spLocks noGrp="1"/>
-          </p:cNvSpPr>
-          <p:nvPr>
-            <p:ph sz="half" idx="2"/>
+          <p:cNvPr id="6" name="內容版面配置區 5"/>
+          <p:cNvSpPr>
+            <a:spLocks noGrp="1"/>
+          </p:cNvSpPr>
+          <p:nvPr>
+            <p:ph sz="quarter" idx="4"/>
           </p:nvPr>
         </p:nvSpPr>
         <p:spPr/>
@@ -6017,45 +6083,42 @@
           <a:bodyPr/>
           <a:lstStyle/>
           <a:p>
-            <a:endParaRPr lang="zh-TW" altLang="en-US"/>
-          </a:p>
-        </p:txBody>
-      </p:sp>
-      <p:sp>
-        <p:nvSpPr>
-          <p:cNvPr id="5" name="文字版面配置區 4"/>
-          <p:cNvSpPr>
-            <a:spLocks noGrp="1"/>
-          </p:cNvSpPr>
-          <p:nvPr>
-            <p:ph type="body" sz="quarter" idx="3"/>
-          </p:nvPr>
-        </p:nvSpPr>
-        <p:spPr/>
-        <p:txBody>
-          <a:bodyPr/>
-          <a:lstStyle/>
-          <a:p>
-            <a:endParaRPr lang="zh-TW" altLang="en-US"/>
-          </a:p>
-        </p:txBody>
-      </p:sp>
-      <p:sp>
-        <p:nvSpPr>
-          <p:cNvPr id="6" name="內容版面配置區 5"/>
-          <p:cNvSpPr>
-            <a:spLocks noGrp="1"/>
-          </p:cNvSpPr>
-          <p:nvPr>
-            <p:ph sz="quarter" idx="4"/>
-          </p:nvPr>
-        </p:nvSpPr>
-        <p:spPr/>
-        <p:txBody>
-          <a:bodyPr/>
-          <a:lstStyle/>
-          <a:p>
-            <a:endParaRPr lang="zh-TW" altLang="en-US"/>
+            <a:endParaRPr lang="en-US" altLang="zh-TW" dirty="0"/>
+          </a:p>
+          <a:p>
+            <a:r>
+              <a:rPr lang="en-US" altLang="zh-TW" dirty="0" err="1"/>
+              <a:t>ResponseMessage</a:t>
+            </a:r>
+            <a:r>
+              <a:rPr lang="en-US" altLang="zh-TW" dirty="0"/>
+              <a:t> </a:t>
+            </a:r>
+            <a:r>
+              <a:rPr lang="en-US" altLang="zh-TW" dirty="0" err="1"/>
+              <a:t>resp</a:t>
+            </a:r>
+            <a:r>
+              <a:rPr lang="en-US" altLang="zh-TW" dirty="0"/>
+              <a:t> = </a:t>
+            </a:r>
+            <a:r>
+              <a:rPr lang="en-US" altLang="zh-TW" dirty="0" err="1"/>
+              <a:t>queryAndVerify</a:t>
+            </a:r>
+            <a:r>
+              <a:rPr lang="en-US" altLang="zh-TW" dirty="0"/>
+              <a:t>(</a:t>
+            </a:r>
+            <a:r>
+              <a:rPr lang="en-US" altLang="zh-TW" dirty="0" err="1"/>
+              <a:t>msg</a:t>
+            </a:r>
+            <a:r>
+              <a:rPr lang="en-US" altLang="zh-TW" dirty="0"/>
+              <a:t>);</a:t>
+            </a:r>
+            <a:endParaRPr lang="zh-TW" altLang="en-US" dirty="0"/>
           </a:p>
         </p:txBody>
       </p:sp>
@@ -6129,12 +6192,12 @@
       </p:sp>
       <p:sp>
         <p:nvSpPr>
-          <p:cNvPr id="4" name="內容版面配置區 3"/>
-          <p:cNvSpPr>
-            <a:spLocks noGrp="1"/>
-          </p:cNvSpPr>
-          <p:nvPr>
-            <p:ph sz="half" idx="2"/>
+          <p:cNvPr id="5" name="文字版面配置區 4"/>
+          <p:cNvSpPr>
+            <a:spLocks noGrp="1"/>
+          </p:cNvSpPr>
+          <p:nvPr>
+            <p:ph type="body" sz="quarter" idx="3"/>
           </p:nvPr>
         </p:nvSpPr>
         <p:spPr/>
@@ -6148,25 +6211,6 @@
       </p:sp>
       <p:sp>
         <p:nvSpPr>
-          <p:cNvPr id="5" name="文字版面配置區 4"/>
-          <p:cNvSpPr>
-            <a:spLocks noGrp="1"/>
-          </p:cNvSpPr>
-          <p:nvPr>
-            <p:ph type="body" sz="quarter" idx="3"/>
-          </p:nvPr>
-        </p:nvSpPr>
-        <p:spPr/>
-        <p:txBody>
-          <a:bodyPr/>
-          <a:lstStyle/>
-          <a:p>
-            <a:endParaRPr lang="zh-TW" altLang="en-US"/>
-          </a:p>
-        </p:txBody>
-      </p:sp>
-      <p:sp>
-        <p:nvSpPr>
           <p:cNvPr id="6" name="內容版面配置區 5"/>
           <p:cNvSpPr>
             <a:spLocks noGrp="1"/>
@@ -6175,12 +6219,125 @@
             <p:ph sz="quarter" idx="4"/>
           </p:nvPr>
         </p:nvSpPr>
-        <p:spPr/>
-        <p:txBody>
-          <a:bodyPr/>
-          <a:lstStyle/>
-          <a:p>
-            <a:endParaRPr lang="zh-TW" altLang="en-US"/>
+        <p:spPr>
+          <a:xfrm>
+            <a:off x="839788" y="2505075"/>
+            <a:ext cx="10515600" cy="3684588"/>
+          </a:xfrm>
+        </p:spPr>
+        <p:txBody>
+          <a:bodyPr>
+            <a:noAutofit/>
+          </a:bodyPr>
+          <a:lstStyle/>
+          <a:p>
+            <a:r>
+              <a:rPr lang="en-US" altLang="zh-TW" sz="2000" dirty="0" err="1"/>
+              <a:t>java.lang.IllegalStateException</a:t>
+            </a:r>
+            <a:r>
+              <a:rPr lang="en-US" altLang="zh-TW" sz="2000" dirty="0"/>
+              <a:t>: Error reading byte, invalid list position specified for reading: 706</a:t>
+            </a:r>
+          </a:p>
+          <a:p>
+            <a:r>
+              <a:rPr lang="en-US" altLang="zh-TW" sz="2000" dirty="0"/>
+              <a:t>	at </a:t>
+            </a:r>
+            <a:r>
+              <a:rPr lang="en-US" altLang="zh-TW" sz="2000" dirty="0" err="1"/>
+              <a:t>de.uniluebeck.itm.tcpip.Storage.readByte</a:t>
+            </a:r>
+            <a:r>
+              <a:rPr lang="en-US" altLang="zh-TW" sz="2000" dirty="0"/>
+              <a:t>(Storage.java:141)</a:t>
+            </a:r>
+          </a:p>
+          <a:p>
+            <a:r>
+              <a:rPr lang="en-US" altLang="zh-TW" sz="2000" dirty="0"/>
+              <a:t>	at </a:t>
+            </a:r>
+            <a:r>
+              <a:rPr lang="en-US" altLang="zh-TW" sz="2000" dirty="0" err="1"/>
+              <a:t>de.uniluebeck.itm.tcpip.Storage.readString</a:t>
+            </a:r>
+            <a:r>
+              <a:rPr lang="en-US" altLang="zh-TW" sz="2000" dirty="0"/>
+              <a:t>(Storage.java:502)</a:t>
+            </a:r>
+          </a:p>
+          <a:p>
+            <a:r>
+              <a:rPr lang="en-US" altLang="zh-TW" sz="2000" dirty="0"/>
+              <a:t>	at </a:t>
+            </a:r>
+            <a:r>
+              <a:rPr lang="en-US" altLang="zh-TW" sz="2000" dirty="0" err="1"/>
+              <a:t>de.uniluebeck.itm.tcpip.Storage.readStringASCII</a:t>
+            </a:r>
+            <a:r>
+              <a:rPr lang="en-US" altLang="zh-TW" sz="2000" dirty="0"/>
+              <a:t>(Storage.java:462)</a:t>
+            </a:r>
+          </a:p>
+          <a:p>
+            <a:r>
+              <a:rPr lang="en-US" altLang="zh-TW" sz="2000" dirty="0"/>
+              <a:t>	at </a:t>
+            </a:r>
+            <a:r>
+              <a:rPr lang="en-US" altLang="zh-TW" sz="2000" dirty="0" err="1"/>
+              <a:t>de.tudresden.sumo.util.CommandProcessor.readStage</a:t>
+            </a:r>
+            <a:r>
+              <a:rPr lang="en-US" altLang="zh-TW" sz="2000" dirty="0"/>
+              <a:t>(CommandProcessor.java:876)</a:t>
+            </a:r>
+          </a:p>
+          <a:p>
+            <a:r>
+              <a:rPr lang="en-US" altLang="zh-TW" sz="2000" dirty="0"/>
+              <a:t>	at </a:t>
+            </a:r>
+            <a:r>
+              <a:rPr lang="en-US" altLang="zh-TW" sz="2000" dirty="0" err="1"/>
+              <a:t>de.tudresden.sumo.util.CommandProcessor.do_job_get</a:t>
+            </a:r>
+            <a:r>
+              <a:rPr lang="en-US" altLang="zh-TW" sz="2000" dirty="0"/>
+              <a:t>(CommandProcessor.java:778)</a:t>
+            </a:r>
+          </a:p>
+          <a:p>
+            <a:r>
+              <a:rPr lang="en-US" altLang="zh-TW" sz="2000" dirty="0"/>
+              <a:t>	at </a:t>
+            </a:r>
+            <a:r>
+              <a:rPr lang="en-US" altLang="zh-TW" sz="2000" dirty="0" err="1"/>
+              <a:t>it.polito.appeal.traci.SumoTraciConnection.do_job_get</a:t>
+            </a:r>
+            <a:r>
+              <a:rPr lang="en-US" altLang="zh-TW" sz="2000" dirty="0"/>
+              <a:t>(SumoTraciConnection.java:366)</a:t>
+            </a:r>
+          </a:p>
+          <a:p>
+            <a:r>
+              <a:rPr lang="en-US" altLang="zh-TW" sz="2000" dirty="0"/>
+              <a:t>	at </a:t>
+            </a:r>
+            <a:r>
+              <a:rPr lang="en-US" altLang="zh-TW" sz="2000" dirty="0" err="1"/>
+              <a:t>Main.main</a:t>
+            </a:r>
+            <a:r>
+              <a:rPr lang="en-US" altLang="zh-TW" sz="2000" dirty="0"/>
+              <a:t>(Main.java:81)</a:t>
+            </a:r>
+            <a:endParaRPr lang="zh-TW" altLang="en-US" sz="2000" dirty="0"/>
           </a:p>
         </p:txBody>
       </p:sp>

</xml_diff>

<commit_message>
fixing the bug of findRoute
</commit_message>
<xml_diff>
--- a/eclipse workspace/java_library/sumo_implementation recording.pptx
+++ b/eclipse workspace/java_library/sumo_implementation recording.pptx
@@ -23,6 +23,8 @@
     <p:sldId id="275" r:id="rId17"/>
     <p:sldId id="276" r:id="rId18"/>
     <p:sldId id="277" r:id="rId19"/>
+    <p:sldId id="278" r:id="rId20"/>
+    <p:sldId id="279" r:id="rId21"/>
   </p:sldIdLst>
   <p:sldSz cx="12192000" cy="6858000"/>
   <p:notesSz cx="6858000" cy="9144000"/>
@@ -6354,6 +6356,219 @@
 </p:sld>
 </file>
 
+<file path=ppt/slides/slide19.xml><?xml version="1.0" encoding="utf-8"?>
+<p:sld xmlns:a="http://schemas.openxmlformats.org/drawingml/2006/main" xmlns:r="http://schemas.openxmlformats.org/officeDocument/2006/relationships" xmlns:p="http://schemas.openxmlformats.org/presentationml/2006/main">
+  <p:cSld>
+    <p:spTree>
+      <p:nvGrpSpPr>
+        <p:cNvPr id="1" name=""/>
+        <p:cNvGrpSpPr/>
+        <p:nvPr/>
+      </p:nvGrpSpPr>
+      <p:grpSpPr>
+        <a:xfrm>
+          <a:off x="0" y="0"/>
+          <a:ext cx="0" cy="0"/>
+          <a:chOff x="0" y="0"/>
+          <a:chExt cx="0" cy="0"/>
+        </a:xfrm>
+      </p:grpSpPr>
+      <p:sp>
+        <p:nvSpPr>
+          <p:cNvPr id="11" name="標題 10"/>
+          <p:cNvSpPr>
+            <a:spLocks noGrp="1"/>
+          </p:cNvSpPr>
+          <p:nvPr>
+            <p:ph type="title"/>
+          </p:nvPr>
+        </p:nvSpPr>
+        <p:spPr/>
+        <p:txBody>
+          <a:bodyPr/>
+          <a:lstStyle/>
+          <a:p>
+            <a:endParaRPr lang="zh-TW" altLang="en-US"/>
+          </a:p>
+        </p:txBody>
+      </p:sp>
+      <p:sp>
+        <p:nvSpPr>
+          <p:cNvPr id="12" name="內容版面配置區 11"/>
+          <p:cNvSpPr>
+            <a:spLocks noGrp="1"/>
+          </p:cNvSpPr>
+          <p:nvPr>
+            <p:ph idx="1"/>
+          </p:nvPr>
+        </p:nvSpPr>
+        <p:spPr>
+          <a:xfrm>
+            <a:off x="838199" y="1825625"/>
+            <a:ext cx="10920413" cy="4351338"/>
+          </a:xfrm>
+        </p:spPr>
+        <p:txBody>
+          <a:bodyPr>
+            <a:normAutofit fontScale="92500" lnSpcReduction="20000"/>
+          </a:bodyPr>
+          <a:lstStyle/>
+          <a:p>
+            <a:r>
+              <a:rPr lang="en-US" altLang="zh-TW" dirty="0" err="1" smtClean="0"/>
+              <a:t>findRoute</a:t>
+            </a:r>
+            <a:r>
+              <a:rPr lang="en-US" altLang="zh-TW" dirty="0" smtClean="0"/>
+              <a:t> </a:t>
+            </a:r>
+            <a:r>
+              <a:rPr lang="en-US" altLang="zh-TW" dirty="0"/>
+              <a:t>Stage</a:t>
+            </a:r>
+            <a:r>
+              <a:rPr lang="en-US" altLang="zh-TW" dirty="0" smtClean="0"/>
+              <a:t>(</a:t>
+            </a:r>
+          </a:p>
+          <a:p>
+            <a:r>
+              <a:rPr lang="en-US" altLang="zh-TW" dirty="0" err="1" smtClean="0"/>
+              <a:t>stageType</a:t>
+            </a:r>
+            <a:r>
+              <a:rPr lang="en-US" altLang="zh-TW" dirty="0" smtClean="0"/>
+              <a:t>=3</a:t>
+            </a:r>
+            <a:r>
+              <a:rPr lang="en-US" altLang="zh-TW" dirty="0"/>
+              <a:t>, </a:t>
+            </a:r>
+            <a:endParaRPr lang="en-US" altLang="zh-TW" dirty="0" smtClean="0"/>
+          </a:p>
+          <a:p>
+            <a:r>
+              <a:rPr lang="en-US" altLang="zh-TW" dirty="0" err="1" smtClean="0"/>
+              <a:t>vType</a:t>
+            </a:r>
+            <a:r>
+              <a:rPr lang="en-US" altLang="zh-TW" dirty="0"/>
+              <a:t>='', </a:t>
+            </a:r>
+            <a:endParaRPr lang="en-US" altLang="zh-TW" dirty="0" smtClean="0"/>
+          </a:p>
+          <a:p>
+            <a:r>
+              <a:rPr lang="en-US" altLang="zh-TW" dirty="0" smtClean="0"/>
+              <a:t>line</a:t>
+            </a:r>
+            <a:r>
+              <a:rPr lang="en-US" altLang="zh-TW" dirty="0"/>
+              <a:t>='', </a:t>
+            </a:r>
+            <a:endParaRPr lang="en-US" altLang="zh-TW" dirty="0" smtClean="0"/>
+          </a:p>
+          <a:p>
+            <a:r>
+              <a:rPr lang="en-US" altLang="zh-TW" dirty="0" err="1" smtClean="0"/>
+              <a:t>destStop</a:t>
+            </a:r>
+            <a:r>
+              <a:rPr lang="en-US" altLang="zh-TW" dirty="0"/>
+              <a:t>='', </a:t>
+            </a:r>
+            <a:endParaRPr lang="en-US" altLang="zh-TW" dirty="0" smtClean="0"/>
+          </a:p>
+          <a:p>
+            <a:r>
+              <a:rPr lang="en-US" altLang="zh-TW" dirty="0" smtClean="0"/>
+              <a:t>edges</a:t>
+            </a:r>
+            <a:r>
+              <a:rPr lang="en-US" altLang="zh-TW" dirty="0"/>
+              <a:t>=('o', '2o'), </a:t>
+            </a:r>
+            <a:endParaRPr lang="en-US" altLang="zh-TW" dirty="0" smtClean="0"/>
+          </a:p>
+          <a:p>
+            <a:r>
+              <a:rPr lang="en-US" altLang="zh-TW" dirty="0" err="1" smtClean="0"/>
+              <a:t>travelTime</a:t>
+            </a:r>
+            <a:r>
+              <a:rPr lang="en-US" altLang="zh-TW" dirty="0" smtClean="0"/>
+              <a:t>=738.7359712230216</a:t>
+            </a:r>
+            <a:r>
+              <a:rPr lang="en-US" altLang="zh-TW" dirty="0"/>
+              <a:t>, </a:t>
+            </a:r>
+            <a:endParaRPr lang="en-US" altLang="zh-TW" dirty="0" smtClean="0"/>
+          </a:p>
+          <a:p>
+            <a:r>
+              <a:rPr lang="en-US" altLang="zh-TW" dirty="0" smtClean="0"/>
+              <a:t>cost=738.7359712230216</a:t>
+            </a:r>
+            <a:r>
+              <a:rPr lang="en-US" altLang="zh-TW" dirty="0"/>
+              <a:t>, length=10268.43, </a:t>
+            </a:r>
+            <a:endParaRPr lang="en-US" altLang="zh-TW" dirty="0" smtClean="0"/>
+          </a:p>
+          <a:p>
+            <a:r>
+              <a:rPr lang="en-US" altLang="zh-TW" dirty="0" smtClean="0"/>
+              <a:t>intended</a:t>
+            </a:r>
+            <a:r>
+              <a:rPr lang="en-US" altLang="zh-TW" dirty="0"/>
+              <a:t>='', </a:t>
+            </a:r>
+            <a:endParaRPr lang="en-US" altLang="zh-TW" dirty="0" smtClean="0"/>
+          </a:p>
+          <a:p>
+            <a:r>
+              <a:rPr lang="en-US" altLang="zh-TW" dirty="0" smtClean="0"/>
+              <a:t>depart</a:t>
+            </a:r>
+            <a:r>
+              <a:rPr lang="en-US" altLang="zh-TW" dirty="0"/>
+              <a:t>=-1073741824.0, </a:t>
+            </a:r>
+            <a:r>
+              <a:rPr lang="en-US" altLang="zh-TW" dirty="0" err="1"/>
+              <a:t>departPos</a:t>
+            </a:r>
+            <a:r>
+              <a:rPr lang="en-US" altLang="zh-TW" dirty="0"/>
+              <a:t>=-1073741824.0, </a:t>
+            </a:r>
+            <a:r>
+              <a:rPr lang="en-US" altLang="zh-TW" dirty="0" err="1"/>
+              <a:t>arrivalPos</a:t>
+            </a:r>
+            <a:r>
+              <a:rPr lang="en-US" altLang="zh-TW" dirty="0"/>
+              <a:t>=-1073741824.0, description='')</a:t>
+            </a:r>
+            <a:endParaRPr lang="zh-TW" altLang="en-US" dirty="0"/>
+          </a:p>
+        </p:txBody>
+      </p:sp>
+    </p:spTree>
+    <p:extLst>
+      <p:ext uri="{BB962C8B-B14F-4D97-AF65-F5344CB8AC3E}">
+        <p14:creationId xmlns:p14="http://schemas.microsoft.com/office/powerpoint/2010/main" val="2530624384"/>
+      </p:ext>
+    </p:extLst>
+  </p:cSld>
+  <p:clrMapOvr>
+    <a:masterClrMapping/>
+  </p:clrMapOvr>
+</p:sld>
+</file>
+
 <file path=ppt/slides/slide2.xml><?xml version="1.0" encoding="utf-8"?>
 <p:sld xmlns:a="http://schemas.openxmlformats.org/drawingml/2006/main" xmlns:r="http://schemas.openxmlformats.org/officeDocument/2006/relationships" xmlns:p="http://schemas.openxmlformats.org/presentationml/2006/main">
   <p:cSld>
@@ -6669,6 +6884,178 @@
       </p:par>
     </p:tnLst>
   </p:timing>
+</p:sld>
+</file>
+
+<file path=ppt/slides/slide20.xml><?xml version="1.0" encoding="utf-8"?>
+<p:sld xmlns:a="http://schemas.openxmlformats.org/drawingml/2006/main" xmlns:r="http://schemas.openxmlformats.org/officeDocument/2006/relationships" xmlns:p="http://schemas.openxmlformats.org/presentationml/2006/main">
+  <p:cSld>
+    <p:spTree>
+      <p:nvGrpSpPr>
+        <p:cNvPr id="1" name=""/>
+        <p:cNvGrpSpPr/>
+        <p:nvPr/>
+      </p:nvGrpSpPr>
+      <p:grpSpPr>
+        <a:xfrm>
+          <a:off x="0" y="0"/>
+          <a:ext cx="0" cy="0"/>
+          <a:chOff x="0" y="0"/>
+          <a:chExt cx="0" cy="0"/>
+        </a:xfrm>
+      </p:grpSpPr>
+      <p:sp>
+        <p:nvSpPr>
+          <p:cNvPr id="2" name="標題 1"/>
+          <p:cNvSpPr>
+            <a:spLocks noGrp="1"/>
+          </p:cNvSpPr>
+          <p:nvPr>
+            <p:ph type="title"/>
+          </p:nvPr>
+        </p:nvSpPr>
+        <p:spPr/>
+        <p:txBody>
+          <a:bodyPr/>
+          <a:lstStyle/>
+          <a:p>
+            <a:endParaRPr lang="zh-TW" altLang="en-US"/>
+          </a:p>
+        </p:txBody>
+      </p:sp>
+      <p:sp>
+        <p:nvSpPr>
+          <p:cNvPr id="3" name="內容版面配置區 2"/>
+          <p:cNvSpPr>
+            <a:spLocks noGrp="1"/>
+          </p:cNvSpPr>
+          <p:nvPr>
+            <p:ph idx="1"/>
+          </p:nvPr>
+        </p:nvSpPr>
+        <p:spPr/>
+        <p:txBody>
+          <a:bodyPr>
+            <a:normAutofit lnSpcReduction="10000"/>
+          </a:bodyPr>
+          <a:lstStyle/>
+          <a:p>
+            <a:r>
+              <a:rPr lang="en-US" altLang="zh-TW" dirty="0"/>
+              <a:t>Object[] array = new Object[]{</a:t>
+            </a:r>
+            <a:r>
+              <a:rPr lang="en-US" altLang="zh-TW" dirty="0" err="1"/>
+              <a:t>fromEdge</a:t>
+            </a:r>
+            <a:r>
+              <a:rPr lang="en-US" altLang="zh-TW" dirty="0"/>
+              <a:t>, </a:t>
+            </a:r>
+            <a:r>
+              <a:rPr lang="en-US" altLang="zh-TW" dirty="0" err="1"/>
+              <a:t>toEdge</a:t>
+            </a:r>
+            <a:r>
+              <a:rPr lang="en-US" altLang="zh-TW" dirty="0"/>
+              <a:t>, </a:t>
+            </a:r>
+            <a:r>
+              <a:rPr lang="en-US" altLang="zh-TW" dirty="0" err="1"/>
+              <a:t>vType</a:t>
+            </a:r>
+            <a:r>
+              <a:rPr lang="en-US" altLang="zh-TW" dirty="0"/>
+              <a:t>, depart, </a:t>
+            </a:r>
+            <a:r>
+              <a:rPr lang="en-US" altLang="zh-TW" dirty="0" err="1"/>
+              <a:t>routingMode</a:t>
+            </a:r>
+            <a:r>
+              <a:rPr lang="en-US" altLang="zh-TW" dirty="0"/>
+              <a:t>};</a:t>
+            </a:r>
+          </a:p>
+          <a:p>
+            <a:r>
+              <a:rPr lang="en-US" altLang="zh-TW" dirty="0"/>
+              <a:t>return new </a:t>
+            </a:r>
+            <a:r>
+              <a:rPr lang="en-US" altLang="zh-TW" dirty="0" err="1"/>
+              <a:t>SumoCommand</a:t>
+            </a:r>
+            <a:r>
+              <a:rPr lang="en-US" altLang="zh-TW" dirty="0"/>
+              <a:t>(</a:t>
+            </a:r>
+          </a:p>
+          <a:p>
+            <a:r>
+              <a:rPr lang="en-US" altLang="zh-TW" dirty="0" err="1"/>
+              <a:t>Constants.CMD_GET_SIM_VARIABLE</a:t>
+            </a:r>
+            <a:r>
+              <a:rPr lang="en-US" altLang="zh-TW" dirty="0"/>
+              <a:t>, </a:t>
+            </a:r>
+          </a:p>
+          <a:p>
+            <a:r>
+              <a:rPr lang="en-US" altLang="zh-TW" dirty="0" err="1"/>
+              <a:t>Constants.FIND_ROUTE</a:t>
+            </a:r>
+            <a:r>
+              <a:rPr lang="en-US" altLang="zh-TW" dirty="0"/>
+              <a:t>, </a:t>
+            </a:r>
+          </a:p>
+          <a:p>
+            <a:r>
+              <a:rPr lang="en-US" altLang="zh-TW" dirty="0"/>
+              <a:t>"", </a:t>
+            </a:r>
+          </a:p>
+          <a:p>
+            <a:r>
+              <a:rPr lang="en-US" altLang="zh-TW" dirty="0"/>
+              <a:t>array, </a:t>
+            </a:r>
+          </a:p>
+          <a:p>
+            <a:r>
+              <a:rPr lang="en-US" altLang="zh-TW" dirty="0" err="1"/>
+              <a:t>Constants.RESPONSE_GET_SIM_VARIABLE</a:t>
+            </a:r>
+            <a:r>
+              <a:rPr lang="en-US" altLang="zh-TW" dirty="0"/>
+              <a:t>, </a:t>
+            </a:r>
+          </a:p>
+          <a:p>
+            <a:r>
+              <a:rPr lang="en-US" altLang="zh-TW" dirty="0" err="1"/>
+              <a:t>Constants.TYPE_COMPOUND</a:t>
+            </a:r>
+            <a:r>
+              <a:rPr lang="en-US" altLang="zh-TW" dirty="0"/>
+              <a:t>);</a:t>
+            </a:r>
+            <a:endParaRPr lang="zh-TW" altLang="en-US" dirty="0"/>
+          </a:p>
+        </p:txBody>
+      </p:sp>
+    </p:spTree>
+    <p:extLst>
+      <p:ext uri="{BB962C8B-B14F-4D97-AF65-F5344CB8AC3E}">
+        <p14:creationId xmlns:p14="http://schemas.microsoft.com/office/powerpoint/2010/main" val="2952387021"/>
+      </p:ext>
+    </p:extLst>
+  </p:cSld>
+  <p:clrMapOvr>
+    <a:masterClrMapping/>
+  </p:clrMapOvr>
 </p:sld>
 </file>
 

</xml_diff>

<commit_message>
add photos to ppt
</commit_message>
<xml_diff>
--- a/eclipse workspace/java_library/sumo_implementation recording.pptx
+++ b/eclipse workspace/java_library/sumo_implementation recording.pptx
@@ -21,11 +21,12 @@
     <p:sldId id="272" r:id="rId15"/>
     <p:sldId id="274" r:id="rId16"/>
     <p:sldId id="275" r:id="rId17"/>
-    <p:sldId id="276" r:id="rId18"/>
-    <p:sldId id="277" r:id="rId19"/>
-    <p:sldId id="278" r:id="rId20"/>
-    <p:sldId id="279" r:id="rId21"/>
-    <p:sldId id="280" r:id="rId22"/>
+    <p:sldId id="280" r:id="rId18"/>
+    <p:sldId id="281" r:id="rId19"/>
+    <p:sldId id="282" r:id="rId20"/>
+    <p:sldId id="283" r:id="rId21"/>
+    <p:sldId id="284" r:id="rId22"/>
+    <p:sldId id="285" r:id="rId23"/>
   </p:sldIdLst>
   <p:sldSz cx="12192000" cy="6858000"/>
   <p:notesSz cx="6858000" cy="9144000"/>
@@ -5982,22 +5983,18 @@
           <a:bodyPr/>
           <a:lstStyle/>
           <a:p>
-            <a:r>
-              <a:rPr lang="en-US" altLang="zh-TW" dirty="0" smtClean="0"/>
-              <a:t>2019-04-24</a:t>
-            </a:r>
-            <a:endParaRPr lang="zh-TW" altLang="en-US" dirty="0"/>
-          </a:p>
-        </p:txBody>
-      </p:sp>
-      <p:sp>
-        <p:nvSpPr>
-          <p:cNvPr id="3" name="文字版面配置區 2"/>
-          <p:cNvSpPr>
-            <a:spLocks noGrp="1"/>
-          </p:cNvSpPr>
-          <p:nvPr>
-            <p:ph type="body" idx="1"/>
+            <a:endParaRPr lang="zh-TW" altLang="en-US"/>
+          </a:p>
+        </p:txBody>
+      </p:sp>
+      <p:sp>
+        <p:nvSpPr>
+          <p:cNvPr id="3" name="內容版面配置區 2"/>
+          <p:cNvSpPr>
+            <a:spLocks noGrp="1"/>
+          </p:cNvSpPr>
+          <p:nvPr>
+            <p:ph idx="1"/>
           </p:nvPr>
         </p:nvSpPr>
         <p:spPr/>
@@ -6005,122 +6002,124 @@
           <a:bodyPr/>
           <a:lstStyle/>
           <a:p>
-            <a:endParaRPr lang="zh-TW" altLang="en-US"/>
-          </a:p>
-        </p:txBody>
-      </p:sp>
-      <p:sp>
-        <p:nvSpPr>
-          <p:cNvPr id="4" name="內容版面配置區 3"/>
-          <p:cNvSpPr>
-            <a:spLocks noGrp="1"/>
-          </p:cNvSpPr>
-          <p:nvPr>
-            <p:ph sz="half" idx="2"/>
-          </p:nvPr>
-        </p:nvSpPr>
-        <p:spPr/>
-        <p:txBody>
-          <a:bodyPr/>
-          <a:lstStyle/>
-          <a:p>
+            <a:r>
+              <a:rPr lang="en-US" altLang="zh-TW" dirty="0" smtClean="0"/>
+              <a:t>$</a:t>
+            </a:r>
+            <a:r>
+              <a:rPr lang="en-US" altLang="zh-TW" dirty="0" err="1" smtClean="0"/>
+              <a:t>polyconvert</a:t>
+            </a:r>
+            <a:r>
+              <a:rPr lang="en-US" altLang="zh-TW" dirty="0" smtClean="0"/>
+              <a:t> </a:t>
+            </a:r>
             <a:r>
               <a:rPr lang="en-US" altLang="zh-TW" dirty="0"/>
-              <a:t>Error: Answered with error to command 0xab: </a:t>
-            </a:r>
-          </a:p>
-          <a:p>
+              <a:t>--net-file map_edited.net.xml </a:t>
+            </a:r>
+            <a:r>
+              <a:rPr lang="en-US" altLang="zh-TW" dirty="0">
+                <a:solidFill>
+                  <a:srgbClr val="FF0000"/>
+                </a:solidFill>
+              </a:rPr>
+              <a:t>--</a:t>
+            </a:r>
+            <a:r>
+              <a:rPr lang="en-US" altLang="zh-TW" dirty="0" err="1">
+                <a:solidFill>
+                  <a:srgbClr val="FF0000"/>
+                </a:solidFill>
+              </a:rPr>
+              <a:t>osm</a:t>
+            </a:r>
+            <a:r>
+              <a:rPr lang="en-US" altLang="zh-TW" dirty="0">
+                <a:solidFill>
+                  <a:srgbClr val="FF0000"/>
+                </a:solidFill>
+              </a:rPr>
+              <a:t>-files </a:t>
+            </a:r>
             <a:r>
               <a:rPr lang="en-US" altLang="zh-TW" dirty="0"/>
-              <a:t>Wrong position in </a:t>
-            </a:r>
-            <a:r>
-              <a:rPr lang="en-US" altLang="zh-TW" dirty="0" err="1"/>
-              <a:t>requestMessage</a:t>
-            </a:r>
+              <a:t>map2.osm --type-file typemap.xml </a:t>
+            </a:r>
+            <a:r>
+              <a:rPr lang="en-US" altLang="zh-TW" dirty="0" smtClean="0">
+                <a:solidFill>
+                  <a:srgbClr val="FF0000"/>
+                </a:solidFill>
+              </a:rPr>
+              <a:t>--output </a:t>
+            </a:r>
+            <a:r>
+              <a:rPr lang="en-US" altLang="zh-TW" dirty="0" smtClean="0"/>
+              <a:t>tainan.poly.xml</a:t>
+            </a:r>
+          </a:p>
+          <a:p>
             <a:r>
               <a:rPr lang="en-US" altLang="zh-TW" dirty="0"/>
-              <a:t> after dispatching command. </a:t>
-            </a:r>
-          </a:p>
-          <a:p>
+              <a:t>$ </a:t>
+            </a:r>
+            <a:r>
+              <a:rPr lang="en-US" altLang="zh-TW" dirty="0" smtClean="0"/>
+              <a:t>python randomTrips.py --net-file </a:t>
+            </a:r>
             <a:r>
               <a:rPr lang="en-US" altLang="zh-TW" dirty="0"/>
-              <a:t>Expected command length was 152 but 82 Bytes were read.</a:t>
-            </a:r>
-            <a:endParaRPr lang="zh-TW" altLang="en-US" dirty="0"/>
-          </a:p>
-        </p:txBody>
-      </p:sp>
-      <p:sp>
-        <p:nvSpPr>
-          <p:cNvPr id="5" name="文字版面配置區 4"/>
-          <p:cNvSpPr>
-            <a:spLocks noGrp="1"/>
-          </p:cNvSpPr>
-          <p:nvPr>
-            <p:ph type="body" sz="quarter" idx="3"/>
-          </p:nvPr>
-        </p:nvSpPr>
-        <p:spPr/>
-        <p:txBody>
-          <a:bodyPr/>
-          <a:lstStyle/>
-          <a:p>
-            <a:endParaRPr lang="zh-TW" altLang="en-US"/>
-          </a:p>
-        </p:txBody>
-      </p:sp>
-      <p:sp>
-        <p:nvSpPr>
-          <p:cNvPr id="6" name="內容版面配置區 5"/>
-          <p:cNvSpPr>
-            <a:spLocks noGrp="1"/>
-          </p:cNvSpPr>
-          <p:nvPr>
-            <p:ph sz="quarter" idx="4"/>
-          </p:nvPr>
-        </p:nvSpPr>
-        <p:spPr/>
-        <p:txBody>
-          <a:bodyPr/>
-          <a:lstStyle/>
-          <a:p>
-            <a:endParaRPr lang="en-US" altLang="zh-TW" dirty="0"/>
-          </a:p>
-          <a:p>
-            <a:r>
-              <a:rPr lang="en-US" altLang="zh-TW" dirty="0" err="1"/>
-              <a:t>ResponseMessage</a:t>
+              <a:t>map_edited.net.xml </a:t>
+            </a:r>
+            <a:r>
+              <a:rPr lang="en-US" altLang="zh-TW" dirty="0" smtClean="0"/>
+              <a:t>--end 10 </a:t>
             </a:r>
             <a:r>
               <a:rPr lang="en-US" altLang="zh-TW" dirty="0"/>
-              <a:t> </a:t>
-            </a:r>
-            <a:r>
-              <a:rPr lang="en-US" altLang="zh-TW" dirty="0" err="1"/>
-              <a:t>resp</a:t>
-            </a:r>
+              <a:t>-l </a:t>
+            </a:r>
+            <a:r>
+              <a:rPr lang="en-US" altLang="zh-TW" dirty="0" smtClean="0">
+                <a:solidFill>
+                  <a:srgbClr val="FF0000"/>
+                </a:solidFill>
+              </a:rPr>
+              <a:t>--output</a:t>
+            </a:r>
+            <a:r>
+              <a:rPr lang="en-US" altLang="zh-TW" dirty="0" smtClean="0"/>
+              <a:t> map.trip.xml</a:t>
+            </a:r>
+          </a:p>
+          <a:p>
             <a:r>
               <a:rPr lang="en-US" altLang="zh-TW" dirty="0"/>
-              <a:t> = </a:t>
-            </a:r>
-            <a:r>
-              <a:rPr lang="en-US" altLang="zh-TW" dirty="0" err="1"/>
-              <a:t>queryAndVerify</a:t>
+              <a:t>$ python </a:t>
+            </a:r>
+            <a:r>
+              <a:rPr lang="en-US" altLang="zh-TW" dirty="0" smtClean="0"/>
+              <a:t>randomTrips.py </a:t>
             </a:r>
             <a:r>
               <a:rPr lang="en-US" altLang="zh-TW" dirty="0"/>
-              <a:t>(</a:t>
-            </a:r>
-            <a:r>
-              <a:rPr lang="en-US" altLang="zh-TW" dirty="0" err="1"/>
-              <a:t>msg</a:t>
+              <a:t>-n map_edited.net.xml</a:t>
+            </a:r>
+            <a:r>
+              <a:rPr lang="en-US" altLang="zh-TW" dirty="0" smtClean="0"/>
+              <a:t> –r map.rou.xml </a:t>
             </a:r>
             <a:r>
               <a:rPr lang="en-US" altLang="zh-TW" dirty="0"/>
-              <a:t>);</a:t>
-            </a:r>
+              <a:t>-e </a:t>
+            </a:r>
+            <a:r>
+              <a:rPr lang="en-US" altLang="zh-TW" dirty="0" smtClean="0"/>
+              <a:t>10 –l</a:t>
+            </a:r>
+          </a:p>
+          <a:p>
             <a:endParaRPr lang="zh-TW" altLang="en-US" dirty="0"/>
           </a:p>
         </p:txBody>
@@ -6128,7 +6127,7 @@
     </p:spTree>
     <p:extLst>
       <p:ext uri="{BB962C8B-B14F-4D97-AF65-F5344CB8AC3E}">
-        <p14:creationId xmlns:p14="http://schemas.microsoft.com/office/powerpoint/2010/main" val="121390455"/>
+        <p14:creationId xmlns:p14="http://schemas.microsoft.com/office/powerpoint/2010/main" val="4114043878"/>
       </p:ext>
     </p:extLst>
   </p:cSld>
@@ -6155,199 +6154,40 @@
           <a:chExt cx="0" cy="0"/>
         </a:xfrm>
       </p:grpSpPr>
-      <p:sp>
-        <p:nvSpPr>
-          <p:cNvPr id="2" name="標題 1"/>
-          <p:cNvSpPr>
-            <a:spLocks noGrp="1"/>
-          </p:cNvSpPr>
-          <p:nvPr>
-            <p:ph type="title"/>
-          </p:nvPr>
-        </p:nvSpPr>
-        <p:spPr/>
-        <p:txBody>
-          <a:bodyPr/>
-          <a:lstStyle/>
-          <a:p>
-            <a:endParaRPr lang="zh-TW" altLang="en-US"/>
-          </a:p>
-        </p:txBody>
-      </p:sp>
-      <p:sp>
-        <p:nvSpPr>
-          <p:cNvPr id="3" name="文字版面配置區 2"/>
-          <p:cNvSpPr>
-            <a:spLocks noGrp="1"/>
-          </p:cNvSpPr>
-          <p:nvPr>
-            <p:ph type="body" idx="1"/>
-          </p:nvPr>
-        </p:nvSpPr>
-        <p:spPr/>
-        <p:txBody>
-          <a:bodyPr/>
-          <a:lstStyle/>
-          <a:p>
-            <a:endParaRPr lang="zh-TW" altLang="en-US"/>
-          </a:p>
-        </p:txBody>
-      </p:sp>
-      <p:sp>
-        <p:nvSpPr>
-          <p:cNvPr id="5" name="文字版面配置區 4"/>
-          <p:cNvSpPr>
-            <a:spLocks noGrp="1"/>
-          </p:cNvSpPr>
-          <p:nvPr>
-            <p:ph type="body" sz="quarter" idx="3"/>
-          </p:nvPr>
-        </p:nvSpPr>
-        <p:spPr/>
-        <p:txBody>
-          <a:bodyPr/>
-          <a:lstStyle/>
-          <a:p>
-            <a:endParaRPr lang="zh-TW" altLang="en-US"/>
-          </a:p>
-        </p:txBody>
-      </p:sp>
-      <p:sp>
-        <p:nvSpPr>
-          <p:cNvPr id="6" name="內容版面配置區 5"/>
-          <p:cNvSpPr>
-            <a:spLocks noGrp="1"/>
-          </p:cNvSpPr>
-          <p:nvPr>
-            <p:ph sz="quarter" idx="4"/>
-          </p:nvPr>
-        </p:nvSpPr>
+      <p:pic>
+        <p:nvPicPr>
+          <p:cNvPr id="6" name="圖片 5"/>
+          <p:cNvPicPr>
+            <a:picLocks noChangeAspect="1"/>
+          </p:cNvPicPr>
+          <p:nvPr/>
+        </p:nvPicPr>
+        <p:blipFill>
+          <a:blip r:embed="rId2">
+            <a:extLst>
+              <a:ext uri="{28A0092B-C50C-407E-A947-70E740481C1C}">
+                <a14:useLocalDpi xmlns:a14="http://schemas.microsoft.com/office/drawing/2010/main" val="0"/>
+              </a:ext>
+            </a:extLst>
+          </a:blip>
+          <a:stretch>
+            <a:fillRect/>
+          </a:stretch>
+        </p:blipFill>
         <p:spPr>
           <a:xfrm>
-            <a:off x="839788" y="2505075"/>
-            <a:ext cx="10515600" cy="3684588"/>
+            <a:off x="1070861" y="182880"/>
+            <a:ext cx="10050278" cy="6437440"/>
           </a:xfrm>
+          <a:prstGeom prst="rect">
+            <a:avLst/>
+          </a:prstGeom>
         </p:spPr>
-        <p:txBody>
-          <a:bodyPr>
-            <a:noAutofit/>
-          </a:bodyPr>
-          <a:lstStyle/>
-          <a:p>
-            <a:r>
-              <a:rPr lang="en-US" altLang="zh-TW" sz="2000" dirty="0" err="1"/>
-              <a:t>java.lang.IllegalStateException</a:t>
-            </a:r>
-            <a:r>
-              <a:rPr lang="en-US" altLang="zh-TW" sz="2000" dirty="0"/>
-              <a:t>: Error reading byte, invalid list position specified for reading: 706</a:t>
-            </a:r>
-          </a:p>
-          <a:p>
-            <a:r>
-              <a:rPr lang="en-US" altLang="zh-TW" sz="2000" dirty="0"/>
-              <a:t>	at </a:t>
-            </a:r>
-            <a:r>
-              <a:rPr lang="en-US" altLang="zh-TW" sz="2000" dirty="0" err="1"/>
-              <a:t>de.uniluebeck.itm.tcpip.Storage.readByte</a:t>
-            </a:r>
-            <a:r>
-              <a:rPr lang="en-US" altLang="zh-TW" sz="2000" dirty="0"/>
-              <a:t>(Storage.java:141)</a:t>
-            </a:r>
-          </a:p>
-          <a:p>
-            <a:r>
-              <a:rPr lang="en-US" altLang="zh-TW" sz="2000" dirty="0"/>
-              <a:t>	at </a:t>
-            </a:r>
-            <a:r>
-              <a:rPr lang="en-US" altLang="zh-TW" sz="2000" dirty="0" err="1"/>
-              <a:t>de.uniluebeck.itm.tcpip.Storage.readString</a:t>
-            </a:r>
-            <a:r>
-              <a:rPr lang="en-US" altLang="zh-TW" sz="2000" dirty="0"/>
-              <a:t>(Storage.java:502)</a:t>
-            </a:r>
-          </a:p>
-          <a:p>
-            <a:r>
-              <a:rPr lang="en-US" altLang="zh-TW" sz="2000" dirty="0"/>
-              <a:t>	at </a:t>
-            </a:r>
-            <a:r>
-              <a:rPr lang="en-US" altLang="zh-TW" sz="2000" dirty="0" err="1"/>
-              <a:t>de.uniluebeck.itm.tcpip.Storage.readStringASCII</a:t>
-            </a:r>
-            <a:r>
-              <a:rPr lang="en-US" altLang="zh-TW" sz="2000" dirty="0"/>
-              <a:t>(Storage.java:462)</a:t>
-            </a:r>
-          </a:p>
-          <a:p>
-            <a:r>
-              <a:rPr lang="en-US" altLang="zh-TW" sz="2000" dirty="0"/>
-              <a:t>	at </a:t>
-            </a:r>
-            <a:r>
-              <a:rPr lang="en-US" altLang="zh-TW" sz="2000" dirty="0" err="1"/>
-              <a:t>de.tudresden.sumo.util.CommandProcessor.readStage</a:t>
-            </a:r>
-            <a:r>
-              <a:rPr lang="en-US" altLang="zh-TW" sz="2000" dirty="0"/>
-              <a:t>(CommandProcessor.java:876)</a:t>
-            </a:r>
-          </a:p>
-          <a:p>
-            <a:r>
-              <a:rPr lang="en-US" altLang="zh-TW" sz="2000" dirty="0"/>
-              <a:t>	at </a:t>
-            </a:r>
-            <a:r>
-              <a:rPr lang="en-US" altLang="zh-TW" sz="2000" dirty="0" err="1"/>
-              <a:t>de.tudresden.sumo.util.CommandProcessor.do_job_get</a:t>
-            </a:r>
-            <a:r>
-              <a:rPr lang="en-US" altLang="zh-TW" sz="2000" dirty="0"/>
-              <a:t>(CommandProcessor.java:778)</a:t>
-            </a:r>
-          </a:p>
-          <a:p>
-            <a:r>
-              <a:rPr lang="en-US" altLang="zh-TW" sz="2000" dirty="0"/>
-              <a:t>	at </a:t>
-            </a:r>
-            <a:r>
-              <a:rPr lang="en-US" altLang="zh-TW" sz="2000" dirty="0" err="1"/>
-              <a:t>it.polito.appeal.traci.SumoTraciConnection.do_job_get</a:t>
-            </a:r>
-            <a:r>
-              <a:rPr lang="en-US" altLang="zh-TW" sz="2000" dirty="0"/>
-              <a:t>(SumoTraciConnection.java:366)</a:t>
-            </a:r>
-          </a:p>
-          <a:p>
-            <a:r>
-              <a:rPr lang="en-US" altLang="zh-TW" sz="2000" dirty="0"/>
-              <a:t>	at </a:t>
-            </a:r>
-            <a:r>
-              <a:rPr lang="en-US" altLang="zh-TW" sz="2000" dirty="0" err="1"/>
-              <a:t>Main.main</a:t>
-            </a:r>
-            <a:r>
-              <a:rPr lang="en-US" altLang="zh-TW" sz="2000" dirty="0"/>
-              <a:t>(Main.java:81)</a:t>
-            </a:r>
-            <a:endParaRPr lang="zh-TW" altLang="en-US" sz="2000" dirty="0"/>
-          </a:p>
-        </p:txBody>
-      </p:sp>
+      </p:pic>
     </p:spTree>
     <p:extLst>
       <p:ext uri="{BB962C8B-B14F-4D97-AF65-F5344CB8AC3E}">
-        <p14:creationId xmlns:p14="http://schemas.microsoft.com/office/powerpoint/2010/main" val="548152581"/>
+        <p14:creationId xmlns:p14="http://schemas.microsoft.com/office/powerpoint/2010/main" val="722485555"/>
       </p:ext>
     </p:extLst>
   </p:cSld>
@@ -6374,193 +6214,40 @@
           <a:chExt cx="0" cy="0"/>
         </a:xfrm>
       </p:grpSpPr>
-      <p:sp>
-        <p:nvSpPr>
-          <p:cNvPr id="11" name="標題 10"/>
-          <p:cNvSpPr>
-            <a:spLocks noGrp="1"/>
-          </p:cNvSpPr>
-          <p:nvPr>
-            <p:ph type="title"/>
-          </p:nvPr>
-        </p:nvSpPr>
-        <p:spPr/>
-        <p:txBody>
-          <a:bodyPr/>
-          <a:lstStyle/>
-          <a:p>
-            <a:endParaRPr lang="zh-TW" altLang="en-US"/>
-          </a:p>
-        </p:txBody>
-      </p:sp>
-      <p:sp>
-        <p:nvSpPr>
-          <p:cNvPr id="12" name="內容版面配置區 11"/>
-          <p:cNvSpPr>
-            <a:spLocks noGrp="1"/>
-          </p:cNvSpPr>
-          <p:nvPr>
-            <p:ph idx="1"/>
-          </p:nvPr>
-        </p:nvSpPr>
+      <p:pic>
+        <p:nvPicPr>
+          <p:cNvPr id="2" name="圖片 1"/>
+          <p:cNvPicPr>
+            <a:picLocks noChangeAspect="1"/>
+          </p:cNvPicPr>
+          <p:nvPr/>
+        </p:nvPicPr>
+        <p:blipFill>
+          <a:blip r:embed="rId2">
+            <a:extLst>
+              <a:ext uri="{28A0092B-C50C-407E-A947-70E740481C1C}">
+                <a14:useLocalDpi xmlns:a14="http://schemas.microsoft.com/office/drawing/2010/main" val="0"/>
+              </a:ext>
+            </a:extLst>
+          </a:blip>
+          <a:stretch>
+            <a:fillRect/>
+          </a:stretch>
+        </p:blipFill>
         <p:spPr>
           <a:xfrm>
-            <a:off x="838199" y="1825625"/>
-            <a:ext cx="10920413" cy="4351338"/>
+            <a:off x="1426463" y="214489"/>
+            <a:ext cx="8265225" cy="6336672"/>
           </a:xfrm>
+          <a:prstGeom prst="rect">
+            <a:avLst/>
+          </a:prstGeom>
         </p:spPr>
-        <p:txBody>
-          <a:bodyPr>
-            <a:normAutofit fontScale="92500" lnSpcReduction="20000"/>
-          </a:bodyPr>
-          <a:lstStyle/>
-          <a:p>
-            <a:r>
-              <a:rPr lang="en-US" altLang="zh-TW" dirty="0" err="1" smtClean="0"/>
-              <a:t>findRoute</a:t>
-            </a:r>
-            <a:r>
-              <a:rPr lang="en-US" altLang="zh-TW" dirty="0" smtClean="0"/>
-              <a:t> </a:t>
-            </a:r>
-            <a:r>
-              <a:rPr lang="en-US" altLang="zh-TW" dirty="0"/>
-              <a:t>Stage</a:t>
-            </a:r>
-            <a:r>
-              <a:rPr lang="en-US" altLang="zh-TW" dirty="0" smtClean="0"/>
-              <a:t>(</a:t>
-            </a:r>
-          </a:p>
-          <a:p>
-            <a:r>
-              <a:rPr lang="en-US" altLang="zh-TW" dirty="0" err="1" smtClean="0"/>
-              <a:t>stageType</a:t>
-            </a:r>
-            <a:r>
-              <a:rPr lang="en-US" altLang="zh-TW" dirty="0" smtClean="0"/>
-              <a:t>=3</a:t>
-            </a:r>
-            <a:r>
-              <a:rPr lang="en-US" altLang="zh-TW" dirty="0"/>
-              <a:t>, </a:t>
-            </a:r>
-            <a:endParaRPr lang="en-US" altLang="zh-TW" dirty="0" smtClean="0"/>
-          </a:p>
-          <a:p>
-            <a:r>
-              <a:rPr lang="en-US" altLang="zh-TW" dirty="0" err="1" smtClean="0"/>
-              <a:t>vType</a:t>
-            </a:r>
-            <a:r>
-              <a:rPr lang="en-US" altLang="zh-TW" dirty="0"/>
-              <a:t>='', </a:t>
-            </a:r>
-            <a:endParaRPr lang="en-US" altLang="zh-TW" dirty="0" smtClean="0"/>
-          </a:p>
-          <a:p>
-            <a:r>
-              <a:rPr lang="en-US" altLang="zh-TW" dirty="0" smtClean="0"/>
-              <a:t>line</a:t>
-            </a:r>
-            <a:r>
-              <a:rPr lang="en-US" altLang="zh-TW" dirty="0"/>
-              <a:t>='', </a:t>
-            </a:r>
-            <a:endParaRPr lang="en-US" altLang="zh-TW" dirty="0" smtClean="0"/>
-          </a:p>
-          <a:p>
-            <a:r>
-              <a:rPr lang="en-US" altLang="zh-TW" dirty="0" err="1" smtClean="0"/>
-              <a:t>destStop</a:t>
-            </a:r>
-            <a:r>
-              <a:rPr lang="en-US" altLang="zh-TW" dirty="0"/>
-              <a:t>='', </a:t>
-            </a:r>
-            <a:endParaRPr lang="en-US" altLang="zh-TW" dirty="0" smtClean="0"/>
-          </a:p>
-          <a:p>
-            <a:r>
-              <a:rPr lang="en-US" altLang="zh-TW" dirty="0" smtClean="0"/>
-              <a:t>edges</a:t>
-            </a:r>
-            <a:r>
-              <a:rPr lang="en-US" altLang="zh-TW" dirty="0"/>
-              <a:t>=('o', '2o'), </a:t>
-            </a:r>
-            <a:endParaRPr lang="en-US" altLang="zh-TW" dirty="0" smtClean="0"/>
-          </a:p>
-          <a:p>
-            <a:r>
-              <a:rPr lang="en-US" altLang="zh-TW" dirty="0" err="1" smtClean="0"/>
-              <a:t>travelTime</a:t>
-            </a:r>
-            <a:r>
-              <a:rPr lang="en-US" altLang="zh-TW" dirty="0" smtClean="0"/>
-              <a:t>=738.7359712230216</a:t>
-            </a:r>
-            <a:r>
-              <a:rPr lang="en-US" altLang="zh-TW" dirty="0"/>
-              <a:t>, </a:t>
-            </a:r>
-            <a:endParaRPr lang="en-US" altLang="zh-TW" dirty="0" smtClean="0"/>
-          </a:p>
-          <a:p>
-            <a:r>
-              <a:rPr lang="en-US" altLang="zh-TW" dirty="0" smtClean="0"/>
-              <a:t>cost=738.7359712230216</a:t>
-            </a:r>
-            <a:r>
-              <a:rPr lang="en-US" altLang="zh-TW" dirty="0"/>
-              <a:t>, length=10268.43, </a:t>
-            </a:r>
-            <a:endParaRPr lang="en-US" altLang="zh-TW" dirty="0" smtClean="0"/>
-          </a:p>
-          <a:p>
-            <a:r>
-              <a:rPr lang="en-US" altLang="zh-TW" dirty="0" smtClean="0"/>
-              <a:t>intended</a:t>
-            </a:r>
-            <a:r>
-              <a:rPr lang="en-US" altLang="zh-TW" dirty="0"/>
-              <a:t>='', </a:t>
-            </a:r>
-            <a:endParaRPr lang="en-US" altLang="zh-TW" dirty="0" smtClean="0"/>
-          </a:p>
-          <a:p>
-            <a:r>
-              <a:rPr lang="en-US" altLang="zh-TW" dirty="0" smtClean="0"/>
-              <a:t>depart</a:t>
-            </a:r>
-            <a:r>
-              <a:rPr lang="en-US" altLang="zh-TW" dirty="0"/>
-              <a:t>=-1073741824.0, </a:t>
-            </a:r>
-            <a:r>
-              <a:rPr lang="en-US" altLang="zh-TW" dirty="0" err="1"/>
-              <a:t>departPos</a:t>
-            </a:r>
-            <a:r>
-              <a:rPr lang="en-US" altLang="zh-TW" dirty="0"/>
-              <a:t>=-1073741824.0, </a:t>
-            </a:r>
-            <a:r>
-              <a:rPr lang="en-US" altLang="zh-TW" dirty="0" err="1"/>
-              <a:t>arrivalPos</a:t>
-            </a:r>
-            <a:r>
-              <a:rPr lang="en-US" altLang="zh-TW" dirty="0"/>
-              <a:t>=-1073741824.0, description='')</a:t>
-            </a:r>
-            <a:endParaRPr lang="zh-TW" altLang="en-US" dirty="0"/>
-          </a:p>
-        </p:txBody>
-      </p:sp>
+      </p:pic>
     </p:spTree>
     <p:extLst>
       <p:ext uri="{BB962C8B-B14F-4D97-AF65-F5344CB8AC3E}">
-        <p14:creationId xmlns:p14="http://schemas.microsoft.com/office/powerpoint/2010/main" val="2530624384"/>
+        <p14:creationId xmlns:p14="http://schemas.microsoft.com/office/powerpoint/2010/main" val="1158502614"/>
       </p:ext>
     </p:extLst>
   </p:cSld>
@@ -6905,152 +6592,98 @@
           <a:chExt cx="0" cy="0"/>
         </a:xfrm>
       </p:grpSpPr>
-      <p:sp>
-        <p:nvSpPr>
-          <p:cNvPr id="2" name="標題 1"/>
-          <p:cNvSpPr>
-            <a:spLocks noGrp="1"/>
-          </p:cNvSpPr>
-          <p:nvPr>
-            <p:ph type="title"/>
-          </p:nvPr>
-        </p:nvSpPr>
-        <p:spPr/>
-        <p:txBody>
-          <a:bodyPr/>
-          <a:lstStyle/>
-          <a:p>
-            <a:endParaRPr lang="zh-TW" altLang="en-US"/>
-          </a:p>
-        </p:txBody>
-      </p:sp>
-      <p:sp>
-        <p:nvSpPr>
-          <p:cNvPr id="3" name="內容版面配置區 2"/>
-          <p:cNvSpPr>
-            <a:spLocks noGrp="1"/>
-          </p:cNvSpPr>
-          <p:nvPr>
-            <p:ph idx="1"/>
-          </p:nvPr>
-        </p:nvSpPr>
-        <p:spPr/>
-        <p:txBody>
-          <a:bodyPr>
-            <a:normAutofit lnSpcReduction="10000"/>
-          </a:bodyPr>
-          <a:lstStyle/>
-          <a:p>
-            <a:r>
-              <a:rPr lang="en-US" altLang="zh-TW" dirty="0"/>
-              <a:t>Object[] array = new Object[]{</a:t>
-            </a:r>
-            <a:r>
-              <a:rPr lang="en-US" altLang="zh-TW" dirty="0" err="1"/>
-              <a:t>fromEdge</a:t>
-            </a:r>
-            <a:r>
-              <a:rPr lang="en-US" altLang="zh-TW" dirty="0"/>
-              <a:t>, </a:t>
-            </a:r>
-            <a:r>
-              <a:rPr lang="en-US" altLang="zh-TW" dirty="0" err="1"/>
-              <a:t>toEdge</a:t>
-            </a:r>
-            <a:r>
-              <a:rPr lang="en-US" altLang="zh-TW" dirty="0"/>
-              <a:t>, </a:t>
-            </a:r>
-            <a:r>
-              <a:rPr lang="en-US" altLang="zh-TW" dirty="0" err="1"/>
-              <a:t>vType</a:t>
-            </a:r>
-            <a:r>
-              <a:rPr lang="en-US" altLang="zh-TW" dirty="0"/>
-              <a:t>, depart, </a:t>
-            </a:r>
-            <a:r>
-              <a:rPr lang="en-US" altLang="zh-TW" dirty="0" err="1"/>
-              <a:t>routingMode</a:t>
-            </a:r>
-            <a:r>
-              <a:rPr lang="en-US" altLang="zh-TW" dirty="0"/>
-              <a:t>};</a:t>
-            </a:r>
-          </a:p>
-          <a:p>
-            <a:r>
-              <a:rPr lang="en-US" altLang="zh-TW" dirty="0"/>
-              <a:t>return new </a:t>
-            </a:r>
-            <a:r>
-              <a:rPr lang="en-US" altLang="zh-TW" dirty="0" err="1"/>
-              <a:t>SumoCommand</a:t>
-            </a:r>
-            <a:r>
-              <a:rPr lang="en-US" altLang="zh-TW" dirty="0"/>
-              <a:t>(</a:t>
-            </a:r>
-          </a:p>
-          <a:p>
-            <a:r>
-              <a:rPr lang="en-US" altLang="zh-TW" dirty="0" err="1"/>
-              <a:t>Constants.CMD_GET_SIM_VARIABLE</a:t>
-            </a:r>
-            <a:r>
-              <a:rPr lang="en-US" altLang="zh-TW" dirty="0"/>
-              <a:t>, </a:t>
-            </a:r>
-          </a:p>
-          <a:p>
-            <a:r>
-              <a:rPr lang="en-US" altLang="zh-TW" dirty="0" err="1"/>
-              <a:t>Constants.FIND_ROUTE</a:t>
-            </a:r>
-            <a:r>
-              <a:rPr lang="en-US" altLang="zh-TW" dirty="0"/>
-              <a:t>, </a:t>
-            </a:r>
-          </a:p>
-          <a:p>
-            <a:r>
-              <a:rPr lang="en-US" altLang="zh-TW" dirty="0"/>
-              <a:t>"", </a:t>
-            </a:r>
-          </a:p>
-          <a:p>
-            <a:r>
-              <a:rPr lang="en-US" altLang="zh-TW" dirty="0"/>
-              <a:t>array, </a:t>
-            </a:r>
-          </a:p>
-          <a:p>
-            <a:r>
-              <a:rPr lang="en-US" altLang="zh-TW" dirty="0" err="1"/>
-              <a:t>Constants.RESPONSE_GET_SIM_VARIABLE</a:t>
-            </a:r>
-            <a:r>
-              <a:rPr lang="en-US" altLang="zh-TW" dirty="0"/>
-              <a:t>, </a:t>
-            </a:r>
-          </a:p>
-          <a:p>
-            <a:r>
-              <a:rPr lang="en-US" altLang="zh-TW" dirty="0" err="1"/>
-              <a:t>Constants.TYPE_COMPOUND</a:t>
-            </a:r>
-            <a:r>
-              <a:rPr lang="en-US" altLang="zh-TW" dirty="0"/>
-              <a:t>);</a:t>
-            </a:r>
-            <a:endParaRPr lang="zh-TW" altLang="en-US" dirty="0"/>
-          </a:p>
-        </p:txBody>
-      </p:sp>
+      <p:pic>
+        <p:nvPicPr>
+          <p:cNvPr id="2" name="圖片 1"/>
+          <p:cNvPicPr>
+            <a:picLocks noChangeAspect="1"/>
+          </p:cNvPicPr>
+          <p:nvPr/>
+        </p:nvPicPr>
+        <p:blipFill>
+          <a:blip r:embed="rId2">
+            <a:extLst>
+              <a:ext uri="{28A0092B-C50C-407E-A947-70E740481C1C}">
+                <a14:useLocalDpi xmlns:a14="http://schemas.microsoft.com/office/drawing/2010/main" val="0"/>
+              </a:ext>
+            </a:extLst>
+          </a:blip>
+          <a:stretch>
+            <a:fillRect/>
+          </a:stretch>
+        </p:blipFill>
+        <p:spPr>
+          <a:xfrm>
+            <a:off x="257696" y="536448"/>
+            <a:ext cx="5179172" cy="3553968"/>
+          </a:xfrm>
+          <a:prstGeom prst="rect">
+            <a:avLst/>
+          </a:prstGeom>
+          <a:ln w="38100" cap="sq">
+            <a:solidFill>
+              <a:srgbClr val="000000"/>
+            </a:solidFill>
+            <a:prstDash val="solid"/>
+            <a:miter lim="800000"/>
+          </a:ln>
+          <a:effectLst>
+            <a:outerShdw blurRad="50800" dist="38100" dir="2700000" algn="tl" rotWithShape="0">
+              <a:srgbClr val="000000">
+                <a:alpha val="43000"/>
+              </a:srgbClr>
+            </a:outerShdw>
+          </a:effectLst>
+        </p:spPr>
+      </p:pic>
+      <p:pic>
+        <p:nvPicPr>
+          <p:cNvPr id="3" name="圖片 2"/>
+          <p:cNvPicPr>
+            <a:picLocks noChangeAspect="1"/>
+          </p:cNvPicPr>
+          <p:nvPr/>
+        </p:nvPicPr>
+        <p:blipFill>
+          <a:blip r:embed="rId3">
+            <a:extLst>
+              <a:ext uri="{28A0092B-C50C-407E-A947-70E740481C1C}">
+                <a14:useLocalDpi xmlns:a14="http://schemas.microsoft.com/office/drawing/2010/main" val="0"/>
+              </a:ext>
+            </a:extLst>
+          </a:blip>
+          <a:stretch>
+            <a:fillRect/>
+          </a:stretch>
+        </p:blipFill>
+        <p:spPr>
+          <a:xfrm>
+            <a:off x="5848333" y="536448"/>
+            <a:ext cx="5977268" cy="3553968"/>
+          </a:xfrm>
+          <a:prstGeom prst="rect">
+            <a:avLst/>
+          </a:prstGeom>
+          <a:ln w="38100" cap="sq">
+            <a:solidFill>
+              <a:srgbClr val="000000"/>
+            </a:solidFill>
+            <a:prstDash val="solid"/>
+            <a:miter lim="800000"/>
+          </a:ln>
+          <a:effectLst>
+            <a:outerShdw blurRad="50800" dist="38100" dir="2700000" algn="tl" rotWithShape="0">
+              <a:srgbClr val="000000">
+                <a:alpha val="43000"/>
+              </a:srgbClr>
+            </a:outerShdw>
+          </a:effectLst>
+        </p:spPr>
+      </p:pic>
     </p:spTree>
     <p:extLst>
       <p:ext uri="{BB962C8B-B14F-4D97-AF65-F5344CB8AC3E}">
-        <p14:creationId xmlns:p14="http://schemas.microsoft.com/office/powerpoint/2010/main" val="2952387021"/>
+        <p14:creationId xmlns:p14="http://schemas.microsoft.com/office/powerpoint/2010/main" val="2744377835"/>
       </p:ext>
     </p:extLst>
   </p:cSld>
@@ -7077,166 +6710,114 @@
           <a:chExt cx="0" cy="0"/>
         </a:xfrm>
       </p:grpSpPr>
-      <p:sp>
-        <p:nvSpPr>
-          <p:cNvPr id="2" name="標題 1"/>
-          <p:cNvSpPr>
-            <a:spLocks noGrp="1"/>
-          </p:cNvSpPr>
-          <p:nvPr>
-            <p:ph type="title"/>
-          </p:nvPr>
-        </p:nvSpPr>
-        <p:spPr/>
-        <p:txBody>
-          <a:bodyPr/>
-          <a:lstStyle/>
-          <a:p>
-            <a:endParaRPr lang="zh-TW" altLang="en-US"/>
-          </a:p>
-        </p:txBody>
-      </p:sp>
-      <p:sp>
-        <p:nvSpPr>
-          <p:cNvPr id="3" name="內容版面配置區 2"/>
-          <p:cNvSpPr>
-            <a:spLocks noGrp="1"/>
-          </p:cNvSpPr>
-          <p:nvPr>
-            <p:ph idx="1"/>
-          </p:nvPr>
-        </p:nvSpPr>
-        <p:spPr/>
-        <p:txBody>
-          <a:bodyPr/>
-          <a:lstStyle/>
-          <a:p>
-            <a:r>
-              <a:rPr lang="en-US" altLang="zh-TW" dirty="0" smtClean="0"/>
-              <a:t>$</a:t>
-            </a:r>
-            <a:r>
-              <a:rPr lang="en-US" altLang="zh-TW" dirty="0" err="1" smtClean="0"/>
-              <a:t>polyconvert</a:t>
-            </a:r>
-            <a:r>
-              <a:rPr lang="en-US" altLang="zh-TW" dirty="0" smtClean="0"/>
-              <a:t> </a:t>
-            </a:r>
-            <a:r>
-              <a:rPr lang="en-US" altLang="zh-TW" dirty="0"/>
-              <a:t>--net-file map_edited.net.xml </a:t>
-            </a:r>
-            <a:r>
-              <a:rPr lang="en-US" altLang="zh-TW" dirty="0">
-                <a:solidFill>
-                  <a:srgbClr val="FF0000"/>
-                </a:solidFill>
-              </a:rPr>
-              <a:t>--</a:t>
-            </a:r>
-            <a:r>
-              <a:rPr lang="en-US" altLang="zh-TW" dirty="0" err="1">
-                <a:solidFill>
-                  <a:srgbClr val="FF0000"/>
-                </a:solidFill>
-              </a:rPr>
-              <a:t>osm</a:t>
-            </a:r>
-            <a:r>
-              <a:rPr lang="en-US" altLang="zh-TW" dirty="0">
-                <a:solidFill>
-                  <a:srgbClr val="FF0000"/>
-                </a:solidFill>
-              </a:rPr>
-              <a:t>-files </a:t>
-            </a:r>
-            <a:r>
-              <a:rPr lang="en-US" altLang="zh-TW" dirty="0"/>
-              <a:t>map2.osm --type-file typemap.xml </a:t>
-            </a:r>
-            <a:r>
-              <a:rPr lang="en-US" altLang="zh-TW" dirty="0" smtClean="0">
-                <a:solidFill>
-                  <a:srgbClr val="FF0000"/>
-                </a:solidFill>
-              </a:rPr>
-              <a:t>--output </a:t>
-            </a:r>
-            <a:r>
-              <a:rPr lang="en-US" altLang="zh-TW" dirty="0" smtClean="0"/>
-              <a:t>tainan.poly.xml</a:t>
-            </a:r>
-          </a:p>
-          <a:p>
-            <a:r>
-              <a:rPr lang="en-US" altLang="zh-TW" dirty="0"/>
-              <a:t>$ </a:t>
-            </a:r>
-            <a:r>
-              <a:rPr lang="en-US" altLang="zh-TW" dirty="0" smtClean="0"/>
-              <a:t>python randomTrips.py --net-file </a:t>
-            </a:r>
-            <a:r>
-              <a:rPr lang="en-US" altLang="zh-TW" dirty="0"/>
-              <a:t>map_edited.net.xml </a:t>
-            </a:r>
-            <a:r>
-              <a:rPr lang="en-US" altLang="zh-TW" dirty="0" smtClean="0"/>
-              <a:t>--end 10 </a:t>
-            </a:r>
-            <a:r>
-              <a:rPr lang="en-US" altLang="zh-TW" dirty="0"/>
-              <a:t>-l </a:t>
-            </a:r>
-            <a:r>
-              <a:rPr lang="en-US" altLang="zh-TW" dirty="0" smtClean="0">
-                <a:solidFill>
-                  <a:srgbClr val="FF0000"/>
-                </a:solidFill>
-              </a:rPr>
-              <a:t>--output</a:t>
-            </a:r>
-            <a:r>
-              <a:rPr lang="en-US" altLang="zh-TW" dirty="0" smtClean="0"/>
-              <a:t> map.trip.xml</a:t>
-            </a:r>
-          </a:p>
-          <a:p>
-            <a:r>
-              <a:rPr lang="en-US" altLang="zh-TW" dirty="0"/>
-              <a:t>$ python </a:t>
-            </a:r>
-            <a:r>
-              <a:rPr lang="en-US" altLang="zh-TW" dirty="0" smtClean="0"/>
-              <a:t>randomTrips.py </a:t>
-            </a:r>
-            <a:r>
-              <a:rPr lang="en-US" altLang="zh-TW" dirty="0"/>
-              <a:t>-n map_edited.net.xml</a:t>
-            </a:r>
-            <a:r>
-              <a:rPr lang="en-US" altLang="zh-TW" dirty="0" smtClean="0"/>
-              <a:t> –r map.rou.xml </a:t>
-            </a:r>
-            <a:r>
-              <a:rPr lang="en-US" altLang="zh-TW" dirty="0"/>
-              <a:t>-e </a:t>
-            </a:r>
-            <a:r>
-              <a:rPr lang="en-US" altLang="zh-TW" dirty="0" smtClean="0"/>
-              <a:t>10 –l</a:t>
-            </a:r>
-          </a:p>
-          <a:p>
-            <a:endParaRPr lang="zh-TW" altLang="en-US" dirty="0"/>
-          </a:p>
-        </p:txBody>
-      </p:sp>
+      <p:pic>
+        <p:nvPicPr>
+          <p:cNvPr id="2" name="圖片 1"/>
+          <p:cNvPicPr>
+            <a:picLocks noChangeAspect="1"/>
+          </p:cNvPicPr>
+          <p:nvPr/>
+        </p:nvPicPr>
+        <p:blipFill>
+          <a:blip r:embed="rId2">
+            <a:extLst>
+              <a:ext uri="{28A0092B-C50C-407E-A947-70E740481C1C}">
+                <a14:useLocalDpi xmlns:a14="http://schemas.microsoft.com/office/drawing/2010/main" val="0"/>
+              </a:ext>
+            </a:extLst>
+          </a:blip>
+          <a:stretch>
+            <a:fillRect/>
+          </a:stretch>
+        </p:blipFill>
+        <p:spPr>
+          <a:xfrm>
+            <a:off x="158496" y="536448"/>
+            <a:ext cx="11809534" cy="5894832"/>
+          </a:xfrm>
+          <a:prstGeom prst="rect">
+            <a:avLst/>
+          </a:prstGeom>
+          <a:ln w="38100" cap="sq">
+            <a:solidFill>
+              <a:srgbClr val="000000"/>
+            </a:solidFill>
+            <a:prstDash val="solid"/>
+            <a:miter lim="800000"/>
+          </a:ln>
+          <a:effectLst>
+            <a:outerShdw blurRad="50800" dist="38100" dir="2700000" algn="tl" rotWithShape="0">
+              <a:srgbClr val="000000">
+                <a:alpha val="43000"/>
+              </a:srgbClr>
+            </a:outerShdw>
+          </a:effectLst>
+        </p:spPr>
+      </p:pic>
     </p:spTree>
     <p:extLst>
       <p:ext uri="{BB962C8B-B14F-4D97-AF65-F5344CB8AC3E}">
-        <p14:creationId xmlns:p14="http://schemas.microsoft.com/office/powerpoint/2010/main" val="4114043878"/>
+        <p14:creationId xmlns:p14="http://schemas.microsoft.com/office/powerpoint/2010/main" val="3476914497"/>
+      </p:ext>
+    </p:extLst>
+  </p:cSld>
+  <p:clrMapOvr>
+    <a:masterClrMapping/>
+  </p:clrMapOvr>
+</p:sld>
+</file>
+
+<file path=ppt/slides/slide22.xml><?xml version="1.0" encoding="utf-8"?>
+<p:sld xmlns:a="http://schemas.openxmlformats.org/drawingml/2006/main" xmlns:r="http://schemas.openxmlformats.org/officeDocument/2006/relationships" xmlns:p="http://schemas.openxmlformats.org/presentationml/2006/main">
+  <p:cSld>
+    <p:spTree>
+      <p:nvGrpSpPr>
+        <p:cNvPr id="1" name=""/>
+        <p:cNvGrpSpPr/>
+        <p:nvPr/>
+      </p:nvGrpSpPr>
+      <p:grpSpPr>
+        <a:xfrm>
+          <a:off x="0" y="0"/>
+          <a:ext cx="0" cy="0"/>
+          <a:chOff x="0" y="0"/>
+          <a:chExt cx="0" cy="0"/>
+        </a:xfrm>
+      </p:grpSpPr>
+      <p:pic>
+        <p:nvPicPr>
+          <p:cNvPr id="2" name="圖片 1"/>
+          <p:cNvPicPr>
+            <a:picLocks noChangeAspect="1"/>
+          </p:cNvPicPr>
+          <p:nvPr/>
+        </p:nvPicPr>
+        <p:blipFill>
+          <a:blip r:embed="rId2">
+            <a:extLst>
+              <a:ext uri="{28A0092B-C50C-407E-A947-70E740481C1C}">
+                <a14:useLocalDpi xmlns:a14="http://schemas.microsoft.com/office/drawing/2010/main" val="0"/>
+              </a:ext>
+            </a:extLst>
+          </a:blip>
+          <a:stretch>
+            <a:fillRect/>
+          </a:stretch>
+        </p:blipFill>
+        <p:spPr>
+          <a:xfrm>
+            <a:off x="541410" y="242496"/>
+            <a:ext cx="11443326" cy="6310703"/>
+          </a:xfrm>
+          <a:prstGeom prst="rect">
+            <a:avLst/>
+          </a:prstGeom>
+        </p:spPr>
+      </p:pic>
+    </p:spTree>
+    <p:extLst>
+      <p:ext uri="{BB962C8B-B14F-4D97-AF65-F5344CB8AC3E}">
+        <p14:creationId xmlns:p14="http://schemas.microsoft.com/office/powerpoint/2010/main" val="4214743821"/>
       </p:ext>
     </p:extLst>
   </p:cSld>

</xml_diff>

<commit_message>
add progress report ppt
</commit_message>
<xml_diff>
--- a/eclipse workspace/java_library/sumo_implementation recording.pptx
+++ b/eclipse workspace/java_library/sumo_implementation recording.pptx
@@ -27,8 +27,8 @@
     <p:sldId id="283" r:id="rId21"/>
     <p:sldId id="284" r:id="rId22"/>
     <p:sldId id="285" r:id="rId23"/>
-    <p:sldId id="287" r:id="rId24"/>
-    <p:sldId id="286" r:id="rId25"/>
+    <p:sldId id="286" r:id="rId24"/>
+    <p:sldId id="287" r:id="rId25"/>
     <p:sldId id="288" r:id="rId26"/>
     <p:sldId id="289" r:id="rId27"/>
     <p:sldId id="290" r:id="rId28"/>
@@ -43,6 +43,11 @@
     <p:sldId id="299" r:id="rId37"/>
     <p:sldId id="300" r:id="rId38"/>
     <p:sldId id="301" r:id="rId39"/>
+    <p:sldId id="302" r:id="rId40"/>
+    <p:sldId id="303" r:id="rId41"/>
+    <p:sldId id="304" r:id="rId42"/>
+    <p:sldId id="305" r:id="rId43"/>
+    <p:sldId id="306" r:id="rId44"/>
   </p:sldIdLst>
   <p:sldSz cx="12192000" cy="6858000"/>
   <p:notesSz cx="6858000" cy="9144000"/>
@@ -6874,16 +6879,27 @@
             <p:ph type="title"/>
           </p:nvPr>
         </p:nvSpPr>
-        <p:spPr/>
-        <p:txBody>
-          <a:bodyPr/>
-          <a:lstStyle/>
-          <a:p>
-            <a:r>
-              <a:rPr lang="en-US" altLang="zh-TW" dirty="0" smtClean="0"/>
-              <a:t>Progress report-</a:t>
-            </a:r>
-            <a:endParaRPr lang="zh-TW" altLang="en-US" dirty="0"/>
+        <p:spPr>
+          <a:xfrm>
+            <a:off x="3912704" y="1239769"/>
+            <a:ext cx="5774635" cy="1325563"/>
+          </a:xfrm>
+        </p:spPr>
+        <p:txBody>
+          <a:bodyPr>
+            <a:noAutofit/>
+          </a:bodyPr>
+          <a:lstStyle/>
+          <a:p>
+            <a:r>
+              <a:rPr lang="en-US" altLang="zh-TW" sz="6600" b="1" dirty="0" smtClean="0"/>
+              <a:t>Progress </a:t>
+            </a:r>
+            <a:r>
+              <a:rPr lang="en-US" altLang="zh-TW" sz="6600" b="1" dirty="0" smtClean="0"/>
+              <a:t>report</a:t>
+            </a:r>
+            <a:endParaRPr lang="zh-TW" altLang="en-US" sz="6600" b="1" dirty="0"/>
           </a:p>
         </p:txBody>
       </p:sp>
@@ -6897,9 +6913,22 @@
             <p:ph idx="1"/>
           </p:nvPr>
         </p:nvSpPr>
-        <p:spPr/>
-        <p:txBody>
-          <a:bodyPr/>
+        <p:spPr>
+          <a:xfrm>
+            <a:off x="4124739" y="3777301"/>
+            <a:ext cx="4042210" cy="2318699"/>
+          </a:xfrm>
+          <a:solidFill>
+            <a:schemeClr val="accent4">
+              <a:lumMod val="20000"/>
+              <a:lumOff val="80000"/>
+            </a:schemeClr>
+          </a:solidFill>
+        </p:spPr>
+        <p:txBody>
+          <a:bodyPr>
+            <a:normAutofit/>
+          </a:bodyPr>
           <a:lstStyle/>
           <a:p>
             <a:r>
@@ -6928,8 +6957,19 @@
             </a:r>
             <a:r>
               <a:rPr lang="en-US" altLang="zh-TW" dirty="0" smtClean="0"/>
-              <a:t> demo</a:t>
-            </a:r>
+              <a:t> </a:t>
+            </a:r>
+            <a:r>
+              <a:rPr lang="en-US" altLang="zh-TW" dirty="0" smtClean="0"/>
+              <a:t>demo</a:t>
+            </a:r>
+          </a:p>
+          <a:p>
+            <a:r>
+              <a:rPr lang="en-US" altLang="zh-TW" dirty="0" smtClean="0"/>
+              <a:t>Next Step</a:t>
+            </a:r>
+            <a:endParaRPr lang="en-US" altLang="zh-TW" dirty="0" smtClean="0"/>
           </a:p>
           <a:p>
             <a:endParaRPr lang="zh-TW" altLang="en-US" dirty="0"/>
@@ -6944,8 +6984,8 @@
         </p:nvSpPr>
         <p:spPr>
           <a:xfrm>
-            <a:off x="9543359" y="5992297"/>
-            <a:ext cx="2137316" cy="369332"/>
+            <a:off x="4613550" y="2848151"/>
+            <a:ext cx="3341364" cy="646331"/>
           </a:xfrm>
           <a:prstGeom prst="rect">
             <a:avLst/>
@@ -6958,30 +6998,30 @@
           <a:lstStyle/>
           <a:p>
             <a:r>
-              <a:rPr lang="en-US" altLang="zh-TW" dirty="0"/>
-              <a:t>Date:2019-04-29(</a:t>
-            </a:r>
-            <a:r>
-              <a:rPr lang="zh-TW" altLang="en-US" dirty="0"/>
-              <a:t>一</a:t>
-            </a:r>
-            <a:r>
-              <a:rPr lang="en-US" altLang="zh-TW" dirty="0"/>
-              <a:t>)</a:t>
-            </a:r>
+              <a:rPr lang="en-US" altLang="zh-TW" sz="3600" dirty="0" smtClean="0"/>
+              <a:t>Date:2019-04-29</a:t>
+            </a:r>
+            <a:endParaRPr lang="en-US" altLang="zh-TW" sz="3600" dirty="0"/>
           </a:p>
         </p:txBody>
       </p:sp>
     </p:spTree>
     <p:extLst>
       <p:ext uri="{BB962C8B-B14F-4D97-AF65-F5344CB8AC3E}">
-        <p14:creationId xmlns:p14="http://schemas.microsoft.com/office/powerpoint/2010/main" val="2071944639"/>
+        <p14:creationId xmlns:p14="http://schemas.microsoft.com/office/powerpoint/2010/main" val="2497066518"/>
       </p:ext>
     </p:extLst>
   </p:cSld>
   <p:clrMapOvr>
     <a:masterClrMapping/>
   </p:clrMapOvr>
+  <p:timing>
+    <p:tnLst>
+      <p:par>
+        <p:cTn id="1" dur="indefinite" restart="never" nodeType="tmRoot"/>
+      </p:par>
+    </p:tnLst>
+  </p:timing>
 </p:sld>
 </file>
 
@@ -7054,8 +7094,8 @@
         </p:blipFill>
         <p:spPr>
           <a:xfrm>
-            <a:off x="6012721" y="618340"/>
-            <a:ext cx="5896798" cy="5792008"/>
+            <a:off x="6291618" y="1231460"/>
+            <a:ext cx="5590606" cy="5491257"/>
           </a:xfrm>
           <a:prstGeom prst="rect">
             <a:avLst/>
@@ -7076,16 +7116,149 @@
           </a:effectLst>
         </p:spPr>
       </p:pic>
+      <p:sp>
+        <p:nvSpPr>
+          <p:cNvPr id="6" name="矩形 5"/>
+          <p:cNvSpPr/>
+          <p:nvPr/>
+        </p:nvSpPr>
+        <p:spPr>
+          <a:xfrm>
+            <a:off x="987534" y="202363"/>
+            <a:ext cx="1552028" cy="923330"/>
+          </a:xfrm>
+          <a:prstGeom prst="rect">
+            <a:avLst/>
+          </a:prstGeom>
+          <a:noFill/>
+        </p:spPr>
+        <p:txBody>
+          <a:bodyPr wrap="none" lIns="91440" tIns="45720" rIns="91440" bIns="45720">
+            <a:spAutoFit/>
+          </a:bodyPr>
+          <a:lstStyle/>
+          <a:p>
+            <a:pPr algn="ctr"/>
+            <a:r>
+              <a:rPr lang="en-US" altLang="zh-TW" sz="5400" b="0" cap="none" spc="0" dirty="0" smtClean="0">
+                <a:ln w="0"/>
+                <a:solidFill>
+                  <a:srgbClr val="FF0000"/>
+                </a:solidFill>
+                <a:effectLst>
+                  <a:outerShdw blurRad="38100" dist="19050" dir="2700000" algn="tl" rotWithShape="0">
+                    <a:schemeClr val="dk1">
+                      <a:alpha val="40000"/>
+                    </a:schemeClr>
+                  </a:outerShdw>
+                </a:effectLst>
+              </a:rPr>
+              <a:t>OSM</a:t>
+            </a:r>
+            <a:endParaRPr lang="zh-TW" altLang="en-US" sz="5400" b="0" cap="none" spc="0" dirty="0">
+              <a:ln w="0"/>
+              <a:solidFill>
+                <a:srgbClr val="FF0000"/>
+              </a:solidFill>
+              <a:effectLst>
+                <a:outerShdw blurRad="38100" dist="19050" dir="2700000" algn="tl" rotWithShape="0">
+                  <a:schemeClr val="dk1">
+                    <a:alpha val="40000"/>
+                  </a:schemeClr>
+                </a:outerShdw>
+              </a:effectLst>
+            </a:endParaRPr>
+          </a:p>
+        </p:txBody>
+      </p:sp>
+      <p:sp>
+        <p:nvSpPr>
+          <p:cNvPr id="7" name="矩形 6"/>
+          <p:cNvSpPr/>
+          <p:nvPr/>
+        </p:nvSpPr>
+        <p:spPr>
+          <a:xfrm>
+            <a:off x="7440637" y="202363"/>
+            <a:ext cx="2844048" cy="923330"/>
+          </a:xfrm>
+          <a:prstGeom prst="rect">
+            <a:avLst/>
+          </a:prstGeom>
+          <a:noFill/>
+        </p:spPr>
+        <p:txBody>
+          <a:bodyPr wrap="none" lIns="91440" tIns="45720" rIns="91440" bIns="45720">
+            <a:spAutoFit/>
+          </a:bodyPr>
+          <a:lstStyle/>
+          <a:p>
+            <a:pPr algn="ctr"/>
+            <a:r>
+              <a:rPr lang="en-US" altLang="zh-TW" sz="5400" dirty="0" smtClean="0">
+                <a:ln w="0"/>
+                <a:solidFill>
+                  <a:srgbClr val="FF0000"/>
+                </a:solidFill>
+                <a:effectLst>
+                  <a:outerShdw blurRad="38100" dist="19050" dir="2700000" algn="tl" rotWithShape="0">
+                    <a:schemeClr val="dk1">
+                      <a:alpha val="40000"/>
+                    </a:schemeClr>
+                  </a:outerShdw>
+                </a:effectLst>
+              </a:rPr>
+              <a:t>Sumo-</a:t>
+            </a:r>
+            <a:r>
+              <a:rPr lang="en-US" altLang="zh-TW" sz="5400" dirty="0" err="1" smtClean="0">
+                <a:ln w="0"/>
+                <a:solidFill>
+                  <a:srgbClr val="FF0000"/>
+                </a:solidFill>
+                <a:effectLst>
+                  <a:outerShdw blurRad="38100" dist="19050" dir="2700000" algn="tl" rotWithShape="0">
+                    <a:schemeClr val="dk1">
+                      <a:alpha val="40000"/>
+                    </a:schemeClr>
+                  </a:outerShdw>
+                </a:effectLst>
+              </a:rPr>
+              <a:t>gui</a:t>
+            </a:r>
+            <a:endParaRPr lang="zh-TW" altLang="en-US" sz="5400" b="0" cap="none" spc="0" dirty="0">
+              <a:ln w="0"/>
+              <a:solidFill>
+                <a:srgbClr val="FF0000"/>
+              </a:solidFill>
+              <a:effectLst>
+                <a:outerShdw blurRad="38100" dist="19050" dir="2700000" algn="tl" rotWithShape="0">
+                  <a:schemeClr val="dk1">
+                    <a:alpha val="40000"/>
+                  </a:schemeClr>
+                </a:outerShdw>
+              </a:effectLst>
+            </a:endParaRPr>
+          </a:p>
+        </p:txBody>
+      </p:sp>
     </p:spTree>
     <p:extLst>
       <p:ext uri="{BB962C8B-B14F-4D97-AF65-F5344CB8AC3E}">
-        <p14:creationId xmlns:p14="http://schemas.microsoft.com/office/powerpoint/2010/main" val="1062718048"/>
+        <p14:creationId xmlns:p14="http://schemas.microsoft.com/office/powerpoint/2010/main" val="2920728148"/>
       </p:ext>
     </p:extLst>
   </p:cSld>
   <p:clrMapOvr>
     <a:masterClrMapping/>
   </p:clrMapOvr>
+  <p:timing>
+    <p:tnLst>
+      <p:par>
+        <p:cTn id="1" dur="indefinite" restart="never" nodeType="tmRoot"/>
+      </p:par>
+    </p:tnLst>
+  </p:timing>
 </p:sld>
 </file>
 
@@ -7164,19 +7337,32 @@
           </a:p>
           <a:p>
             <a:r>
+              <a:rPr lang="nb-NO" altLang="zh-TW" b="1" dirty="0"/>
+              <a:t>convert2D</a:t>
+            </a:r>
+            <a:r>
               <a:rPr lang="nb-NO" altLang="zh-TW" dirty="0"/>
-              <a:t>convert2D('496249899#1', 0.6669427384818771, (byte)0, false)</a:t>
-            </a:r>
-          </a:p>
-          <a:p>
-            <a:r>
-              <a:rPr lang="en-US" altLang="zh-TW" dirty="0" smtClean="0"/>
-              <a:t>Result:2467.9570221295635,6810.675393989347</a:t>
-            </a:r>
-            <a:endParaRPr lang="zh-TW" altLang="en-US" dirty="0"/>
-          </a:p>
-          <a:p>
-            <a:endParaRPr lang="en-US" altLang="zh-TW" dirty="0"/>
+              <a:t>('496249899#1', 0.6669427384818771, (byte)0, false)</a:t>
+            </a:r>
+          </a:p>
+          <a:p>
+            <a:r>
+              <a:rPr lang="en-US" altLang="zh-TW" dirty="0" smtClean="0"/>
+              <a:t>Result:</a:t>
+            </a:r>
+            <a:r>
+              <a:rPr lang="en-US" altLang="zh-TW" b="1" dirty="0" smtClean="0">
+                <a:solidFill>
+                  <a:srgbClr val="FF0000"/>
+                </a:solidFill>
+              </a:rPr>
+              <a:t>2467.957,6810.675</a:t>
+            </a:r>
+            <a:endParaRPr lang="en-US" altLang="zh-TW" b="1" dirty="0">
+              <a:solidFill>
+                <a:srgbClr val="FF0000"/>
+              </a:solidFill>
+            </a:endParaRPr>
           </a:p>
         </p:txBody>
       </p:sp>
@@ -7387,12 +7573,40 @@
           </a:p>
           <a:p>
             <a:r>
-              <a:rPr lang="en-US" altLang="zh-TW" dirty="0" err="1"/>
+              <a:rPr lang="en-US" altLang="zh-TW" b="1" dirty="0" err="1" smtClean="0"/>
               <a:t>convertRoad</a:t>
             </a:r>
             <a:r>
+              <a:rPr lang="en-US" altLang="zh-TW" b="1" dirty="0" smtClean="0"/>
+              <a:t>(</a:t>
+            </a:r>
+            <a:r>
+              <a:rPr lang="en-US" altLang="zh-TW" b="1" dirty="0" smtClean="0">
+                <a:solidFill>
+                  <a:srgbClr val="FF0000"/>
+                </a:solidFill>
+              </a:rPr>
+              <a:t>2467.957</a:t>
+            </a:r>
+            <a:r>
+              <a:rPr lang="en-US" altLang="zh-TW" dirty="0" smtClean="0"/>
+              <a:t>, </a:t>
+            </a:r>
+            <a:r>
+              <a:rPr lang="en-US" altLang="zh-TW" b="1" dirty="0" smtClean="0">
+                <a:solidFill>
+                  <a:srgbClr val="FF0000"/>
+                </a:solidFill>
+              </a:rPr>
+              <a:t>6810.675</a:t>
+            </a:r>
+            <a:r>
+              <a:rPr lang="en-US" altLang="zh-TW" dirty="0" smtClean="0"/>
+              <a:t> </a:t>
+            </a:r>
+            <a:r>
               <a:rPr lang="en-US" altLang="zh-TW" dirty="0"/>
-              <a:t>(2467.9570221295635, 6810.675393989347 , false, "ignoring</a:t>
+              <a:t>, false, "ignoring</a:t>
             </a:r>
             <a:r>
               <a:rPr lang="en-US" altLang="zh-TW" dirty="0" smtClean="0"/>
@@ -7415,13 +7629,20 @@
     </p:spTree>
     <p:extLst>
       <p:ext uri="{BB962C8B-B14F-4D97-AF65-F5344CB8AC3E}">
-        <p14:creationId xmlns:p14="http://schemas.microsoft.com/office/powerpoint/2010/main" val="3602109448"/>
+        <p14:creationId xmlns:p14="http://schemas.microsoft.com/office/powerpoint/2010/main" val="2455404965"/>
       </p:ext>
     </p:extLst>
   </p:cSld>
   <p:clrMapOvr>
     <a:masterClrMapping/>
   </p:clrMapOvr>
+  <p:timing>
+    <p:tnLst>
+      <p:par>
+        <p:cTn id="1" dur="indefinite" restart="never" nodeType="tmRoot"/>
+      </p:par>
+    </p:tnLst>
+  </p:timing>
 </p:sld>
 </file>
 
@@ -7442,9 +7663,75 @@
           <a:chExt cx="0" cy="0"/>
         </a:xfrm>
       </p:grpSpPr>
+      <p:sp>
+        <p:nvSpPr>
+          <p:cNvPr id="7" name="副標題 2"/>
+          <p:cNvSpPr>
+            <a:spLocks noGrp="1"/>
+          </p:cNvSpPr>
+          <p:nvPr>
+            <p:ph idx="1"/>
+          </p:nvPr>
+        </p:nvSpPr>
+        <p:spPr>
+          <a:xfrm>
+            <a:off x="6878432" y="1554185"/>
+            <a:ext cx="5190443" cy="2840394"/>
+          </a:xfrm>
+          <a:solidFill>
+            <a:schemeClr val="accent2">
+              <a:lumMod val="20000"/>
+              <a:lumOff val="80000"/>
+            </a:schemeClr>
+          </a:solidFill>
+        </p:spPr>
+        <p:txBody>
+          <a:bodyPr>
+            <a:normAutofit/>
+          </a:bodyPr>
+          <a:lstStyle/>
+          <a:p>
+            <a:r>
+              <a:rPr lang="en-US" altLang="zh-TW" dirty="0" smtClean="0"/>
+              <a:t>Sender address</a:t>
+            </a:r>
+          </a:p>
+          <a:p>
+            <a:r>
+              <a:rPr lang="en-US" altLang="zh-TW" dirty="0" smtClean="0"/>
+              <a:t>(X,Y)=(2989.02, 6765.41)</a:t>
+            </a:r>
+          </a:p>
+          <a:p>
+            <a:r>
+              <a:rPr lang="en-US" altLang="zh-TW" dirty="0" smtClean="0"/>
+              <a:t>(</a:t>
+            </a:r>
+            <a:r>
+              <a:rPr lang="en-US" altLang="zh-TW" dirty="0" err="1" smtClean="0"/>
+              <a:t>lon,lat</a:t>
+            </a:r>
+            <a:r>
+              <a:rPr lang="en-US" altLang="zh-TW" dirty="0" smtClean="0"/>
+              <a:t>)=(120.216786, 22.996446)</a:t>
+            </a:r>
+          </a:p>
+          <a:p>
+            <a:r>
+              <a:rPr lang="en-US" altLang="zh-TW" dirty="0" err="1" smtClean="0"/>
+              <a:t>edgeID</a:t>
+            </a:r>
+            <a:r>
+              <a:rPr lang="en-US" altLang="zh-TW" dirty="0" smtClean="0"/>
+              <a:t>:”-537706053#2”</a:t>
+            </a:r>
+            <a:endParaRPr lang="zh-TW" altLang="en-US" dirty="0"/>
+          </a:p>
+        </p:txBody>
+      </p:sp>
       <p:pic>
         <p:nvPicPr>
-          <p:cNvPr id="4" name="圖片 3"/>
+          <p:cNvPr id="2" name="圖片 1"/>
           <p:cNvPicPr>
             <a:picLocks noChangeAspect="1"/>
           </p:cNvPicPr>
@@ -7464,31 +7751,17 @@
         </p:blipFill>
         <p:spPr>
           <a:xfrm>
-            <a:off x="416410" y="187107"/>
-            <a:ext cx="6024284" cy="2734156"/>
+            <a:off x="340398" y="204716"/>
+            <a:ext cx="6314549" cy="2934270"/>
           </a:xfrm>
           <a:prstGeom prst="rect">
             <a:avLst/>
           </a:prstGeom>
-          <a:ln w="6350" cap="sq">
-            <a:solidFill>
-              <a:srgbClr val="000000"/>
-            </a:solidFill>
-            <a:prstDash val="solid"/>
-            <a:miter lim="800000"/>
-          </a:ln>
-          <a:effectLst>
-            <a:outerShdw blurRad="50800" dist="38100" dir="2700000" algn="tl" rotWithShape="0">
-              <a:srgbClr val="000000">
-                <a:alpha val="43000"/>
-              </a:srgbClr>
-            </a:outerShdw>
-          </a:effectLst>
         </p:spPr>
       </p:pic>
       <p:pic>
         <p:nvPicPr>
-          <p:cNvPr id="5" name="圖片 4"/>
+          <p:cNvPr id="3" name="圖片 2"/>
           <p:cNvPicPr>
             <a:picLocks noChangeAspect="1"/>
           </p:cNvPicPr>
@@ -7508,106 +7781,31 @@
         </p:blipFill>
         <p:spPr>
           <a:xfrm>
-            <a:off x="340397" y="3325091"/>
-            <a:ext cx="6100297" cy="3029170"/>
+            <a:off x="189725" y="3278805"/>
+            <a:ext cx="6615894" cy="3378602"/>
           </a:xfrm>
           <a:prstGeom prst="rect">
             <a:avLst/>
           </a:prstGeom>
-          <a:ln w="38100" cap="sq">
-            <a:solidFill>
-              <a:srgbClr val="000000"/>
-            </a:solidFill>
-            <a:prstDash val="solid"/>
-            <a:miter lim="800000"/>
-          </a:ln>
-          <a:effectLst>
-            <a:outerShdw blurRad="50800" dist="38100" dir="2700000" algn="tl" rotWithShape="0">
-              <a:srgbClr val="000000">
-                <a:alpha val="43000"/>
-              </a:srgbClr>
-            </a:outerShdw>
-          </a:effectLst>
         </p:spPr>
       </p:pic>
-      <p:sp>
-        <p:nvSpPr>
-          <p:cNvPr id="7" name="副標題 2"/>
-          <p:cNvSpPr>
-            <a:spLocks noGrp="1"/>
-          </p:cNvSpPr>
-          <p:nvPr>
-            <p:ph idx="1"/>
-          </p:nvPr>
-        </p:nvSpPr>
-        <p:spPr>
-          <a:xfrm>
-            <a:off x="6775862" y="345834"/>
-            <a:ext cx="5265717" cy="4835766"/>
-          </a:xfrm>
-        </p:spPr>
-        <p:txBody>
-          <a:bodyPr/>
-          <a:lstStyle/>
-          <a:p>
-            <a:r>
-              <a:rPr lang="en-US" altLang="zh-TW" dirty="0" smtClean="0"/>
-              <a:t>Sender address</a:t>
-            </a:r>
-          </a:p>
-          <a:p>
-            <a:r>
-              <a:rPr lang="en-US" altLang="zh-TW" dirty="0" smtClean="0"/>
-              <a:t>(X,Y)=(2989.02, 6765.41)</a:t>
-            </a:r>
-          </a:p>
-          <a:p>
-            <a:r>
-              <a:rPr lang="en-US" altLang="zh-TW" dirty="0" smtClean="0"/>
-              <a:t>(</a:t>
-            </a:r>
-            <a:r>
-              <a:rPr lang="en-US" altLang="zh-TW" dirty="0" err="1" smtClean="0"/>
-              <a:t>lon,lat</a:t>
-            </a:r>
-            <a:r>
-              <a:rPr lang="en-US" altLang="zh-TW" dirty="0" smtClean="0"/>
-              <a:t>)=(120.216786, 22.996446)</a:t>
-            </a:r>
-          </a:p>
-          <a:p>
-            <a:r>
-              <a:rPr lang="en-US" altLang="zh-TW" dirty="0" err="1" smtClean="0"/>
-              <a:t>LaneID</a:t>
-            </a:r>
-            <a:r>
-              <a:rPr lang="en-US" altLang="zh-TW" dirty="0" smtClean="0"/>
-              <a:t>:”-537706053#2_0”</a:t>
-            </a:r>
-          </a:p>
-          <a:p>
-            <a:r>
-              <a:rPr lang="en-US" altLang="zh-TW" dirty="0" err="1" smtClean="0"/>
-              <a:t>edgeID</a:t>
-            </a:r>
-            <a:r>
-              <a:rPr lang="en-US" altLang="zh-TW" dirty="0" smtClean="0"/>
-              <a:t>:”-537706053#2”</a:t>
-            </a:r>
-            <a:endParaRPr lang="zh-TW" altLang="en-US" dirty="0"/>
-          </a:p>
-        </p:txBody>
-      </p:sp>
     </p:spTree>
     <p:extLst>
       <p:ext uri="{BB962C8B-B14F-4D97-AF65-F5344CB8AC3E}">
-        <p14:creationId xmlns:p14="http://schemas.microsoft.com/office/powerpoint/2010/main" val="3467285449"/>
+        <p14:creationId xmlns:p14="http://schemas.microsoft.com/office/powerpoint/2010/main" val="2670762869"/>
       </p:ext>
     </p:extLst>
   </p:cSld>
   <p:clrMapOvr>
     <a:masterClrMapping/>
   </p:clrMapOvr>
+  <p:timing>
+    <p:tnLst>
+      <p:par>
+        <p:cTn id="1" dur="indefinite" restart="never" nodeType="tmRoot"/>
+      </p:par>
+    </p:tnLst>
+  </p:timing>
 </p:sld>
 </file>
 
@@ -7628,49 +7826,6 @@
           <a:chExt cx="0" cy="0"/>
         </a:xfrm>
       </p:grpSpPr>
-      <p:pic>
-        <p:nvPicPr>
-          <p:cNvPr id="4" name="圖片 3"/>
-          <p:cNvPicPr>
-            <a:picLocks noChangeAspect="1"/>
-          </p:cNvPicPr>
-          <p:nvPr/>
-        </p:nvPicPr>
-        <p:blipFill rotWithShape="1">
-          <a:blip r:embed="rId2">
-            <a:extLst>
-              <a:ext uri="{28A0092B-C50C-407E-A947-70E740481C1C}">
-                <a14:useLocalDpi xmlns:a14="http://schemas.microsoft.com/office/drawing/2010/main" val="0"/>
-              </a:ext>
-            </a:extLst>
-          </a:blip>
-          <a:srcRect l="19958" t="914" r="12683" b="32750"/>
-          <a:stretch/>
-        </p:blipFill>
-        <p:spPr>
-          <a:xfrm>
-            <a:off x="790223" y="203198"/>
-            <a:ext cx="11085688" cy="2856091"/>
-          </a:xfrm>
-          <a:prstGeom prst="rect">
-            <a:avLst/>
-          </a:prstGeom>
-          <a:ln w="38100" cap="sq">
-            <a:solidFill>
-              <a:srgbClr val="000000"/>
-            </a:solidFill>
-            <a:prstDash val="solid"/>
-            <a:miter lim="800000"/>
-          </a:ln>
-          <a:effectLst>
-            <a:outerShdw blurRad="50800" dist="38100" dir="2700000" algn="tl" rotWithShape="0">
-              <a:srgbClr val="000000">
-                <a:alpha val="43000"/>
-              </a:srgbClr>
-            </a:outerShdw>
-          </a:effectLst>
-        </p:spPr>
-      </p:pic>
       <p:sp>
         <p:nvSpPr>
           <p:cNvPr id="6" name="矩形 5"/>
@@ -7792,10 +7947,40 @@
           </a:p>
         </p:txBody>
       </p:sp>
+      <p:pic>
+        <p:nvPicPr>
+          <p:cNvPr id="2" name="圖片 1"/>
+          <p:cNvPicPr>
+            <a:picLocks noChangeAspect="1"/>
+          </p:cNvPicPr>
+          <p:nvPr/>
+        </p:nvPicPr>
+        <p:blipFill>
+          <a:blip r:embed="rId2">
+            <a:extLst>
+              <a:ext uri="{28A0092B-C50C-407E-A947-70E740481C1C}">
+                <a14:useLocalDpi xmlns:a14="http://schemas.microsoft.com/office/drawing/2010/main" val="0"/>
+              </a:ext>
+            </a:extLst>
+          </a:blip>
+          <a:stretch>
+            <a:fillRect/>
+          </a:stretch>
+        </p:blipFill>
+        <p:spPr>
+          <a:xfrm>
+            <a:off x="1180700" y="141242"/>
+            <a:ext cx="9519144" cy="3215927"/>
+          </a:xfrm>
+          <a:prstGeom prst="rect">
+            <a:avLst/>
+          </a:prstGeom>
+        </p:spPr>
+      </p:pic>
     </p:spTree>
     <p:extLst>
       <p:ext uri="{BB962C8B-B14F-4D97-AF65-F5344CB8AC3E}">
-        <p14:creationId xmlns:p14="http://schemas.microsoft.com/office/powerpoint/2010/main" val="4281189665"/>
+        <p14:creationId xmlns:p14="http://schemas.microsoft.com/office/powerpoint/2010/main" val="76301940"/>
       </p:ext>
     </p:extLst>
   </p:cSld>
@@ -7824,410 +8009,143 @@
       </p:grpSpPr>
       <p:sp>
         <p:nvSpPr>
-          <p:cNvPr id="4" name="矩形 3"/>
-          <p:cNvSpPr/>
-          <p:nvPr/>
+          <p:cNvPr id="2" name="標題 1"/>
+          <p:cNvSpPr>
+            <a:spLocks noGrp="1"/>
+          </p:cNvSpPr>
+          <p:nvPr>
+            <p:ph type="title"/>
+          </p:nvPr>
         </p:nvSpPr>
         <p:spPr>
           <a:xfrm>
-            <a:off x="575731" y="85925"/>
-            <a:ext cx="10114845" cy="584775"/>
+            <a:off x="293383" y="4403483"/>
+            <a:ext cx="4355736" cy="1151466"/>
+          </a:xfrm>
+        </p:spPr>
+        <p:txBody>
+          <a:bodyPr>
+            <a:noAutofit/>
+          </a:bodyPr>
+          <a:lstStyle/>
+          <a:p>
+            <a:r>
+              <a:rPr lang="en-US" altLang="zh-TW" sz="3200" b="1" dirty="0"/>
+              <a:t>The precision </a:t>
+            </a:r>
+            <a:r>
+              <a:rPr lang="en-US" altLang="zh-TW" sz="3200" b="1" dirty="0" smtClean="0"/>
+              <a:t>problem of </a:t>
+            </a:r>
+            <a:r>
+              <a:rPr lang="en-US" altLang="zh-TW" sz="3200" b="1" dirty="0" err="1"/>
+              <a:t>convertRoad</a:t>
+            </a:r>
+            <a:endParaRPr lang="zh-TW" altLang="en-US" sz="3200" b="1" dirty="0"/>
+          </a:p>
+        </p:txBody>
+      </p:sp>
+      <p:pic>
+        <p:nvPicPr>
+          <p:cNvPr id="3" name="圖片 2"/>
+          <p:cNvPicPr>
+            <a:picLocks noChangeAspect="1"/>
+          </p:cNvPicPr>
+          <p:nvPr/>
+        </p:nvPicPr>
+        <p:blipFill rotWithShape="1">
+          <a:blip r:embed="rId2">
+            <a:extLst>
+              <a:ext uri="{28A0092B-C50C-407E-A947-70E740481C1C}">
+                <a14:useLocalDpi xmlns:a14="http://schemas.microsoft.com/office/drawing/2010/main" val="0"/>
+              </a:ext>
+            </a:extLst>
+          </a:blip>
+          <a:srcRect l="15377" t="12668" r="8796" b="13737"/>
+          <a:stretch/>
+        </p:blipFill>
+        <p:spPr>
+          <a:xfrm>
+            <a:off x="293383" y="1123720"/>
+            <a:ext cx="4785395" cy="3187072"/>
           </a:xfrm>
           <a:prstGeom prst="rect">
             <a:avLst/>
           </a:prstGeom>
+          <a:ln w="38100" cap="sq">
+            <a:solidFill>
+              <a:srgbClr val="000000"/>
+            </a:solidFill>
+            <a:prstDash val="solid"/>
+            <a:miter lim="800000"/>
+          </a:ln>
+          <a:effectLst>
+            <a:outerShdw blurRad="50800" dist="38100" dir="2700000" algn="tl" rotWithShape="0">
+              <a:srgbClr val="000000">
+                <a:alpha val="43000"/>
+              </a:srgbClr>
+            </a:outerShdw>
+          </a:effectLst>
         </p:spPr>
-        <p:txBody>
-          <a:bodyPr wrap="square">
-            <a:spAutoFit/>
-          </a:bodyPr>
-          <a:lstStyle/>
-          <a:p>
-            <a:r>
-              <a:rPr lang="en-US" altLang="zh-TW" sz="3200" dirty="0" err="1" smtClean="0"/>
-              <a:t>convertRoad</a:t>
-            </a:r>
-            <a:r>
-              <a:rPr lang="en-US" altLang="zh-TW" sz="3200" dirty="0" smtClean="0"/>
-              <a:t>(1387, 6497 </a:t>
-            </a:r>
-            <a:r>
-              <a:rPr lang="en-US" altLang="zh-TW" sz="3200" dirty="0"/>
-              <a:t>, false, "ignoring")</a:t>
-            </a:r>
-          </a:p>
-        </p:txBody>
-      </p:sp>
-      <p:sp>
-        <p:nvSpPr>
-          <p:cNvPr id="5" name="矩形 4"/>
-          <p:cNvSpPr/>
+      </p:pic>
+      <p:pic>
+        <p:nvPicPr>
+          <p:cNvPr id="4" name="圖片 3"/>
+          <p:cNvPicPr>
+            <a:picLocks noChangeAspect="1"/>
+          </p:cNvPicPr>
           <p:nvPr/>
-        </p:nvSpPr>
+        </p:nvPicPr>
+        <p:blipFill>
+          <a:blip r:embed="rId3">
+            <a:extLst>
+              <a:ext uri="{28A0092B-C50C-407E-A947-70E740481C1C}">
+                <a14:useLocalDpi xmlns:a14="http://schemas.microsoft.com/office/drawing/2010/main" val="0"/>
+              </a:ext>
+            </a:extLst>
+          </a:blip>
+          <a:stretch>
+            <a:fillRect/>
+          </a:stretch>
+        </p:blipFill>
         <p:spPr>
           <a:xfrm>
-            <a:off x="1042808" y="670700"/>
-            <a:ext cx="10021710" cy="1477328"/>
+            <a:off x="5431323" y="231353"/>
+            <a:ext cx="5938084" cy="5510131"/>
           </a:xfrm>
-          <a:prstGeom prst="rect">
+          <a:prstGeom prst="ellipse">
             <a:avLst/>
           </a:prstGeom>
-          <a:solidFill>
-            <a:schemeClr val="accent2">
-              <a:lumMod val="40000"/>
-              <a:lumOff val="60000"/>
-            </a:schemeClr>
-          </a:solidFill>
+          <a:ln w="63500" cap="rnd">
+            <a:solidFill>
+              <a:srgbClr val="333333"/>
+            </a:solidFill>
+          </a:ln>
+          <a:effectLst>
+            <a:outerShdw blurRad="381000" dist="292100" dir="5400000" sx="-80000" sy="-18000" rotWithShape="0">
+              <a:srgbClr val="000000">
+                <a:alpha val="22000"/>
+              </a:srgbClr>
+            </a:outerShdw>
+          </a:effectLst>
+          <a:scene3d>
+            <a:camera prst="orthographicFront"/>
+            <a:lightRig rig="contrasting" dir="t">
+              <a:rot lat="0" lon="0" rev="3000000"/>
+            </a:lightRig>
+          </a:scene3d>
+          <a:sp3d contourW="7620">
+            <a:bevelT w="95250" h="31750"/>
+            <a:contourClr>
+              <a:srgbClr val="333333"/>
+            </a:contourClr>
+          </a:sp3d>
         </p:spPr>
-        <p:txBody>
-          <a:bodyPr wrap="square">
-            <a:spAutoFit/>
-          </a:bodyPr>
-          <a:lstStyle/>
-          <a:p>
-            <a:r>
-              <a:rPr lang="zh-TW" altLang="en-US" dirty="0"/>
-              <a:t>&lt;edge id=":1235793433_4" function="internal"</a:t>
-            </a:r>
-            <a:r>
-              <a:rPr lang="zh-TW" altLang="en-US" dirty="0" smtClean="0"/>
-              <a:t>&gt;</a:t>
-            </a:r>
-            <a:endParaRPr lang="en-US" altLang="zh-TW" dirty="0"/>
-          </a:p>
-          <a:p>
-            <a:r>
-              <a:rPr lang="en-US" altLang="zh-TW" dirty="0" smtClean="0"/>
-              <a:t>	</a:t>
-            </a:r>
-            <a:r>
-              <a:rPr lang="zh-TW" altLang="en-US" dirty="0" smtClean="0"/>
-              <a:t>&lt;lane </a:t>
-            </a:r>
-            <a:r>
-              <a:rPr lang="zh-TW" altLang="en-US" dirty="0"/>
-              <a:t>id=":1235793433_4_0" index="0" disallow="tram rail_urban rail rail_electric ship" </a:t>
-            </a:r>
-            <a:r>
-              <a:rPr lang="en-US" altLang="zh-TW" dirty="0" smtClean="0"/>
-              <a:t>	</a:t>
-            </a:r>
-            <a:r>
-              <a:rPr lang="zh-TW" altLang="en-US" dirty="0" smtClean="0"/>
-              <a:t>speed</a:t>
-            </a:r>
-            <a:r>
-              <a:rPr lang="zh-TW" altLang="en-US" dirty="0"/>
-              <a:t>="13.89" length="11.04" </a:t>
-            </a:r>
-            <a:r>
-              <a:rPr lang="zh-TW" altLang="en-US" dirty="0" smtClean="0"/>
-              <a:t>shape</a:t>
-            </a:r>
-            <a:r>
-              <a:rPr lang="zh-TW" altLang="en-US" dirty="0"/>
-              <a:t>="</a:t>
-            </a:r>
-            <a:r>
-              <a:rPr lang="zh-TW" altLang="en-US" b="1" dirty="0"/>
-              <a:t>1388.94,6495.41 </a:t>
-            </a:r>
-            <a:endParaRPr lang="en-US" altLang="zh-TW" b="1" dirty="0" smtClean="0"/>
-          </a:p>
-          <a:p>
-            <a:r>
-              <a:rPr lang="en-US" altLang="zh-TW" b="1" dirty="0" smtClean="0"/>
-              <a:t>					</a:t>
-            </a:r>
-            <a:r>
-              <a:rPr lang="zh-TW" altLang="en-US" b="1" dirty="0" smtClean="0"/>
-              <a:t>1391</a:t>
-            </a:r>
-            <a:r>
-              <a:rPr lang="zh-TW" altLang="en-US" b="1" dirty="0"/>
-              <a:t>.56,6506.13</a:t>
-            </a:r>
-            <a:r>
-              <a:rPr lang="zh-TW" altLang="en-US" dirty="0"/>
-              <a:t>"/&gt; </a:t>
-            </a:r>
-            <a:endParaRPr lang="en-US" altLang="zh-TW" dirty="0" smtClean="0"/>
-          </a:p>
-          <a:p>
-            <a:r>
-              <a:rPr lang="zh-TW" altLang="en-US" dirty="0" smtClean="0"/>
-              <a:t>&lt;</a:t>
-            </a:r>
-            <a:r>
-              <a:rPr lang="zh-TW" altLang="en-US" dirty="0"/>
-              <a:t>/edge</a:t>
-            </a:r>
-            <a:r>
-              <a:rPr lang="zh-TW" altLang="en-US" dirty="0" smtClean="0"/>
-              <a:t>&gt;</a:t>
-            </a:r>
-            <a:endParaRPr lang="zh-TW" altLang="en-US" dirty="0"/>
-          </a:p>
-        </p:txBody>
-      </p:sp>
-      <p:sp>
-        <p:nvSpPr>
-          <p:cNvPr id="6" name="矩形 5"/>
-          <p:cNvSpPr/>
-          <p:nvPr/>
-        </p:nvSpPr>
-        <p:spPr>
-          <a:xfrm>
-            <a:off x="1042808" y="2286527"/>
-            <a:ext cx="10380139" cy="2308324"/>
-          </a:xfrm>
-          <a:prstGeom prst="rect">
-            <a:avLst/>
-          </a:prstGeom>
-          <a:solidFill>
-            <a:schemeClr val="accent4">
-              <a:lumMod val="60000"/>
-              <a:lumOff val="40000"/>
-            </a:schemeClr>
-          </a:solidFill>
-        </p:spPr>
-        <p:txBody>
-          <a:bodyPr wrap="square">
-            <a:spAutoFit/>
-          </a:bodyPr>
-          <a:lstStyle/>
-          <a:p>
-            <a:endParaRPr lang="en-US" altLang="zh-TW" dirty="0"/>
-          </a:p>
-          <a:p>
-            <a:r>
-              <a:rPr lang="zh-TW" altLang="en-US" dirty="0" smtClean="0"/>
-              <a:t>&lt;edge </a:t>
-            </a:r>
-            <a:r>
-              <a:rPr lang="zh-TW" altLang="en-US" dirty="0"/>
-              <a:t>id=":1235793433_5" function="internal"&gt; </a:t>
-            </a:r>
-            <a:endParaRPr lang="en-US" altLang="zh-TW" dirty="0" smtClean="0"/>
-          </a:p>
-          <a:p>
-            <a:r>
-              <a:rPr lang="en-US" altLang="zh-TW" dirty="0"/>
-              <a:t>	</a:t>
-            </a:r>
-            <a:r>
-              <a:rPr lang="zh-TW" altLang="en-US" dirty="0" smtClean="0"/>
-              <a:t>&lt;lane </a:t>
-            </a:r>
-            <a:r>
-              <a:rPr lang="zh-TW" altLang="en-US" dirty="0"/>
-              <a:t>id=":1235793433_5_0" index="0" disallow="tram rail_urban rail rail_electric ship" </a:t>
-            </a:r>
-            <a:r>
-              <a:rPr lang="en-US" altLang="zh-TW" dirty="0" smtClean="0"/>
-              <a:t>	</a:t>
-            </a:r>
-            <a:r>
-              <a:rPr lang="zh-TW" altLang="en-US" dirty="0" smtClean="0"/>
-              <a:t>speed</a:t>
-            </a:r>
-            <a:r>
-              <a:rPr lang="zh-TW" altLang="en-US" dirty="0"/>
-              <a:t>="3.65" length="2.34" shape="</a:t>
-            </a:r>
-            <a:r>
-              <a:rPr lang="zh-TW" altLang="en-US" b="1" dirty="0"/>
-              <a:t>1388.94,6495.41 </a:t>
-            </a:r>
-            <a:endParaRPr lang="en-US" altLang="zh-TW" b="1" dirty="0" smtClean="0"/>
-          </a:p>
-          <a:p>
-            <a:r>
-              <a:rPr lang="en-US" altLang="zh-TW" b="1" dirty="0"/>
-              <a:t>	</a:t>
-            </a:r>
-            <a:r>
-              <a:rPr lang="en-US" altLang="zh-TW" b="1" dirty="0" smtClean="0"/>
-              <a:t>			             </a:t>
-            </a:r>
-            <a:r>
-              <a:rPr lang="zh-TW" altLang="en-US" b="1" dirty="0" smtClean="0"/>
-              <a:t>1388</a:t>
-            </a:r>
-            <a:r>
-              <a:rPr lang="zh-TW" altLang="en-US" b="1" dirty="0"/>
-              <a:t>.44,6496.76 </a:t>
-            </a:r>
-            <a:endParaRPr lang="en-US" altLang="zh-TW" b="1" dirty="0" smtClean="0"/>
-          </a:p>
-          <a:p>
-            <a:r>
-              <a:rPr lang="en-US" altLang="zh-TW" b="1" dirty="0"/>
-              <a:t>	</a:t>
-            </a:r>
-            <a:r>
-              <a:rPr lang="en-US" altLang="zh-TW" b="1" dirty="0" smtClean="0"/>
-              <a:t>			             </a:t>
-            </a:r>
-            <a:r>
-              <a:rPr lang="zh-TW" altLang="en-US" b="1" dirty="0" smtClean="0"/>
-              <a:t>1387</a:t>
-            </a:r>
-            <a:r>
-              <a:rPr lang="zh-TW" altLang="en-US" b="1" dirty="0"/>
-              <a:t>.76,6497.34</a:t>
-            </a:r>
-            <a:r>
-              <a:rPr lang="zh-TW" altLang="en-US" dirty="0"/>
-              <a:t>"/&gt; </a:t>
-            </a:r>
-            <a:endParaRPr lang="en-US" altLang="zh-TW" dirty="0" smtClean="0"/>
-          </a:p>
-          <a:p>
-            <a:r>
-              <a:rPr lang="zh-TW" altLang="en-US" dirty="0" smtClean="0"/>
-              <a:t>&lt;</a:t>
-            </a:r>
-            <a:r>
-              <a:rPr lang="zh-TW" altLang="en-US" dirty="0"/>
-              <a:t>/edge&gt; </a:t>
-            </a:r>
-            <a:endParaRPr lang="en-US" altLang="zh-TW" dirty="0" smtClean="0"/>
-          </a:p>
-          <a:p>
-            <a:endParaRPr lang="en-US" altLang="zh-TW" dirty="0"/>
-          </a:p>
-        </p:txBody>
-      </p:sp>
-      <p:sp>
-        <p:nvSpPr>
-          <p:cNvPr id="7" name="矩形 6"/>
-          <p:cNvSpPr/>
-          <p:nvPr/>
-        </p:nvSpPr>
-        <p:spPr>
-          <a:xfrm>
-            <a:off x="944032" y="4733350"/>
-            <a:ext cx="10377308" cy="2031325"/>
-          </a:xfrm>
-          <a:prstGeom prst="rect">
-            <a:avLst/>
-          </a:prstGeom>
-          <a:solidFill>
-            <a:schemeClr val="accent1">
-              <a:lumMod val="40000"/>
-              <a:lumOff val="60000"/>
-            </a:schemeClr>
-          </a:solidFill>
-        </p:spPr>
-        <p:txBody>
-          <a:bodyPr wrap="square">
-            <a:spAutoFit/>
-          </a:bodyPr>
-          <a:lstStyle/>
-          <a:p>
-            <a:endParaRPr lang="en-US" altLang="zh-TW" dirty="0"/>
-          </a:p>
-          <a:p>
-            <a:r>
-              <a:rPr lang="zh-TW" altLang="en-US" dirty="0" smtClean="0"/>
-              <a:t>&lt;edge </a:t>
-            </a:r>
-            <a:r>
-              <a:rPr lang="zh-TW" altLang="en-US" dirty="0"/>
-              <a:t>id=":1235793433_11" function="internal"&gt; </a:t>
-            </a:r>
-            <a:endParaRPr lang="en-US" altLang="zh-TW" dirty="0" smtClean="0"/>
-          </a:p>
-          <a:p>
-            <a:r>
-              <a:rPr lang="en-US" altLang="zh-TW" dirty="0"/>
-              <a:t>	</a:t>
-            </a:r>
-            <a:r>
-              <a:rPr lang="zh-TW" altLang="en-US" dirty="0" smtClean="0"/>
-              <a:t>&lt;lane </a:t>
-            </a:r>
-            <a:r>
-              <a:rPr lang="zh-TW" altLang="en-US" dirty="0"/>
-              <a:t>id=":1235793433_11_0" index="0" disallow="tram rail_urban rail rail_electric ship" </a:t>
-            </a:r>
-            <a:r>
-              <a:rPr lang="en-US" altLang="zh-TW" dirty="0" smtClean="0"/>
-              <a:t>	</a:t>
-            </a:r>
-            <a:r>
-              <a:rPr lang="zh-TW" altLang="en-US" dirty="0" smtClean="0"/>
-              <a:t>speed</a:t>
-            </a:r>
-            <a:r>
-              <a:rPr lang="zh-TW" altLang="en-US" dirty="0"/>
-              <a:t>="3.65" length="2.34" shape="</a:t>
-            </a:r>
-            <a:r>
-              <a:rPr lang="zh-TW" altLang="en-US" b="1" dirty="0"/>
-              <a:t>1387.76,6497.34 </a:t>
-            </a:r>
-            <a:endParaRPr lang="en-US" altLang="zh-TW" b="1" dirty="0" smtClean="0"/>
-          </a:p>
-          <a:p>
-            <a:r>
-              <a:rPr lang="en-US" altLang="zh-TW" b="1" dirty="0"/>
-              <a:t>	</a:t>
-            </a:r>
-            <a:r>
-              <a:rPr lang="en-US" altLang="zh-TW" b="1" dirty="0" smtClean="0"/>
-              <a:t>			             </a:t>
-            </a:r>
-            <a:r>
-              <a:rPr lang="zh-TW" altLang="en-US" b="1" dirty="0" smtClean="0"/>
-              <a:t>1386</a:t>
-            </a:r>
-            <a:r>
-              <a:rPr lang="zh-TW" altLang="en-US" b="1" dirty="0"/>
-              <a:t>.89,6497.13 </a:t>
-            </a:r>
-            <a:endParaRPr lang="en-US" altLang="zh-TW" b="1" dirty="0" smtClean="0"/>
-          </a:p>
-          <a:p>
-            <a:r>
-              <a:rPr lang="en-US" altLang="zh-TW" b="1" dirty="0"/>
-              <a:t>	</a:t>
-            </a:r>
-            <a:r>
-              <a:rPr lang="en-US" altLang="zh-TW" b="1" dirty="0" smtClean="0"/>
-              <a:t>			             </a:t>
-            </a:r>
-            <a:r>
-              <a:rPr lang="zh-TW" altLang="en-US" b="1" dirty="0" smtClean="0"/>
-              <a:t>1385</a:t>
-            </a:r>
-            <a:r>
-              <a:rPr lang="zh-TW" altLang="en-US" b="1" dirty="0"/>
-              <a:t>.83,6496.15</a:t>
-            </a:r>
-            <a:r>
-              <a:rPr lang="zh-TW" altLang="en-US" dirty="0"/>
-              <a:t>"/&gt; </a:t>
-            </a:r>
-            <a:endParaRPr lang="en-US" altLang="zh-TW" dirty="0" smtClean="0"/>
-          </a:p>
-          <a:p>
-            <a:r>
-              <a:rPr lang="zh-TW" altLang="en-US" dirty="0" smtClean="0"/>
-              <a:t>&lt;</a:t>
-            </a:r>
-            <a:r>
-              <a:rPr lang="zh-TW" altLang="en-US" dirty="0"/>
-              <a:t>/edge&gt;</a:t>
-            </a:r>
-          </a:p>
-        </p:txBody>
-      </p:sp>
+      </p:pic>
     </p:spTree>
     <p:extLst>
       <p:ext uri="{BB962C8B-B14F-4D97-AF65-F5344CB8AC3E}">
-        <p14:creationId xmlns:p14="http://schemas.microsoft.com/office/powerpoint/2010/main" val="1282952579"/>
+        <p14:creationId xmlns:p14="http://schemas.microsoft.com/office/powerpoint/2010/main" val="2477588086"/>
       </p:ext>
     </p:extLst>
   </p:cSld>
@@ -8256,90 +8174,410 @@
       </p:grpSpPr>
       <p:sp>
         <p:nvSpPr>
-          <p:cNvPr id="2" name="標題 1"/>
-          <p:cNvSpPr>
-            <a:spLocks noGrp="1"/>
-          </p:cNvSpPr>
-          <p:nvPr>
-            <p:ph type="title"/>
-          </p:nvPr>
+          <p:cNvPr id="4" name="矩形 3"/>
+          <p:cNvSpPr/>
+          <p:nvPr/>
         </p:nvSpPr>
         <p:spPr>
           <a:xfrm>
-            <a:off x="9699977" y="1693334"/>
-            <a:ext cx="2356556" cy="1151466"/>
-          </a:xfrm>
-        </p:spPr>
-        <p:txBody>
-          <a:bodyPr>
-            <a:noAutofit/>
-          </a:bodyPr>
-          <a:lstStyle/>
-          <a:p>
-            <a:r>
-              <a:rPr lang="en-US" altLang="zh-TW" sz="3200" b="1" dirty="0"/>
-              <a:t>The precision </a:t>
-            </a:r>
-            <a:r>
-              <a:rPr lang="en-US" altLang="zh-TW" sz="3200" b="1" dirty="0" smtClean="0"/>
-              <a:t>problem of </a:t>
-            </a:r>
-            <a:r>
-              <a:rPr lang="en-US" altLang="zh-TW" sz="3200" b="1" dirty="0" err="1"/>
-              <a:t>convertRoad</a:t>
-            </a:r>
-            <a:endParaRPr lang="zh-TW" altLang="en-US" sz="3200" b="1" dirty="0"/>
-          </a:p>
-        </p:txBody>
-      </p:sp>
-      <p:pic>
-        <p:nvPicPr>
-          <p:cNvPr id="3" name="圖片 2"/>
-          <p:cNvPicPr>
-            <a:picLocks noChangeAspect="1"/>
-          </p:cNvPicPr>
-          <p:nvPr/>
-        </p:nvPicPr>
-        <p:blipFill>
-          <a:blip r:embed="rId2">
-            <a:extLst>
-              <a:ext uri="{28A0092B-C50C-407E-A947-70E740481C1C}">
-                <a14:useLocalDpi xmlns:a14="http://schemas.microsoft.com/office/drawing/2010/main" val="0"/>
-              </a:ext>
-            </a:extLst>
-          </a:blip>
-          <a:stretch>
-            <a:fillRect/>
-          </a:stretch>
-        </p:blipFill>
-        <p:spPr>
-          <a:xfrm>
-            <a:off x="144808" y="309111"/>
-            <a:ext cx="9337859" cy="6407675"/>
+            <a:off x="575731" y="85925"/>
+            <a:ext cx="10114845" cy="584775"/>
           </a:xfrm>
           <a:prstGeom prst="rect">
             <a:avLst/>
           </a:prstGeom>
-          <a:ln w="38100" cap="sq">
-            <a:solidFill>
-              <a:srgbClr val="000000"/>
-            </a:solidFill>
-            <a:prstDash val="solid"/>
-            <a:miter lim="800000"/>
-          </a:ln>
-          <a:effectLst>
-            <a:outerShdw blurRad="50800" dist="38100" dir="2700000" algn="tl" rotWithShape="0">
-              <a:srgbClr val="000000">
-                <a:alpha val="43000"/>
-              </a:srgbClr>
-            </a:outerShdw>
-          </a:effectLst>
         </p:spPr>
-      </p:pic>
+        <p:txBody>
+          <a:bodyPr wrap="square">
+            <a:spAutoFit/>
+          </a:bodyPr>
+          <a:lstStyle/>
+          <a:p>
+            <a:r>
+              <a:rPr lang="en-US" altLang="zh-TW" sz="3200" dirty="0" err="1" smtClean="0"/>
+              <a:t>convertRoad</a:t>
+            </a:r>
+            <a:r>
+              <a:rPr lang="en-US" altLang="zh-TW" sz="3200" dirty="0" smtClean="0"/>
+              <a:t>(1387, 6497 </a:t>
+            </a:r>
+            <a:r>
+              <a:rPr lang="en-US" altLang="zh-TW" sz="3200" dirty="0"/>
+              <a:t>, false, "ignoring")</a:t>
+            </a:r>
+          </a:p>
+        </p:txBody>
+      </p:sp>
+      <p:sp>
+        <p:nvSpPr>
+          <p:cNvPr id="5" name="矩形 4"/>
+          <p:cNvSpPr/>
+          <p:nvPr/>
+        </p:nvSpPr>
+        <p:spPr>
+          <a:xfrm>
+            <a:off x="1042808" y="670700"/>
+            <a:ext cx="10021710" cy="1477328"/>
+          </a:xfrm>
+          <a:prstGeom prst="rect">
+            <a:avLst/>
+          </a:prstGeom>
+          <a:solidFill>
+            <a:schemeClr val="accent2">
+              <a:lumMod val="40000"/>
+              <a:lumOff val="60000"/>
+            </a:schemeClr>
+          </a:solidFill>
+        </p:spPr>
+        <p:txBody>
+          <a:bodyPr wrap="square">
+            <a:spAutoFit/>
+          </a:bodyPr>
+          <a:lstStyle/>
+          <a:p>
+            <a:r>
+              <a:rPr lang="zh-TW" altLang="en-US" dirty="0"/>
+              <a:t>&lt;edge id=":1235793433_4" function="internal"</a:t>
+            </a:r>
+            <a:r>
+              <a:rPr lang="zh-TW" altLang="en-US" dirty="0" smtClean="0"/>
+              <a:t>&gt;</a:t>
+            </a:r>
+            <a:endParaRPr lang="en-US" altLang="zh-TW" dirty="0"/>
+          </a:p>
+          <a:p>
+            <a:r>
+              <a:rPr lang="en-US" altLang="zh-TW" dirty="0" smtClean="0"/>
+              <a:t>	</a:t>
+            </a:r>
+            <a:r>
+              <a:rPr lang="zh-TW" altLang="en-US" dirty="0" smtClean="0"/>
+              <a:t>&lt;lane </a:t>
+            </a:r>
+            <a:r>
+              <a:rPr lang="zh-TW" altLang="en-US" dirty="0"/>
+              <a:t>id=":1235793433_4_0" index="0" disallow="tram rail_urban rail rail_electric ship" </a:t>
+            </a:r>
+            <a:r>
+              <a:rPr lang="en-US" altLang="zh-TW" dirty="0" smtClean="0"/>
+              <a:t>	</a:t>
+            </a:r>
+            <a:r>
+              <a:rPr lang="zh-TW" altLang="en-US" dirty="0" smtClean="0"/>
+              <a:t>speed</a:t>
+            </a:r>
+            <a:r>
+              <a:rPr lang="zh-TW" altLang="en-US" dirty="0"/>
+              <a:t>="13.89" length="11.04" </a:t>
+            </a:r>
+            <a:r>
+              <a:rPr lang="zh-TW" altLang="en-US" dirty="0" smtClean="0"/>
+              <a:t>shape</a:t>
+            </a:r>
+            <a:r>
+              <a:rPr lang="zh-TW" altLang="en-US" dirty="0"/>
+              <a:t>="</a:t>
+            </a:r>
+            <a:r>
+              <a:rPr lang="zh-TW" altLang="en-US" b="1" dirty="0"/>
+              <a:t>1388.94,6495.41 </a:t>
+            </a:r>
+            <a:endParaRPr lang="en-US" altLang="zh-TW" b="1" dirty="0" smtClean="0"/>
+          </a:p>
+          <a:p>
+            <a:r>
+              <a:rPr lang="en-US" altLang="zh-TW" b="1" dirty="0" smtClean="0"/>
+              <a:t>					</a:t>
+            </a:r>
+            <a:r>
+              <a:rPr lang="zh-TW" altLang="en-US" b="1" dirty="0" smtClean="0"/>
+              <a:t>1391</a:t>
+            </a:r>
+            <a:r>
+              <a:rPr lang="zh-TW" altLang="en-US" b="1" dirty="0"/>
+              <a:t>.56,6506.13</a:t>
+            </a:r>
+            <a:r>
+              <a:rPr lang="zh-TW" altLang="en-US" dirty="0"/>
+              <a:t>"/&gt; </a:t>
+            </a:r>
+            <a:endParaRPr lang="en-US" altLang="zh-TW" dirty="0" smtClean="0"/>
+          </a:p>
+          <a:p>
+            <a:r>
+              <a:rPr lang="zh-TW" altLang="en-US" dirty="0" smtClean="0"/>
+              <a:t>&lt;</a:t>
+            </a:r>
+            <a:r>
+              <a:rPr lang="zh-TW" altLang="en-US" dirty="0"/>
+              <a:t>/edge</a:t>
+            </a:r>
+            <a:r>
+              <a:rPr lang="zh-TW" altLang="en-US" dirty="0" smtClean="0"/>
+              <a:t>&gt;</a:t>
+            </a:r>
+            <a:endParaRPr lang="zh-TW" altLang="en-US" dirty="0"/>
+          </a:p>
+        </p:txBody>
+      </p:sp>
+      <p:sp>
+        <p:nvSpPr>
+          <p:cNvPr id="6" name="矩形 5"/>
+          <p:cNvSpPr/>
+          <p:nvPr/>
+        </p:nvSpPr>
+        <p:spPr>
+          <a:xfrm>
+            <a:off x="1042808" y="2286527"/>
+            <a:ext cx="10380139" cy="2308324"/>
+          </a:xfrm>
+          <a:prstGeom prst="rect">
+            <a:avLst/>
+          </a:prstGeom>
+          <a:solidFill>
+            <a:schemeClr val="accent4">
+              <a:lumMod val="60000"/>
+              <a:lumOff val="40000"/>
+            </a:schemeClr>
+          </a:solidFill>
+        </p:spPr>
+        <p:txBody>
+          <a:bodyPr wrap="square">
+            <a:spAutoFit/>
+          </a:bodyPr>
+          <a:lstStyle/>
+          <a:p>
+            <a:endParaRPr lang="en-US" altLang="zh-TW" dirty="0"/>
+          </a:p>
+          <a:p>
+            <a:r>
+              <a:rPr lang="zh-TW" altLang="en-US" dirty="0" smtClean="0"/>
+              <a:t>&lt;edge </a:t>
+            </a:r>
+            <a:r>
+              <a:rPr lang="zh-TW" altLang="en-US" dirty="0"/>
+              <a:t>id=":1235793433_5" function="internal"&gt; </a:t>
+            </a:r>
+            <a:endParaRPr lang="en-US" altLang="zh-TW" dirty="0" smtClean="0"/>
+          </a:p>
+          <a:p>
+            <a:r>
+              <a:rPr lang="en-US" altLang="zh-TW" dirty="0"/>
+              <a:t>	</a:t>
+            </a:r>
+            <a:r>
+              <a:rPr lang="zh-TW" altLang="en-US" dirty="0" smtClean="0"/>
+              <a:t>&lt;lane </a:t>
+            </a:r>
+            <a:r>
+              <a:rPr lang="zh-TW" altLang="en-US" dirty="0"/>
+              <a:t>id=":1235793433_5_0" index="0" disallow="tram rail_urban rail rail_electric ship" </a:t>
+            </a:r>
+            <a:r>
+              <a:rPr lang="en-US" altLang="zh-TW" dirty="0" smtClean="0"/>
+              <a:t>	</a:t>
+            </a:r>
+            <a:r>
+              <a:rPr lang="zh-TW" altLang="en-US" dirty="0" smtClean="0"/>
+              <a:t>speed</a:t>
+            </a:r>
+            <a:r>
+              <a:rPr lang="zh-TW" altLang="en-US" dirty="0"/>
+              <a:t>="3.65" length="2.34" shape="</a:t>
+            </a:r>
+            <a:r>
+              <a:rPr lang="zh-TW" altLang="en-US" b="1" dirty="0"/>
+              <a:t>1388.94,6495.41 </a:t>
+            </a:r>
+            <a:endParaRPr lang="en-US" altLang="zh-TW" b="1" dirty="0" smtClean="0"/>
+          </a:p>
+          <a:p>
+            <a:r>
+              <a:rPr lang="en-US" altLang="zh-TW" b="1" dirty="0"/>
+              <a:t>	</a:t>
+            </a:r>
+            <a:r>
+              <a:rPr lang="en-US" altLang="zh-TW" b="1" dirty="0" smtClean="0"/>
+              <a:t>			             </a:t>
+            </a:r>
+            <a:r>
+              <a:rPr lang="zh-TW" altLang="en-US" b="1" dirty="0" smtClean="0"/>
+              <a:t>1388</a:t>
+            </a:r>
+            <a:r>
+              <a:rPr lang="zh-TW" altLang="en-US" b="1" dirty="0"/>
+              <a:t>.44,6496.76 </a:t>
+            </a:r>
+            <a:endParaRPr lang="en-US" altLang="zh-TW" b="1" dirty="0" smtClean="0"/>
+          </a:p>
+          <a:p>
+            <a:r>
+              <a:rPr lang="en-US" altLang="zh-TW" b="1" dirty="0"/>
+              <a:t>	</a:t>
+            </a:r>
+            <a:r>
+              <a:rPr lang="en-US" altLang="zh-TW" b="1" dirty="0" smtClean="0"/>
+              <a:t>			             </a:t>
+            </a:r>
+            <a:r>
+              <a:rPr lang="zh-TW" altLang="en-US" b="1" dirty="0" smtClean="0"/>
+              <a:t>1387</a:t>
+            </a:r>
+            <a:r>
+              <a:rPr lang="zh-TW" altLang="en-US" b="1" dirty="0"/>
+              <a:t>.76,6497.34</a:t>
+            </a:r>
+            <a:r>
+              <a:rPr lang="zh-TW" altLang="en-US" dirty="0"/>
+              <a:t>"/&gt; </a:t>
+            </a:r>
+            <a:endParaRPr lang="en-US" altLang="zh-TW" dirty="0" smtClean="0"/>
+          </a:p>
+          <a:p>
+            <a:r>
+              <a:rPr lang="zh-TW" altLang="en-US" dirty="0" smtClean="0"/>
+              <a:t>&lt;</a:t>
+            </a:r>
+            <a:r>
+              <a:rPr lang="zh-TW" altLang="en-US" dirty="0"/>
+              <a:t>/edge&gt; </a:t>
+            </a:r>
+            <a:endParaRPr lang="en-US" altLang="zh-TW" dirty="0" smtClean="0"/>
+          </a:p>
+          <a:p>
+            <a:endParaRPr lang="en-US" altLang="zh-TW" dirty="0"/>
+          </a:p>
+        </p:txBody>
+      </p:sp>
+      <p:sp>
+        <p:nvSpPr>
+          <p:cNvPr id="7" name="矩形 6"/>
+          <p:cNvSpPr/>
+          <p:nvPr/>
+        </p:nvSpPr>
+        <p:spPr>
+          <a:xfrm>
+            <a:off x="944032" y="4733350"/>
+            <a:ext cx="10377308" cy="2031325"/>
+          </a:xfrm>
+          <a:prstGeom prst="rect">
+            <a:avLst/>
+          </a:prstGeom>
+          <a:solidFill>
+            <a:schemeClr val="accent1">
+              <a:lumMod val="40000"/>
+              <a:lumOff val="60000"/>
+            </a:schemeClr>
+          </a:solidFill>
+        </p:spPr>
+        <p:txBody>
+          <a:bodyPr wrap="square">
+            <a:spAutoFit/>
+          </a:bodyPr>
+          <a:lstStyle/>
+          <a:p>
+            <a:endParaRPr lang="en-US" altLang="zh-TW" dirty="0"/>
+          </a:p>
+          <a:p>
+            <a:r>
+              <a:rPr lang="zh-TW" altLang="en-US" dirty="0" smtClean="0"/>
+              <a:t>&lt;edge </a:t>
+            </a:r>
+            <a:r>
+              <a:rPr lang="zh-TW" altLang="en-US" dirty="0"/>
+              <a:t>id=":1235793433_11" function="internal"&gt; </a:t>
+            </a:r>
+            <a:endParaRPr lang="en-US" altLang="zh-TW" dirty="0" smtClean="0"/>
+          </a:p>
+          <a:p>
+            <a:r>
+              <a:rPr lang="en-US" altLang="zh-TW" dirty="0"/>
+              <a:t>	</a:t>
+            </a:r>
+            <a:r>
+              <a:rPr lang="zh-TW" altLang="en-US" dirty="0" smtClean="0"/>
+              <a:t>&lt;lane </a:t>
+            </a:r>
+            <a:r>
+              <a:rPr lang="zh-TW" altLang="en-US" dirty="0"/>
+              <a:t>id=":1235793433_11_0" index="0" disallow="tram rail_urban rail rail_electric ship" </a:t>
+            </a:r>
+            <a:r>
+              <a:rPr lang="en-US" altLang="zh-TW" dirty="0" smtClean="0"/>
+              <a:t>	</a:t>
+            </a:r>
+            <a:r>
+              <a:rPr lang="zh-TW" altLang="en-US" dirty="0" smtClean="0"/>
+              <a:t>speed</a:t>
+            </a:r>
+            <a:r>
+              <a:rPr lang="zh-TW" altLang="en-US" dirty="0"/>
+              <a:t>="3.65" length="2.34" shape="</a:t>
+            </a:r>
+            <a:r>
+              <a:rPr lang="zh-TW" altLang="en-US" b="1" dirty="0"/>
+              <a:t>1387.76,6497.34 </a:t>
+            </a:r>
+            <a:endParaRPr lang="en-US" altLang="zh-TW" b="1" dirty="0" smtClean="0"/>
+          </a:p>
+          <a:p>
+            <a:r>
+              <a:rPr lang="en-US" altLang="zh-TW" b="1" dirty="0"/>
+              <a:t>	</a:t>
+            </a:r>
+            <a:r>
+              <a:rPr lang="en-US" altLang="zh-TW" b="1" dirty="0" smtClean="0"/>
+              <a:t>			             </a:t>
+            </a:r>
+            <a:r>
+              <a:rPr lang="zh-TW" altLang="en-US" b="1" dirty="0" smtClean="0"/>
+              <a:t>1386</a:t>
+            </a:r>
+            <a:r>
+              <a:rPr lang="zh-TW" altLang="en-US" b="1" dirty="0"/>
+              <a:t>.89,6497.13 </a:t>
+            </a:r>
+            <a:endParaRPr lang="en-US" altLang="zh-TW" b="1" dirty="0" smtClean="0"/>
+          </a:p>
+          <a:p>
+            <a:r>
+              <a:rPr lang="en-US" altLang="zh-TW" b="1" dirty="0"/>
+              <a:t>	</a:t>
+            </a:r>
+            <a:r>
+              <a:rPr lang="en-US" altLang="zh-TW" b="1" dirty="0" smtClean="0"/>
+              <a:t>			             </a:t>
+            </a:r>
+            <a:r>
+              <a:rPr lang="zh-TW" altLang="en-US" b="1" dirty="0" smtClean="0"/>
+              <a:t>1385</a:t>
+            </a:r>
+            <a:r>
+              <a:rPr lang="zh-TW" altLang="en-US" b="1" dirty="0"/>
+              <a:t>.83,6496.15</a:t>
+            </a:r>
+            <a:r>
+              <a:rPr lang="zh-TW" altLang="en-US" dirty="0"/>
+              <a:t>"/&gt; </a:t>
+            </a:r>
+            <a:endParaRPr lang="en-US" altLang="zh-TW" dirty="0" smtClean="0"/>
+          </a:p>
+          <a:p>
+            <a:r>
+              <a:rPr lang="zh-TW" altLang="en-US" dirty="0" smtClean="0"/>
+              <a:t>&lt;</a:t>
+            </a:r>
+            <a:r>
+              <a:rPr lang="zh-TW" altLang="en-US" dirty="0"/>
+              <a:t>/edge&gt;</a:t>
+            </a:r>
+          </a:p>
+        </p:txBody>
+      </p:sp>
     </p:spTree>
     <p:extLst>
       <p:ext uri="{BB962C8B-B14F-4D97-AF65-F5344CB8AC3E}">
-        <p14:creationId xmlns:p14="http://schemas.microsoft.com/office/powerpoint/2010/main" val="469531805"/>
+        <p14:creationId xmlns:p14="http://schemas.microsoft.com/office/powerpoint/2010/main" val="389176132"/>
       </p:ext>
     </p:extLst>
   </p:cSld>
@@ -8605,66 +8843,6 @@
           <a:chExt cx="0" cy="0"/>
         </a:xfrm>
       </p:grpSpPr>
-      <p:pic>
-        <p:nvPicPr>
-          <p:cNvPr id="3" name="圖片 2"/>
-          <p:cNvPicPr>
-            <a:picLocks noChangeAspect="1"/>
-          </p:cNvPicPr>
-          <p:nvPr/>
-        </p:nvPicPr>
-        <p:blipFill>
-          <a:blip r:embed="rId2" cstate="print">
-            <a:extLst>
-              <a:ext uri="{28A0092B-C50C-407E-A947-70E740481C1C}">
-                <a14:useLocalDpi xmlns:a14="http://schemas.microsoft.com/office/drawing/2010/main" val="0"/>
-              </a:ext>
-            </a:extLst>
-          </a:blip>
-          <a:stretch>
-            <a:fillRect/>
-          </a:stretch>
-        </p:blipFill>
-        <p:spPr>
-          <a:xfrm>
-            <a:off x="90311" y="1591734"/>
-            <a:ext cx="5508978" cy="4121318"/>
-          </a:xfrm>
-          <a:prstGeom prst="rect">
-            <a:avLst/>
-          </a:prstGeom>
-          <a:solidFill>
-            <a:srgbClr val="FFFFFF">
-              <a:shade val="85000"/>
-            </a:srgbClr>
-          </a:solidFill>
-          <a:ln w="88900" cap="sq">
-            <a:solidFill>
-              <a:srgbClr val="FFFFFF"/>
-            </a:solidFill>
-            <a:miter lim="800000"/>
-          </a:ln>
-          <a:effectLst>
-            <a:outerShdw blurRad="55000" dist="18000" dir="5400000" algn="tl" rotWithShape="0">
-              <a:srgbClr val="000000">
-                <a:alpha val="40000"/>
-              </a:srgbClr>
-            </a:outerShdw>
-          </a:effectLst>
-          <a:scene3d>
-            <a:camera prst="orthographicFront"/>
-            <a:lightRig rig="twoPt" dir="t">
-              <a:rot lat="0" lon="0" rev="7200000"/>
-            </a:lightRig>
-          </a:scene3d>
-          <a:sp3d>
-            <a:bevelT w="25400" h="19050"/>
-            <a:contourClr>
-              <a:srgbClr val="FFFFFF"/>
-            </a:contourClr>
-          </a:sp3d>
-        </p:spPr>
-      </p:pic>
       <p:sp>
         <p:nvSpPr>
           <p:cNvPr id="4" name="標題 1"/>
@@ -8699,9 +8877,162 @@
           </a:p>
         </p:txBody>
       </p:sp>
+      <p:sp>
+        <p:nvSpPr>
+          <p:cNvPr id="6" name="矩形 5"/>
+          <p:cNvSpPr/>
+          <p:nvPr/>
+        </p:nvSpPr>
+        <p:spPr>
+          <a:xfrm>
+            <a:off x="1193901" y="1062172"/>
+            <a:ext cx="2040047" cy="923330"/>
+          </a:xfrm>
+          <a:prstGeom prst="rect">
+            <a:avLst/>
+          </a:prstGeom>
+          <a:noFill/>
+        </p:spPr>
+        <p:txBody>
+          <a:bodyPr wrap="none" lIns="91440" tIns="45720" rIns="91440" bIns="45720">
+            <a:spAutoFit/>
+          </a:bodyPr>
+          <a:lstStyle/>
+          <a:p>
+            <a:pPr algn="ctr"/>
+            <a:r>
+              <a:rPr lang="en-US" altLang="zh-TW" sz="5400" b="0" cap="none" spc="0" dirty="0" smtClean="0">
+                <a:ln w="0"/>
+                <a:solidFill>
+                  <a:srgbClr val="FF0000"/>
+                </a:solidFill>
+                <a:effectLst>
+                  <a:outerShdw blurRad="38100" dist="19050" dir="2700000" algn="tl" rotWithShape="0">
+                    <a:schemeClr val="dk1">
+                      <a:alpha val="40000"/>
+                    </a:schemeClr>
+                  </a:outerShdw>
+                </a:effectLst>
+              </a:rPr>
+              <a:t>Before</a:t>
+            </a:r>
+            <a:endParaRPr lang="zh-TW" altLang="en-US" sz="5400" b="0" cap="none" spc="0" dirty="0">
+              <a:ln w="0"/>
+              <a:solidFill>
+                <a:srgbClr val="FF0000"/>
+              </a:solidFill>
+              <a:effectLst>
+                <a:outerShdw blurRad="38100" dist="19050" dir="2700000" algn="tl" rotWithShape="0">
+                  <a:schemeClr val="dk1">
+                    <a:alpha val="40000"/>
+                  </a:schemeClr>
+                </a:outerShdw>
+              </a:effectLst>
+            </a:endParaRPr>
+          </a:p>
+        </p:txBody>
+      </p:sp>
+      <p:sp>
+        <p:nvSpPr>
+          <p:cNvPr id="7" name="矩形 6"/>
+          <p:cNvSpPr/>
+          <p:nvPr/>
+        </p:nvSpPr>
+        <p:spPr>
+          <a:xfrm>
+            <a:off x="6163734" y="1055101"/>
+            <a:ext cx="5386026" cy="923330"/>
+          </a:xfrm>
+          <a:prstGeom prst="rect">
+            <a:avLst/>
+          </a:prstGeom>
+          <a:noFill/>
+        </p:spPr>
+        <p:txBody>
+          <a:bodyPr wrap="none" lIns="91440" tIns="45720" rIns="91440" bIns="45720">
+            <a:spAutoFit/>
+          </a:bodyPr>
+          <a:lstStyle/>
+          <a:p>
+            <a:pPr algn="ctr"/>
+            <a:r>
+              <a:rPr lang="en-US" altLang="zh-TW" sz="5400" b="0" cap="none" spc="0" dirty="0" smtClean="0">
+                <a:ln w="0"/>
+                <a:solidFill>
+                  <a:srgbClr val="FF0000"/>
+                </a:solidFill>
+                <a:effectLst>
+                  <a:outerShdw blurRad="38100" dist="19050" dir="2700000" algn="tl" rotWithShape="0">
+                    <a:schemeClr val="dk1">
+                      <a:alpha val="40000"/>
+                    </a:schemeClr>
+                  </a:outerShdw>
+                </a:effectLst>
+              </a:rPr>
+              <a:t>The edited version</a:t>
+            </a:r>
+            <a:endParaRPr lang="zh-TW" altLang="en-US" sz="5400" b="0" cap="none" spc="0" dirty="0">
+              <a:ln w="0"/>
+              <a:solidFill>
+                <a:srgbClr val="FF0000"/>
+              </a:solidFill>
+              <a:effectLst>
+                <a:outerShdw blurRad="38100" dist="19050" dir="2700000" algn="tl" rotWithShape="0">
+                  <a:schemeClr val="dk1">
+                    <a:alpha val="40000"/>
+                  </a:schemeClr>
+                </a:outerShdw>
+              </a:effectLst>
+            </a:endParaRPr>
+          </a:p>
+        </p:txBody>
+      </p:sp>
       <p:pic>
         <p:nvPicPr>
-          <p:cNvPr id="5" name="圖片 4"/>
+          <p:cNvPr id="2" name="圖片 1"/>
+          <p:cNvPicPr>
+            <a:picLocks noChangeAspect="1"/>
+          </p:cNvPicPr>
+          <p:nvPr/>
+        </p:nvPicPr>
+        <p:blipFill rotWithShape="1">
+          <a:blip r:embed="rId2">
+            <a:extLst>
+              <a:ext uri="{28A0092B-C50C-407E-A947-70E740481C1C}">
+                <a14:useLocalDpi xmlns:a14="http://schemas.microsoft.com/office/drawing/2010/main" val="0"/>
+              </a:ext>
+            </a:extLst>
+          </a:blip>
+          <a:srcRect l="14414" t="5137" r="7011" b="13550"/>
+          <a:stretch/>
+        </p:blipFill>
+        <p:spPr>
+          <a:xfrm>
+            <a:off x="268757" y="2239617"/>
+            <a:ext cx="5151542" cy="4040725"/>
+          </a:xfrm>
+          <a:prstGeom prst="rect">
+            <a:avLst/>
+          </a:prstGeom>
+          <a:ln w="38100" cap="sq">
+            <a:solidFill>
+              <a:srgbClr val="000000"/>
+            </a:solidFill>
+            <a:prstDash val="solid"/>
+            <a:miter lim="800000"/>
+          </a:ln>
+          <a:effectLst>
+            <a:outerShdw blurRad="50800" dist="38100" dir="2700000" algn="tl" rotWithShape="0">
+              <a:srgbClr val="000000">
+                <a:alpha val="43000"/>
+              </a:srgbClr>
+            </a:outerShdw>
+          </a:effectLst>
+        </p:spPr>
+      </p:pic>
+      <p:pic>
+        <p:nvPicPr>
+          <p:cNvPr id="8" name="圖片 7"/>
           <p:cNvPicPr>
             <a:picLocks noChangeAspect="1"/>
           </p:cNvPicPr>
@@ -8715,13 +9046,13 @@
               </a:ext>
             </a:extLst>
           </a:blip>
-          <a:srcRect l="11598" r="2894"/>
+          <a:srcRect l="8364" t="3958" r="2992" b="11345"/>
           <a:stretch/>
         </p:blipFill>
         <p:spPr>
           <a:xfrm>
-            <a:off x="5881511" y="1591734"/>
-            <a:ext cx="6028266" cy="4191773"/>
+            <a:off x="6004192" y="2239617"/>
+            <a:ext cx="5971701" cy="4018691"/>
           </a:xfrm>
           <a:prstGeom prst="rect">
             <a:avLst/>
@@ -8745,7 +9076,7 @@
     </p:spTree>
     <p:extLst>
       <p:ext uri="{BB962C8B-B14F-4D97-AF65-F5344CB8AC3E}">
-        <p14:creationId xmlns:p14="http://schemas.microsoft.com/office/powerpoint/2010/main" val="789710369"/>
+        <p14:creationId xmlns:p14="http://schemas.microsoft.com/office/powerpoint/2010/main" val="1417464922"/>
       </p:ext>
     </p:extLst>
   </p:cSld>
@@ -8883,7 +9214,7 @@
     </p:spTree>
     <p:extLst>
       <p:ext uri="{BB962C8B-B14F-4D97-AF65-F5344CB8AC3E}">
-        <p14:creationId xmlns:p14="http://schemas.microsoft.com/office/powerpoint/2010/main" val="674842863"/>
+        <p14:creationId xmlns:p14="http://schemas.microsoft.com/office/powerpoint/2010/main" val="3857395889"/>
       </p:ext>
     </p:extLst>
   </p:cSld>
@@ -9241,7 +9572,7 @@
     </p:spTree>
     <p:extLst>
       <p:ext uri="{BB962C8B-B14F-4D97-AF65-F5344CB8AC3E}">
-        <p14:creationId xmlns:p14="http://schemas.microsoft.com/office/powerpoint/2010/main" val="1306449335"/>
+        <p14:creationId xmlns:p14="http://schemas.microsoft.com/office/powerpoint/2010/main" val="2130172763"/>
       </p:ext>
     </p:extLst>
   </p:cSld>
@@ -9343,7 +9674,7 @@
     </p:spTree>
     <p:extLst>
       <p:ext uri="{BB962C8B-B14F-4D97-AF65-F5344CB8AC3E}">
-        <p14:creationId xmlns:p14="http://schemas.microsoft.com/office/powerpoint/2010/main" val="1745828224"/>
+        <p14:creationId xmlns:p14="http://schemas.microsoft.com/office/powerpoint/2010/main" val="2631197330"/>
       </p:ext>
     </p:extLst>
   </p:cSld>
@@ -9407,15 +9738,105 @@
             </a:br>
             <a:r>
               <a:rPr lang="en-US" altLang="zh-TW" sz="2800" dirty="0" smtClean="0"/>
-              <a:t>40s-90s and re-built the new route when the sender sends the request at 90s</a:t>
+              <a:t>40s-90s and re-built the new route when the sender </a:t>
+            </a:r>
+            <a:r>
+              <a:rPr lang="en-US" altLang="zh-TW" sz="2800" dirty="0" smtClean="0"/>
+              <a:t>have</a:t>
+            </a:r>
+            <a:r>
+              <a:rPr lang="en-US" altLang="zh-TW" sz="2800" dirty="0" smtClean="0"/>
+              <a:t> </a:t>
+            </a:r>
+            <a:r>
+              <a:rPr lang="en-US" altLang="zh-TW" sz="2800" dirty="0" smtClean="0"/>
+              <a:t>the request at 90s</a:t>
             </a:r>
             <a:endParaRPr lang="zh-TW" altLang="en-US" sz="2800" dirty="0"/>
+          </a:p>
+        </p:txBody>
+      </p:sp>
+      <p:sp>
+        <p:nvSpPr>
+          <p:cNvPr id="5" name="矩形 4"/>
+          <p:cNvSpPr/>
+          <p:nvPr/>
+        </p:nvSpPr>
+        <p:spPr>
+          <a:xfrm>
+            <a:off x="7772400" y="3261287"/>
+            <a:ext cx="3794529" cy="2677656"/>
+          </a:xfrm>
+          <a:prstGeom prst="rect">
+            <a:avLst/>
+          </a:prstGeom>
+          <a:solidFill>
+            <a:schemeClr val="accent2">
+              <a:lumMod val="40000"/>
+              <a:lumOff val="60000"/>
+            </a:schemeClr>
+          </a:solidFill>
+        </p:spPr>
+        <p:txBody>
+          <a:bodyPr wrap="square">
+            <a:spAutoFit/>
+          </a:bodyPr>
+          <a:lstStyle/>
+          <a:p>
+            <a:r>
+              <a:rPr lang="en-US" altLang="zh-TW" sz="2400" dirty="0" smtClean="0"/>
+              <a:t>If(time==90.0){</a:t>
+            </a:r>
+          </a:p>
+          <a:p>
+            <a:r>
+              <a:rPr lang="en-US" altLang="zh-TW" sz="2400" dirty="0" smtClean="0"/>
+              <a:t>String </a:t>
+            </a:r>
+            <a:r>
+              <a:rPr lang="en-US" altLang="zh-TW" sz="2400" b="1" dirty="0" err="1"/>
+              <a:t>senderEdgeID</a:t>
+            </a:r>
+            <a:r>
+              <a:rPr lang="en-US" altLang="zh-TW" sz="2400" dirty="0"/>
+              <a:t> ="160253722#1</a:t>
+            </a:r>
+            <a:r>
+              <a:rPr lang="en-US" altLang="zh-TW" sz="2400" dirty="0" smtClean="0"/>
+              <a:t>";	              		</a:t>
+            </a:r>
+          </a:p>
+          <a:p>
+            <a:r>
+              <a:rPr lang="en-US" altLang="zh-TW" sz="2400" dirty="0" err="1" smtClean="0"/>
+              <a:t>Vehicle.changeTarget</a:t>
+            </a:r>
+            <a:r>
+              <a:rPr lang="en-US" altLang="zh-TW" sz="2400" dirty="0"/>
+              <a:t>("flow0.0", </a:t>
+            </a:r>
+            <a:r>
+              <a:rPr lang="en-US" altLang="zh-TW" sz="2400" dirty="0" err="1" smtClean="0"/>
+              <a:t>senderEdgeID</a:t>
+            </a:r>
+            <a:r>
+              <a:rPr lang="en-US" altLang="zh-TW" sz="2400" dirty="0" smtClean="0"/>
+              <a:t>);</a:t>
+            </a:r>
+            <a:endParaRPr lang="en-US" altLang="zh-TW" sz="2400" dirty="0" smtClean="0"/>
+          </a:p>
+          <a:p>
+            <a:r>
+              <a:rPr lang="en-US" altLang="zh-TW" sz="2400" dirty="0" smtClean="0"/>
+              <a:t>}</a:t>
+            </a:r>
+            <a:endParaRPr lang="zh-TW" altLang="en-US" sz="2400" dirty="0"/>
           </a:p>
         </p:txBody>
       </p:sp>
       <p:pic>
         <p:nvPicPr>
-          <p:cNvPr id="3" name="圖片 2"/>
+          <p:cNvPr id="4" name="圖片 3"/>
           <p:cNvPicPr>
             <a:picLocks noChangeAspect="1"/>
           </p:cNvPicPr>
@@ -9435,103 +9856,24 @@
         </p:blipFill>
         <p:spPr>
           <a:xfrm>
-            <a:off x="140843" y="80025"/>
-            <a:ext cx="7419683" cy="6362524"/>
+            <a:off x="112635" y="151374"/>
+            <a:ext cx="7533071" cy="6481022"/>
           </a:xfrm>
           <a:prstGeom prst="rect">
             <a:avLst/>
           </a:prstGeom>
+          <a:ln>
+            <a:solidFill>
+              <a:schemeClr val="tx1"/>
+            </a:solidFill>
+            <a:prstDash val="solid"/>
+          </a:ln>
         </p:spPr>
       </p:pic>
-      <p:sp>
-        <p:nvSpPr>
-          <p:cNvPr id="5" name="矩形 4"/>
-          <p:cNvSpPr/>
-          <p:nvPr/>
-        </p:nvSpPr>
-        <p:spPr>
-          <a:xfrm>
-            <a:off x="7685047" y="3261287"/>
-            <a:ext cx="4291362" cy="2677656"/>
-          </a:xfrm>
-          <a:prstGeom prst="rect">
-            <a:avLst/>
-          </a:prstGeom>
-          <a:solidFill>
-            <a:schemeClr val="accent2">
-              <a:lumMod val="40000"/>
-              <a:lumOff val="60000"/>
-            </a:schemeClr>
-          </a:solidFill>
-        </p:spPr>
-        <p:txBody>
-          <a:bodyPr wrap="square">
-            <a:spAutoFit/>
-          </a:bodyPr>
-          <a:lstStyle/>
-          <a:p>
-            <a:r>
-              <a:rPr lang="en-US" altLang="zh-TW" sz="2400" dirty="0" smtClean="0"/>
-              <a:t>If(time==90.0){</a:t>
-            </a:r>
-          </a:p>
-          <a:p>
-            <a:r>
-              <a:rPr lang="en-US" altLang="zh-TW" sz="2400" dirty="0" smtClean="0"/>
-              <a:t>String </a:t>
-            </a:r>
-            <a:r>
-              <a:rPr lang="en-US" altLang="zh-TW" sz="2400" dirty="0" err="1"/>
-              <a:t>senderEdgeID</a:t>
-            </a:r>
-            <a:r>
-              <a:rPr lang="en-US" altLang="zh-TW" sz="2400" dirty="0"/>
-              <a:t> ="160253722#1</a:t>
-            </a:r>
-            <a:r>
-              <a:rPr lang="en-US" altLang="zh-TW" sz="2400" dirty="0" smtClean="0"/>
-              <a:t>";	              		</a:t>
-            </a:r>
-          </a:p>
-          <a:p>
-            <a:r>
-              <a:rPr lang="en-US" altLang="zh-TW" sz="2400" dirty="0" err="1" smtClean="0"/>
-              <a:t>conn.do_job_set</a:t>
-            </a:r>
-            <a:r>
-              <a:rPr lang="en-US" altLang="zh-TW" sz="2400" dirty="0" smtClean="0"/>
-              <a:t>(</a:t>
-            </a:r>
-            <a:r>
-              <a:rPr lang="en-US" altLang="zh-TW" sz="2400" dirty="0" err="1" smtClean="0"/>
-              <a:t>Vehicle.changeTarget</a:t>
-            </a:r>
-            <a:r>
-              <a:rPr lang="en-US" altLang="zh-TW" sz="2400" dirty="0"/>
-              <a:t>("flow0.0", </a:t>
-            </a:r>
-            <a:r>
-              <a:rPr lang="en-US" altLang="zh-TW" sz="2400" dirty="0" err="1"/>
-              <a:t>senderEdgeID</a:t>
-            </a:r>
-            <a:r>
-              <a:rPr lang="en-US" altLang="zh-TW" sz="2400" dirty="0" smtClean="0"/>
-              <a:t>));</a:t>
-            </a:r>
-          </a:p>
-          <a:p>
-            <a:r>
-              <a:rPr lang="en-US" altLang="zh-TW" sz="2400" dirty="0" smtClean="0"/>
-              <a:t>}</a:t>
-            </a:r>
-            <a:endParaRPr lang="zh-TW" altLang="en-US" sz="2400" dirty="0"/>
-          </a:p>
-        </p:txBody>
-      </p:sp>
     </p:spTree>
     <p:extLst>
       <p:ext uri="{BB962C8B-B14F-4D97-AF65-F5344CB8AC3E}">
-        <p14:creationId xmlns:p14="http://schemas.microsoft.com/office/powerpoint/2010/main" val="2884447646"/>
+        <p14:creationId xmlns:p14="http://schemas.microsoft.com/office/powerpoint/2010/main" val="2759977573"/>
       </p:ext>
     </p:extLst>
   </p:cSld>
@@ -9542,194 +9884,6 @@
 </file>
 
 <file path=ppt/slides/slide35.xml><?xml version="1.0" encoding="utf-8"?>
-<p:sld xmlns:a="http://schemas.openxmlformats.org/drawingml/2006/main" xmlns:r="http://schemas.openxmlformats.org/officeDocument/2006/relationships" xmlns:p="http://schemas.openxmlformats.org/presentationml/2006/main">
-  <p:cSld>
-    <p:spTree>
-      <p:nvGrpSpPr>
-        <p:cNvPr id="1" name=""/>
-        <p:cNvGrpSpPr/>
-        <p:nvPr/>
-      </p:nvGrpSpPr>
-      <p:grpSpPr>
-        <a:xfrm>
-          <a:off x="0" y="0"/>
-          <a:ext cx="0" cy="0"/>
-          <a:chOff x="0" y="0"/>
-          <a:chExt cx="0" cy="0"/>
-        </a:xfrm>
-      </p:grpSpPr>
-      <p:sp>
-        <p:nvSpPr>
-          <p:cNvPr id="2" name="標題 1"/>
-          <p:cNvSpPr>
-            <a:spLocks noGrp="1"/>
-          </p:cNvSpPr>
-          <p:nvPr>
-            <p:ph type="title"/>
-          </p:nvPr>
-        </p:nvSpPr>
-        <p:spPr>
-          <a:xfrm>
-            <a:off x="7772400" y="557561"/>
-            <a:ext cx="3947531" cy="1538868"/>
-          </a:xfrm>
-          <a:solidFill>
-            <a:schemeClr val="accent4">
-              <a:lumMod val="40000"/>
-              <a:lumOff val="60000"/>
-            </a:schemeClr>
-          </a:solidFill>
-        </p:spPr>
-        <p:txBody>
-          <a:bodyPr>
-            <a:normAutofit fontScale="90000"/>
-          </a:bodyPr>
-          <a:lstStyle/>
-          <a:p>
-            <a:r>
-              <a:rPr lang="en-US" altLang="zh-TW" sz="2800" dirty="0" smtClean="0"/>
-              <a:t>Follow default route from </a:t>
-            </a:r>
-            <a:br>
-              <a:rPr lang="en-US" altLang="zh-TW" sz="2800" dirty="0" smtClean="0"/>
-            </a:br>
-            <a:r>
-              <a:rPr lang="en-US" altLang="zh-TW" sz="2800" dirty="0" smtClean="0"/>
-              <a:t>40s-90s and re-built the new route when the sender sends the request at 90s</a:t>
-            </a:r>
-            <a:endParaRPr lang="zh-TW" altLang="en-US" sz="2800" dirty="0"/>
-          </a:p>
-        </p:txBody>
-      </p:sp>
-      <p:pic>
-        <p:nvPicPr>
-          <p:cNvPr id="3" name="圖片 2"/>
-          <p:cNvPicPr>
-            <a:picLocks noChangeAspect="1"/>
-          </p:cNvPicPr>
-          <p:nvPr/>
-        </p:nvPicPr>
-        <p:blipFill>
-          <a:blip r:embed="rId2">
-            <a:extLst>
-              <a:ext uri="{28A0092B-C50C-407E-A947-70E740481C1C}">
-                <a14:useLocalDpi xmlns:a14="http://schemas.microsoft.com/office/drawing/2010/main" val="0"/>
-              </a:ext>
-            </a:extLst>
-          </a:blip>
-          <a:stretch>
-            <a:fillRect/>
-          </a:stretch>
-        </p:blipFill>
-        <p:spPr>
-          <a:xfrm>
-            <a:off x="140843" y="80025"/>
-            <a:ext cx="7419683" cy="6362524"/>
-          </a:xfrm>
-          <a:prstGeom prst="rect">
-            <a:avLst/>
-          </a:prstGeom>
-        </p:spPr>
-      </p:pic>
-      <p:sp>
-        <p:nvSpPr>
-          <p:cNvPr id="5" name="矩形 4"/>
-          <p:cNvSpPr/>
-          <p:nvPr/>
-        </p:nvSpPr>
-        <p:spPr>
-          <a:xfrm>
-            <a:off x="7685047" y="3261287"/>
-            <a:ext cx="4291362" cy="2677656"/>
-          </a:xfrm>
-          <a:prstGeom prst="rect">
-            <a:avLst/>
-          </a:prstGeom>
-          <a:solidFill>
-            <a:schemeClr val="accent2">
-              <a:lumMod val="40000"/>
-              <a:lumOff val="60000"/>
-            </a:schemeClr>
-          </a:solidFill>
-        </p:spPr>
-        <p:txBody>
-          <a:bodyPr wrap="square">
-            <a:spAutoFit/>
-          </a:bodyPr>
-          <a:lstStyle/>
-          <a:p>
-            <a:r>
-              <a:rPr lang="en-US" altLang="zh-TW" sz="2400" dirty="0" smtClean="0"/>
-              <a:t>If(time==90.0){</a:t>
-            </a:r>
-          </a:p>
-          <a:p>
-            <a:r>
-              <a:rPr lang="en-US" altLang="zh-TW" sz="2400" dirty="0" smtClean="0"/>
-              <a:t>String </a:t>
-            </a:r>
-            <a:r>
-              <a:rPr lang="en-US" altLang="zh-TW" sz="2400" dirty="0" err="1"/>
-              <a:t>senderEdgeID</a:t>
-            </a:r>
-            <a:r>
-              <a:rPr lang="en-US" altLang="zh-TW" sz="2400" dirty="0"/>
-              <a:t> ="160253722#1</a:t>
-            </a:r>
-            <a:r>
-              <a:rPr lang="en-US" altLang="zh-TW" sz="2400" dirty="0" smtClean="0"/>
-              <a:t>";	              		</a:t>
-            </a:r>
-          </a:p>
-          <a:p>
-            <a:r>
-              <a:rPr lang="en-US" altLang="zh-TW" sz="2400" dirty="0" err="1" smtClean="0"/>
-              <a:t>conn.do_job_set</a:t>
-            </a:r>
-            <a:r>
-              <a:rPr lang="en-US" altLang="zh-TW" sz="2400" dirty="0" smtClean="0"/>
-              <a:t>(</a:t>
-            </a:r>
-            <a:r>
-              <a:rPr lang="en-US" altLang="zh-TW" sz="2400" dirty="0" err="1" smtClean="0"/>
-              <a:t>Vehicle.changeTarget</a:t>
-            </a:r>
-            <a:r>
-              <a:rPr lang="en-US" altLang="zh-TW" sz="2400" dirty="0"/>
-              <a:t>("flow0.0", </a:t>
-            </a:r>
-            <a:r>
-              <a:rPr lang="en-US" altLang="zh-TW" sz="2400" dirty="0" err="1"/>
-              <a:t>senderEdgeID</a:t>
-            </a:r>
-            <a:r>
-              <a:rPr lang="en-US" altLang="zh-TW" sz="2400" dirty="0" smtClean="0"/>
-              <a:t>));</a:t>
-            </a:r>
-          </a:p>
-          <a:p>
-            <a:r>
-              <a:rPr lang="en-US" altLang="zh-TW" sz="2400" dirty="0" smtClean="0"/>
-              <a:t>}</a:t>
-            </a:r>
-            <a:endParaRPr lang="zh-TW" altLang="en-US" sz="2400" dirty="0"/>
-          </a:p>
-        </p:txBody>
-      </p:sp>
-    </p:spTree>
-    <p:extLst>
-      <p:ext uri="{BB962C8B-B14F-4D97-AF65-F5344CB8AC3E}">
-        <p14:creationId xmlns:p14="http://schemas.microsoft.com/office/powerpoint/2010/main" val="1392449812"/>
-      </p:ext>
-    </p:extLst>
-  </p:cSld>
-  <p:clrMapOvr>
-    <a:masterClrMapping/>
-  </p:clrMapOvr>
-</p:sld>
-</file>
-
-<file path=ppt/slides/slide36.xml><?xml version="1.0" encoding="utf-8"?>
 <p:sld xmlns:a="http://schemas.openxmlformats.org/drawingml/2006/main" xmlns:r="http://schemas.openxmlformats.org/officeDocument/2006/relationships" xmlns:p="http://schemas.openxmlformats.org/presentationml/2006/main">
   <p:cSld>
     <p:spTree>
@@ -9944,15 +10098,11 @@
           <a:lstStyle/>
           <a:p>
             <a:r>
-              <a:rPr lang="en-US" altLang="zh-TW" sz="2400" dirty="0" err="1"/>
-              <a:t>conn.do_job_set</a:t>
-            </a:r>
-            <a:r>
-              <a:rPr lang="en-US" altLang="zh-TW" sz="2400" dirty="0"/>
+              <a:rPr lang="en-US" altLang="zh-TW" sz="2400" dirty="0" smtClean="0"/>
               <a:t>(</a:t>
             </a:r>
             <a:r>
-              <a:rPr lang="en-US" altLang="zh-TW" sz="2400" dirty="0" err="1"/>
+              <a:rPr lang="en-US" altLang="zh-TW" sz="2400" dirty="0" err="1" smtClean="0"/>
               <a:t>Vehicle.changeTarget</a:t>
             </a:r>
             <a:r>
@@ -9967,14 +10117,13 @@
               <a:rPr lang="en-US" altLang="zh-TW" sz="2400" dirty="0"/>
               <a:t>));</a:t>
             </a:r>
-            <a:endParaRPr lang="en-US" altLang="zh-TW" sz="2400" dirty="0"/>
           </a:p>
         </p:txBody>
       </p:sp>
     </p:spTree>
     <p:extLst>
       <p:ext uri="{BB962C8B-B14F-4D97-AF65-F5344CB8AC3E}">
-        <p14:creationId xmlns:p14="http://schemas.microsoft.com/office/powerpoint/2010/main" val="2757134089"/>
+        <p14:creationId xmlns:p14="http://schemas.microsoft.com/office/powerpoint/2010/main" val="2090080179"/>
       </p:ext>
     </p:extLst>
   </p:cSld>
@@ -9984,7 +10133,7 @@
 </p:sld>
 </file>
 
-<file path=ppt/slides/slide37.xml><?xml version="1.0" encoding="utf-8"?>
+<file path=ppt/slides/slide36.xml><?xml version="1.0" encoding="utf-8"?>
 <p:sld xmlns:a="http://schemas.openxmlformats.org/drawingml/2006/main" xmlns:r="http://schemas.openxmlformats.org/officeDocument/2006/relationships" xmlns:p="http://schemas.openxmlformats.org/presentationml/2006/main">
   <p:cSld>
     <p:spTree>
@@ -10010,7 +10159,7 @@
         <p:spPr>
           <a:xfrm>
             <a:off x="115181" y="117740"/>
-            <a:ext cx="2279676" cy="923330"/>
+            <a:ext cx="2972576" cy="923330"/>
           </a:xfrm>
           <a:prstGeom prst="rect">
             <a:avLst/>
@@ -10038,7 +10187,7 @@
                   </a:outerShdw>
                 </a:effectLst>
               </a:rPr>
-              <a:t>94.000</a:t>
+              <a:t>94.00s</a:t>
             </a:r>
             <a:endParaRPr lang="zh-TW" altLang="en-US" sz="5400" b="0" cap="none" spc="0" dirty="0">
               <a:ln w="0"/>
@@ -10064,7 +10213,7 @@
         </p:nvSpPr>
         <p:spPr>
           <a:xfrm>
-            <a:off x="5301342" y="117740"/>
+            <a:off x="5327847" y="428494"/>
             <a:ext cx="6531429" cy="5755422"/>
           </a:xfrm>
           <a:prstGeom prst="rect">
@@ -10123,10 +10272,6 @@
           </a:p>
           <a:p>
             <a:r>
-              <a:rPr lang="en-US" altLang="zh-TW" sz="2000" dirty="0" err="1" smtClean="0"/>
-              <a:t>Vehicle.</a:t>
-            </a:r>
-            <a:r>
               <a:rPr lang="en-US" altLang="zh-TW" sz="2000" b="1" dirty="0" err="1" smtClean="0"/>
               <a:t>changeTarget</a:t>
             </a:r>
@@ -10179,8 +10324,8 @@
           </a:p>
           <a:p>
             <a:r>
-              <a:rPr lang="en-US" altLang="zh-TW" sz="2000" dirty="0" err="1" smtClean="0"/>
-              <a:t>Vehicle.setStop</a:t>
+              <a:rPr lang="en-US" altLang="zh-TW" sz="2000" b="1" dirty="0" err="1" smtClean="0"/>
+              <a:t>setStop</a:t>
             </a:r>
             <a:r>
               <a:rPr lang="en-US" altLang="zh-TW" sz="2000" dirty="0"/>
@@ -10221,11 +10366,19 @@
             </a:r>
             <a:r>
               <a:rPr lang="zh-TW" altLang="en-US" sz="3600" b="1" dirty="0" smtClean="0"/>
-              <a:t>計算到達</a:t>
+              <a:t>計算</a:t>
+            </a:r>
+            <a:r>
+              <a:rPr lang="zh-TW" altLang="en-US" sz="3600" b="1" dirty="0" smtClean="0"/>
+              <a:t>到達</a:t>
             </a:r>
             <a:r>
               <a:rPr lang="en-US" altLang="zh-TW" sz="3600" b="1" dirty="0" smtClean="0"/>
-              <a:t>sender</a:t>
+              <a:t>r</a:t>
+            </a:r>
+            <a:r>
+              <a:rPr lang="en-US" altLang="zh-TW" sz="3600" b="1" dirty="0" smtClean="0"/>
+              <a:t>eceiver</a:t>
             </a:r>
             <a:r>
               <a:rPr lang="zh-TW" altLang="en-US" sz="3600" b="1" dirty="0" smtClean="0"/>
@@ -10312,7 +10465,290 @@
     </p:spTree>
     <p:extLst>
       <p:ext uri="{BB962C8B-B14F-4D97-AF65-F5344CB8AC3E}">
-        <p14:creationId xmlns:p14="http://schemas.microsoft.com/office/powerpoint/2010/main" val="3049510436"/>
+        <p14:creationId xmlns:p14="http://schemas.microsoft.com/office/powerpoint/2010/main" val="2292966353"/>
+      </p:ext>
+    </p:extLst>
+  </p:cSld>
+  <p:clrMapOvr>
+    <a:masterClrMapping/>
+  </p:clrMapOvr>
+</p:sld>
+</file>
+
+<file path=ppt/slides/slide37.xml><?xml version="1.0" encoding="utf-8"?>
+<p:sld xmlns:a="http://schemas.openxmlformats.org/drawingml/2006/main" xmlns:r="http://schemas.openxmlformats.org/officeDocument/2006/relationships" xmlns:p="http://schemas.openxmlformats.org/presentationml/2006/main">
+  <p:cSld>
+    <p:spTree>
+      <p:nvGrpSpPr>
+        <p:cNvPr id="1" name=""/>
+        <p:cNvGrpSpPr/>
+        <p:nvPr/>
+      </p:nvGrpSpPr>
+      <p:grpSpPr>
+        <a:xfrm>
+          <a:off x="0" y="0"/>
+          <a:ext cx="0" cy="0"/>
+          <a:chOff x="0" y="0"/>
+          <a:chExt cx="0" cy="0"/>
+        </a:xfrm>
+      </p:grpSpPr>
+      <p:pic>
+        <p:nvPicPr>
+          <p:cNvPr id="3" name="圖片 2"/>
+          <p:cNvPicPr>
+            <a:picLocks noChangeAspect="1"/>
+          </p:cNvPicPr>
+          <p:nvPr/>
+        </p:nvPicPr>
+        <p:blipFill rotWithShape="1">
+          <a:blip r:embed="rId2">
+            <a:extLst>
+              <a:ext uri="{28A0092B-C50C-407E-A947-70E740481C1C}">
+                <a14:useLocalDpi xmlns:a14="http://schemas.microsoft.com/office/drawing/2010/main" val="0"/>
+              </a:ext>
+            </a:extLst>
+          </a:blip>
+          <a:srcRect b="14451"/>
+          <a:stretch/>
+        </p:blipFill>
+        <p:spPr>
+          <a:xfrm>
+            <a:off x="335092" y="1338943"/>
+            <a:ext cx="9179022" cy="3374570"/>
+          </a:xfrm>
+          <a:prstGeom prst="rect">
+            <a:avLst/>
+          </a:prstGeom>
+        </p:spPr>
+      </p:pic>
+      <p:sp>
+        <p:nvSpPr>
+          <p:cNvPr id="6" name="矩形 5"/>
+          <p:cNvSpPr/>
+          <p:nvPr/>
+        </p:nvSpPr>
+        <p:spPr>
+          <a:xfrm>
+            <a:off x="335093" y="282712"/>
+            <a:ext cx="11596174" cy="707886"/>
+          </a:xfrm>
+          <a:prstGeom prst="rect">
+            <a:avLst/>
+          </a:prstGeom>
+          <a:noFill/>
+        </p:spPr>
+        <p:txBody>
+          <a:bodyPr wrap="square" lIns="91440" tIns="45720" rIns="91440" bIns="45720">
+            <a:spAutoFit/>
+          </a:bodyPr>
+          <a:lstStyle/>
+          <a:p>
+            <a:pPr algn="ctr"/>
+            <a:r>
+              <a:rPr lang="en-US" altLang="zh-TW" sz="4000" b="0" cap="none" spc="0" dirty="0" smtClean="0">
+                <a:ln w="0"/>
+                <a:effectLst>
+                  <a:outerShdw blurRad="38100" dist="19050" dir="2700000" algn="tl" rotWithShape="0">
+                    <a:schemeClr val="dk1">
+                      <a:alpha val="40000"/>
+                    </a:schemeClr>
+                  </a:outerShdw>
+                </a:effectLst>
+              </a:rPr>
+              <a:t>Vehicle </a:t>
+            </a:r>
+            <a:r>
+              <a:rPr lang="en-US" altLang="zh-TW" sz="4000" b="0" cap="none" spc="0" dirty="0" smtClean="0">
+                <a:ln w="0"/>
+                <a:effectLst>
+                  <a:outerShdw blurRad="38100" dist="19050" dir="2700000" algn="tl" rotWithShape="0">
+                    <a:schemeClr val="dk1">
+                      <a:alpha val="40000"/>
+                    </a:schemeClr>
+                  </a:outerShdw>
+                </a:effectLst>
+              </a:rPr>
+              <a:t>stopped </a:t>
+            </a:r>
+            <a:r>
+              <a:rPr lang="en-US" altLang="zh-TW" sz="4000" b="0" cap="none" spc="0" dirty="0" smtClean="0">
+                <a:ln w="0"/>
+                <a:effectLst>
+                  <a:outerShdw blurRad="38100" dist="19050" dir="2700000" algn="tl" rotWithShape="0">
+                    <a:schemeClr val="dk1">
+                      <a:alpha val="40000"/>
+                    </a:schemeClr>
+                  </a:outerShdw>
+                </a:effectLst>
+              </a:rPr>
+              <a:t>at position </a:t>
+            </a:r>
+            <a:r>
+              <a:rPr lang="en-US" altLang="zh-TW" sz="4000" b="0" cap="none" spc="0" dirty="0" smtClean="0">
+                <a:ln w="0"/>
+                <a:solidFill>
+                  <a:srgbClr val="FF0000"/>
+                </a:solidFill>
+                <a:effectLst>
+                  <a:outerShdw blurRad="38100" dist="19050" dir="2700000" algn="tl" rotWithShape="0">
+                    <a:schemeClr val="dk1">
+                      <a:alpha val="40000"/>
+                    </a:schemeClr>
+                  </a:outerShdw>
+                </a:effectLst>
+              </a:rPr>
+              <a:t>1.0m </a:t>
+            </a:r>
+            <a:r>
+              <a:rPr lang="en-US" altLang="zh-TW" sz="4000" b="0" cap="none" spc="0" dirty="0" smtClean="0">
+                <a:ln w="0"/>
+                <a:solidFill>
+                  <a:srgbClr val="FF0000"/>
+                </a:solidFill>
+                <a:effectLst>
+                  <a:outerShdw blurRad="38100" dist="19050" dir="2700000" algn="tl" rotWithShape="0">
+                    <a:schemeClr val="dk1">
+                      <a:alpha val="40000"/>
+                    </a:schemeClr>
+                  </a:outerShdw>
+                </a:effectLst>
+              </a:rPr>
+              <a:t>of the lane </a:t>
+            </a:r>
+            <a:r>
+              <a:rPr lang="en-US" altLang="zh-TW" sz="4000" b="0" cap="none" spc="0" dirty="0" smtClean="0">
+                <a:ln w="0"/>
+                <a:effectLst>
+                  <a:outerShdw blurRad="38100" dist="19050" dir="2700000" algn="tl" rotWithShape="0">
+                    <a:schemeClr val="dk1">
+                      <a:alpha val="40000"/>
+                    </a:schemeClr>
+                  </a:outerShdw>
+                </a:effectLst>
+              </a:rPr>
+              <a:t>in </a:t>
+            </a:r>
+            <a:r>
+              <a:rPr lang="en-US" altLang="zh-TW" sz="4000" b="0" cap="none" spc="0" dirty="0" smtClean="0">
+                <a:ln w="0"/>
+                <a:effectLst>
+                  <a:outerShdw blurRad="38100" dist="19050" dir="2700000" algn="tl" rotWithShape="0">
+                    <a:schemeClr val="dk1">
+                      <a:alpha val="40000"/>
+                    </a:schemeClr>
+                  </a:outerShdw>
+                </a:effectLst>
+              </a:rPr>
+              <a:t>192.0s</a:t>
+            </a:r>
+            <a:endParaRPr lang="zh-TW" altLang="en-US" sz="4000" b="0" cap="none" spc="0" dirty="0">
+              <a:ln w="0"/>
+              <a:effectLst>
+                <a:outerShdw blurRad="38100" dist="19050" dir="2700000" algn="tl" rotWithShape="0">
+                  <a:schemeClr val="dk1">
+                    <a:alpha val="40000"/>
+                  </a:schemeClr>
+                </a:outerShdw>
+              </a:effectLst>
+            </a:endParaRPr>
+          </a:p>
+        </p:txBody>
+      </p:sp>
+      <p:sp>
+        <p:nvSpPr>
+          <p:cNvPr id="7" name="矩形 6"/>
+          <p:cNvSpPr/>
+          <p:nvPr/>
+        </p:nvSpPr>
+        <p:spPr>
+          <a:xfrm>
+            <a:off x="1230086" y="4893024"/>
+            <a:ext cx="8960516" cy="1815882"/>
+          </a:xfrm>
+          <a:prstGeom prst="rect">
+            <a:avLst/>
+          </a:prstGeom>
+          <a:noFill/>
+        </p:spPr>
+        <p:txBody>
+          <a:bodyPr wrap="square" lIns="91440" tIns="45720" rIns="91440" bIns="45720">
+            <a:spAutoFit/>
+          </a:bodyPr>
+          <a:lstStyle/>
+          <a:p>
+            <a:pPr algn="ctr"/>
+            <a:r>
+              <a:rPr lang="en-US" altLang="zh-TW" sz="2800" dirty="0" err="1" smtClean="0"/>
+              <a:t>Vehicle.setStop</a:t>
+            </a:r>
+            <a:endParaRPr lang="en-US" altLang="zh-TW" sz="2800" dirty="0" smtClean="0"/>
+          </a:p>
+          <a:p>
+            <a:pPr algn="ctr"/>
+            <a:r>
+              <a:rPr lang="en-US" altLang="zh-TW" sz="2800" dirty="0" smtClean="0"/>
+              <a:t>("</a:t>
+            </a:r>
+            <a:r>
+              <a:rPr lang="en-US" altLang="zh-TW" sz="2800" dirty="0"/>
+              <a:t>flow0.0", </a:t>
+            </a:r>
+            <a:r>
+              <a:rPr lang="en-US" altLang="zh-TW" sz="2800" dirty="0" err="1" smtClean="0"/>
+              <a:t>senderEdgeID</a:t>
+            </a:r>
+            <a:r>
+              <a:rPr lang="en-US" altLang="zh-TW" sz="2800" dirty="0"/>
+              <a:t>, </a:t>
+            </a:r>
+            <a:r>
+              <a:rPr lang="en-US" altLang="zh-TW" sz="2800" b="1" dirty="0"/>
+              <a:t>1.0</a:t>
+            </a:r>
+            <a:r>
+              <a:rPr lang="en-US" altLang="zh-TW" sz="2800" dirty="0"/>
+              <a:t>, (byte)1,  </a:t>
+            </a:r>
+            <a:endParaRPr lang="en-US" altLang="zh-TW" sz="2800" dirty="0" smtClean="0"/>
+          </a:p>
+          <a:p>
+            <a:pPr algn="ctr"/>
+            <a:r>
+              <a:rPr lang="en-US" altLang="zh-TW" sz="2800" dirty="0" smtClean="0"/>
+              <a:t>Duration=20, </a:t>
+            </a:r>
+            <a:r>
+              <a:rPr lang="en-US" altLang="zh-TW" sz="2800" dirty="0" err="1"/>
+              <a:t>SumoStopFlags</a:t>
+            </a:r>
+            <a:r>
+              <a:rPr lang="en-US" altLang="zh-TW" sz="2800" dirty="0" smtClean="0"/>
+              <a:t>));</a:t>
+            </a:r>
+            <a:endParaRPr lang="en-US" altLang="zh-TW" sz="2800" dirty="0"/>
+          </a:p>
+          <a:p>
+            <a:pPr algn="ctr"/>
+            <a:endParaRPr lang="zh-TW" altLang="en-US" sz="2800" b="0" cap="none" spc="0" dirty="0">
+              <a:ln w="0"/>
+              <a:solidFill>
+                <a:srgbClr val="FF0000"/>
+              </a:solidFill>
+              <a:effectLst>
+                <a:outerShdw blurRad="38100" dist="19050" dir="2700000" algn="tl" rotWithShape="0">
+                  <a:schemeClr val="dk1">
+                    <a:alpha val="40000"/>
+                  </a:schemeClr>
+                </a:outerShdw>
+              </a:effectLst>
+            </a:endParaRPr>
+          </a:p>
+        </p:txBody>
+      </p:sp>
+    </p:spTree>
+    <p:extLst>
+      <p:ext uri="{BB962C8B-B14F-4D97-AF65-F5344CB8AC3E}">
+        <p14:creationId xmlns:p14="http://schemas.microsoft.com/office/powerpoint/2010/main" val="2001718320"/>
       </p:ext>
     </p:extLst>
   </p:cSld>
@@ -10323,6 +10759,1054 @@
 </file>
 
 <file path=ppt/slides/slide38.xml><?xml version="1.0" encoding="utf-8"?>
+<p:sld xmlns:a="http://schemas.openxmlformats.org/drawingml/2006/main" xmlns:r="http://schemas.openxmlformats.org/officeDocument/2006/relationships" xmlns:p="http://schemas.openxmlformats.org/presentationml/2006/main">
+  <p:cSld>
+    <p:spTree>
+      <p:nvGrpSpPr>
+        <p:cNvPr id="1" name=""/>
+        <p:cNvGrpSpPr/>
+        <p:nvPr/>
+      </p:nvGrpSpPr>
+      <p:grpSpPr>
+        <a:xfrm>
+          <a:off x="0" y="0"/>
+          <a:ext cx="0" cy="0"/>
+          <a:chOff x="0" y="0"/>
+          <a:chExt cx="0" cy="0"/>
+        </a:xfrm>
+      </p:grpSpPr>
+      <p:sp>
+        <p:nvSpPr>
+          <p:cNvPr id="3" name="矩形 2"/>
+          <p:cNvSpPr/>
+          <p:nvPr/>
+        </p:nvSpPr>
+        <p:spPr>
+          <a:xfrm>
+            <a:off x="335093" y="282712"/>
+            <a:ext cx="11084022" cy="707886"/>
+          </a:xfrm>
+          <a:prstGeom prst="rect">
+            <a:avLst/>
+          </a:prstGeom>
+          <a:noFill/>
+        </p:spPr>
+        <p:txBody>
+          <a:bodyPr wrap="square" lIns="91440" tIns="45720" rIns="91440" bIns="45720">
+            <a:spAutoFit/>
+          </a:bodyPr>
+          <a:lstStyle/>
+          <a:p>
+            <a:pPr algn="ctr"/>
+            <a:r>
+              <a:rPr lang="en-US" altLang="zh-TW" sz="4000" b="0" cap="none" spc="0" dirty="0" smtClean="0">
+                <a:ln w="0"/>
+                <a:effectLst>
+                  <a:outerShdw blurRad="38100" dist="19050" dir="2700000" algn="tl" rotWithShape="0">
+                    <a:schemeClr val="dk1">
+                      <a:alpha val="40000"/>
+                    </a:schemeClr>
+                  </a:outerShdw>
+                </a:effectLst>
+              </a:rPr>
+              <a:t>A</a:t>
+            </a:r>
+            <a:r>
+              <a:rPr lang="zh-TW" altLang="en-US" sz="4000" b="0" cap="none" spc="0" dirty="0" smtClean="0">
+                <a:ln w="0"/>
+                <a:effectLst>
+                  <a:outerShdw blurRad="38100" dist="19050" dir="2700000" algn="tl" rotWithShape="0">
+                    <a:schemeClr val="dk1">
+                      <a:alpha val="40000"/>
+                    </a:schemeClr>
+                  </a:outerShdw>
+                </a:effectLst>
+              </a:rPr>
+              <a:t> </a:t>
+            </a:r>
+            <a:r>
+              <a:rPr lang="en-US" altLang="zh-TW" sz="4000" b="0" cap="none" spc="0" dirty="0" smtClean="0">
+                <a:ln w="0"/>
+                <a:effectLst>
+                  <a:outerShdw blurRad="38100" dist="19050" dir="2700000" algn="tl" rotWithShape="0">
+                    <a:schemeClr val="dk1">
+                      <a:alpha val="40000"/>
+                    </a:schemeClr>
+                  </a:outerShdw>
+                </a:effectLst>
+              </a:rPr>
+              <a:t>route after the stop of the sender</a:t>
+            </a:r>
+            <a:endParaRPr lang="zh-TW" altLang="en-US" sz="4000" b="0" cap="none" spc="0" dirty="0">
+              <a:ln w="0"/>
+              <a:effectLst>
+                <a:outerShdw blurRad="38100" dist="19050" dir="2700000" algn="tl" rotWithShape="0">
+                  <a:schemeClr val="dk1">
+                    <a:alpha val="40000"/>
+                  </a:schemeClr>
+                </a:outerShdw>
+              </a:effectLst>
+            </a:endParaRPr>
+          </a:p>
+        </p:txBody>
+      </p:sp>
+      <p:pic>
+        <p:nvPicPr>
+          <p:cNvPr id="4" name="圖片 3"/>
+          <p:cNvPicPr>
+            <a:picLocks noChangeAspect="1"/>
+          </p:cNvPicPr>
+          <p:nvPr/>
+        </p:nvPicPr>
+        <p:blipFill>
+          <a:blip r:embed="rId2">
+            <a:extLst>
+              <a:ext uri="{28A0092B-C50C-407E-A947-70E740481C1C}">
+                <a14:useLocalDpi xmlns:a14="http://schemas.microsoft.com/office/drawing/2010/main" val="0"/>
+              </a:ext>
+            </a:extLst>
+          </a:blip>
+          <a:stretch>
+            <a:fillRect/>
+          </a:stretch>
+        </p:blipFill>
+        <p:spPr>
+          <a:xfrm>
+            <a:off x="283268" y="990598"/>
+            <a:ext cx="5952455" cy="4111489"/>
+          </a:xfrm>
+          <a:prstGeom prst="rect">
+            <a:avLst/>
+          </a:prstGeom>
+        </p:spPr>
+      </p:pic>
+      <p:sp>
+        <p:nvSpPr>
+          <p:cNvPr id="5" name="矩形 4"/>
+          <p:cNvSpPr/>
+          <p:nvPr/>
+        </p:nvSpPr>
+        <p:spPr>
+          <a:xfrm>
+            <a:off x="6428488" y="1140899"/>
+            <a:ext cx="5418955" cy="2554545"/>
+          </a:xfrm>
+          <a:prstGeom prst="rect">
+            <a:avLst/>
+          </a:prstGeom>
+          <a:noFill/>
+        </p:spPr>
+        <p:txBody>
+          <a:bodyPr wrap="square" lIns="91440" tIns="45720" rIns="91440" bIns="45720">
+            <a:spAutoFit/>
+          </a:bodyPr>
+          <a:lstStyle/>
+          <a:p>
+            <a:r>
+              <a:rPr lang="en-US" altLang="zh-TW" sz="4000" b="0" cap="none" spc="0" dirty="0" smtClean="0">
+                <a:ln w="0"/>
+                <a:effectLst>
+                  <a:outerShdw blurRad="38100" dist="19050" dir="2700000" algn="tl" rotWithShape="0">
+                    <a:schemeClr val="dk1">
+                      <a:alpha val="40000"/>
+                    </a:schemeClr>
+                  </a:outerShdw>
+                </a:effectLst>
+              </a:rPr>
+              <a:t>A:192s</a:t>
+            </a:r>
+            <a:br>
+              <a:rPr lang="en-US" altLang="zh-TW" sz="4000" b="0" cap="none" spc="0" dirty="0" smtClean="0">
+                <a:ln w="0"/>
+                <a:effectLst>
+                  <a:outerShdw blurRad="38100" dist="19050" dir="2700000" algn="tl" rotWithShape="0">
+                    <a:schemeClr val="dk1">
+                      <a:alpha val="40000"/>
+                    </a:schemeClr>
+                  </a:outerShdw>
+                </a:effectLst>
+              </a:rPr>
+            </a:br>
+            <a:r>
+              <a:rPr lang="en-US" altLang="zh-TW" sz="4000" b="0" cap="none" spc="0" dirty="0" smtClean="0">
+                <a:ln w="0"/>
+                <a:effectLst>
+                  <a:outerShdw blurRad="38100" dist="19050" dir="2700000" algn="tl" rotWithShape="0">
+                    <a:schemeClr val="dk1">
+                      <a:alpha val="40000"/>
+                    </a:schemeClr>
+                  </a:outerShdw>
+                </a:effectLst>
+              </a:rPr>
+              <a:t>A_stop:192-</a:t>
+            </a:r>
+            <a:r>
+              <a:rPr lang="en-US" altLang="zh-TW" sz="4000" b="0" cap="none" spc="0" dirty="0" smtClean="0">
+                <a:ln w="0"/>
+                <a:solidFill>
+                  <a:srgbClr val="FF0000"/>
+                </a:solidFill>
+                <a:effectLst>
+                  <a:outerShdw blurRad="38100" dist="19050" dir="2700000" algn="tl" rotWithShape="0">
+                    <a:schemeClr val="dk1">
+                      <a:alpha val="40000"/>
+                    </a:schemeClr>
+                  </a:outerShdw>
+                </a:effectLst>
+              </a:rPr>
+              <a:t>212</a:t>
+            </a:r>
+            <a:r>
+              <a:rPr lang="en-US" altLang="zh-TW" sz="4000" b="0" cap="none" spc="0" dirty="0" smtClean="0">
+                <a:ln w="0"/>
+                <a:effectLst>
+                  <a:outerShdw blurRad="38100" dist="19050" dir="2700000" algn="tl" rotWithShape="0">
+                    <a:schemeClr val="dk1">
+                      <a:alpha val="40000"/>
+                    </a:schemeClr>
+                  </a:outerShdw>
+                </a:effectLst>
+              </a:rPr>
+              <a:t>s</a:t>
+            </a:r>
+          </a:p>
+          <a:p>
+            <a:r>
+              <a:rPr lang="en-US" altLang="zh-TW" sz="4000" dirty="0" smtClean="0">
+                <a:ln w="0"/>
+                <a:effectLst>
+                  <a:outerShdw blurRad="38100" dist="19050" dir="2700000" algn="tl" rotWithShape="0">
+                    <a:schemeClr val="dk1">
+                      <a:alpha val="40000"/>
+                    </a:schemeClr>
+                  </a:outerShdw>
+                </a:effectLst>
+              </a:rPr>
+              <a:t>B:</a:t>
+            </a:r>
+            <a:r>
+              <a:rPr lang="en-US" altLang="zh-TW" sz="4000" dirty="0" smtClean="0">
+                <a:ln w="0"/>
+                <a:solidFill>
+                  <a:srgbClr val="FF0000"/>
+                </a:solidFill>
+                <a:effectLst>
+                  <a:outerShdw blurRad="38100" dist="19050" dir="2700000" algn="tl" rotWithShape="0">
+                    <a:schemeClr val="dk1">
+                      <a:alpha val="40000"/>
+                    </a:schemeClr>
+                  </a:outerShdw>
+                </a:effectLst>
+              </a:rPr>
+              <a:t>217</a:t>
+            </a:r>
+            <a:r>
+              <a:rPr lang="en-US" altLang="zh-TW" sz="4000" dirty="0" smtClean="0">
+                <a:ln w="0"/>
+                <a:effectLst>
+                  <a:outerShdw blurRad="38100" dist="19050" dir="2700000" algn="tl" rotWithShape="0">
+                    <a:schemeClr val="dk1">
+                      <a:alpha val="40000"/>
+                    </a:schemeClr>
+                  </a:outerShdw>
+                </a:effectLst>
+              </a:rPr>
+              <a:t>s</a:t>
+            </a:r>
+            <a:endParaRPr lang="en-US" altLang="zh-TW" sz="4000" b="0" cap="none" spc="0" dirty="0" smtClean="0">
+              <a:ln w="0"/>
+              <a:effectLst>
+                <a:outerShdw blurRad="38100" dist="19050" dir="2700000" algn="tl" rotWithShape="0">
+                  <a:schemeClr val="dk1">
+                    <a:alpha val="40000"/>
+                  </a:schemeClr>
+                </a:outerShdw>
+              </a:effectLst>
+            </a:endParaRPr>
+          </a:p>
+          <a:p>
+            <a:endParaRPr lang="zh-TW" altLang="en-US" sz="4000" b="0" cap="none" spc="0" dirty="0">
+              <a:ln w="0"/>
+              <a:effectLst>
+                <a:outerShdw blurRad="38100" dist="19050" dir="2700000" algn="tl" rotWithShape="0">
+                  <a:schemeClr val="dk1">
+                    <a:alpha val="40000"/>
+                  </a:schemeClr>
+                </a:outerShdw>
+              </a:effectLst>
+            </a:endParaRPr>
+          </a:p>
+        </p:txBody>
+      </p:sp>
+      <p:sp>
+        <p:nvSpPr>
+          <p:cNvPr id="6" name="矩形 5"/>
+          <p:cNvSpPr/>
+          <p:nvPr/>
+        </p:nvSpPr>
+        <p:spPr>
+          <a:xfrm>
+            <a:off x="6428487" y="3845745"/>
+            <a:ext cx="5418955" cy="2554545"/>
+          </a:xfrm>
+          <a:prstGeom prst="rect">
+            <a:avLst/>
+          </a:prstGeom>
+          <a:noFill/>
+        </p:spPr>
+        <p:txBody>
+          <a:bodyPr wrap="square" lIns="91440" tIns="45720" rIns="91440" bIns="45720">
+            <a:spAutoFit/>
+          </a:bodyPr>
+          <a:lstStyle/>
+          <a:p>
+            <a:pPr algn="ctr"/>
+            <a:r>
+              <a:rPr lang="en-US" altLang="zh-TW" sz="4000" b="0" cap="none" spc="0" dirty="0" smtClean="0">
+                <a:ln w="0"/>
+                <a:effectLst>
+                  <a:outerShdw blurRad="38100" dist="19050" dir="2700000" algn="tl" rotWithShape="0">
+                    <a:schemeClr val="dk1">
+                      <a:alpha val="40000"/>
+                    </a:schemeClr>
+                  </a:outerShdw>
+                </a:effectLst>
+              </a:rPr>
+              <a:t>If we do not arrange the new route of this vehicle before arriving B, this car </a:t>
+            </a:r>
+            <a:r>
+              <a:rPr lang="en-US" altLang="zh-TW" sz="4000" dirty="0">
+                <a:ln w="0"/>
+                <a:effectLst>
+                  <a:outerShdw blurRad="38100" dist="19050" dir="2700000" algn="tl" rotWithShape="0">
+                    <a:schemeClr val="dk1">
+                      <a:alpha val="40000"/>
+                    </a:schemeClr>
+                  </a:outerShdw>
+                </a:effectLst>
+              </a:rPr>
+              <a:t>would </a:t>
+            </a:r>
+            <a:r>
+              <a:rPr lang="en-US" altLang="zh-TW" sz="4000" dirty="0">
+                <a:ln w="0"/>
+                <a:solidFill>
+                  <a:srgbClr val="FF0000"/>
+                </a:solidFill>
+                <a:effectLst>
+                  <a:outerShdw blurRad="38100" dist="19050" dir="2700000" algn="tl" rotWithShape="0">
+                    <a:schemeClr val="dk1">
+                      <a:alpha val="40000"/>
+                    </a:schemeClr>
+                  </a:outerShdw>
+                </a:effectLst>
+              </a:rPr>
+              <a:t>disappear</a:t>
+            </a:r>
+            <a:r>
+              <a:rPr lang="en-US" altLang="zh-TW" sz="4000" dirty="0">
+                <a:ln w="0"/>
+                <a:effectLst>
+                  <a:outerShdw blurRad="38100" dist="19050" dir="2700000" algn="tl" rotWithShape="0">
+                    <a:schemeClr val="dk1">
+                      <a:alpha val="40000"/>
+                    </a:schemeClr>
+                  </a:outerShdw>
+                </a:effectLst>
+              </a:rPr>
+              <a:t> </a:t>
+            </a:r>
+            <a:r>
+              <a:rPr lang="en-US" altLang="zh-TW" sz="4000" b="0" cap="none" spc="0" dirty="0" smtClean="0">
+                <a:ln w="0"/>
+                <a:effectLst>
+                  <a:outerShdw blurRad="38100" dist="19050" dir="2700000" algn="tl" rotWithShape="0">
+                    <a:schemeClr val="dk1">
+                      <a:alpha val="40000"/>
+                    </a:schemeClr>
+                  </a:outerShdw>
+                </a:effectLst>
+              </a:rPr>
+              <a:t>at B.</a:t>
+            </a:r>
+            <a:endParaRPr lang="zh-TW" altLang="en-US" sz="4000" b="0" cap="none" spc="0" dirty="0">
+              <a:ln w="0"/>
+              <a:effectLst>
+                <a:outerShdw blurRad="38100" dist="19050" dir="2700000" algn="tl" rotWithShape="0">
+                  <a:schemeClr val="dk1">
+                    <a:alpha val="40000"/>
+                  </a:schemeClr>
+                </a:outerShdw>
+              </a:effectLst>
+            </a:endParaRPr>
+          </a:p>
+        </p:txBody>
+      </p:sp>
+    </p:spTree>
+    <p:extLst>
+      <p:ext uri="{BB962C8B-B14F-4D97-AF65-F5344CB8AC3E}">
+        <p14:creationId xmlns:p14="http://schemas.microsoft.com/office/powerpoint/2010/main" val="929259071"/>
+      </p:ext>
+    </p:extLst>
+  </p:cSld>
+  <p:clrMapOvr>
+    <a:masterClrMapping/>
+  </p:clrMapOvr>
+</p:sld>
+</file>
+
+<file path=ppt/slides/slide39.xml><?xml version="1.0" encoding="utf-8"?>
+<p:sld xmlns:a="http://schemas.openxmlformats.org/drawingml/2006/main" xmlns:r="http://schemas.openxmlformats.org/officeDocument/2006/relationships" xmlns:p="http://schemas.openxmlformats.org/presentationml/2006/main">
+  <p:cSld>
+    <p:spTree>
+      <p:nvGrpSpPr>
+        <p:cNvPr id="1" name=""/>
+        <p:cNvGrpSpPr/>
+        <p:nvPr/>
+      </p:nvGrpSpPr>
+      <p:grpSpPr>
+        <a:xfrm>
+          <a:off x="0" y="0"/>
+          <a:ext cx="0" cy="0"/>
+          <a:chOff x="0" y="0"/>
+          <a:chExt cx="0" cy="0"/>
+        </a:xfrm>
+      </p:grpSpPr>
+      <p:sp>
+        <p:nvSpPr>
+          <p:cNvPr id="2" name="標題 1"/>
+          <p:cNvSpPr>
+            <a:spLocks noGrp="1"/>
+          </p:cNvSpPr>
+          <p:nvPr>
+            <p:ph type="title"/>
+          </p:nvPr>
+        </p:nvSpPr>
+        <p:spPr>
+          <a:xfrm>
+            <a:off x="838200" y="365126"/>
+            <a:ext cx="5165035" cy="602284"/>
+          </a:xfrm>
+        </p:spPr>
+        <p:txBody>
+          <a:bodyPr>
+            <a:normAutofit fontScale="90000"/>
+          </a:bodyPr>
+          <a:lstStyle/>
+          <a:p>
+            <a:r>
+              <a:rPr lang="en-US" altLang="zh-TW" b="1" dirty="0" smtClean="0"/>
+              <a:t>Re-build the new route</a:t>
+            </a:r>
+            <a:endParaRPr lang="zh-TW" altLang="en-US" b="1" dirty="0"/>
+          </a:p>
+        </p:txBody>
+      </p:sp>
+      <p:sp>
+        <p:nvSpPr>
+          <p:cNvPr id="6" name="矩形 5"/>
+          <p:cNvSpPr/>
+          <p:nvPr/>
+        </p:nvSpPr>
+        <p:spPr>
+          <a:xfrm>
+            <a:off x="5698435" y="1815547"/>
+            <a:ext cx="6334539" cy="4832092"/>
+          </a:xfrm>
+          <a:prstGeom prst="rect">
+            <a:avLst/>
+          </a:prstGeom>
+          <a:solidFill>
+            <a:schemeClr val="accent2">
+              <a:lumMod val="40000"/>
+              <a:lumOff val="60000"/>
+            </a:schemeClr>
+          </a:solidFill>
+        </p:spPr>
+        <p:txBody>
+          <a:bodyPr wrap="square" lIns="91440" tIns="45720" rIns="91440" bIns="45720">
+            <a:spAutoFit/>
+          </a:bodyPr>
+          <a:lstStyle/>
+          <a:p>
+            <a:r>
+              <a:rPr lang="zh-TW" altLang="en-US" sz="2800" dirty="0"/>
+              <a:t>if(timeSeconds==</a:t>
+            </a:r>
+            <a:r>
+              <a:rPr lang="zh-TW" altLang="en-US" sz="2800" dirty="0">
+                <a:solidFill>
+                  <a:srgbClr val="FF0000"/>
+                </a:solidFill>
+              </a:rPr>
+              <a:t>214.0</a:t>
+            </a:r>
+            <a:r>
+              <a:rPr lang="zh-TW" altLang="en-US" sz="2800" dirty="0"/>
+              <a:t>) { </a:t>
+            </a:r>
+            <a:endParaRPr lang="en-US" altLang="zh-TW" sz="2800" dirty="0" smtClean="0"/>
+          </a:p>
+          <a:p>
+            <a:r>
+              <a:rPr lang="zh-TW" altLang="en-US" sz="2800" dirty="0" smtClean="0"/>
+              <a:t>String </a:t>
+            </a:r>
+            <a:r>
+              <a:rPr lang="zh-TW" altLang="en-US" sz="2800" dirty="0">
+                <a:solidFill>
+                  <a:srgbClr val="FF0000"/>
+                </a:solidFill>
+              </a:rPr>
+              <a:t>receiverEdgeID</a:t>
+            </a:r>
+            <a:r>
+              <a:rPr lang="zh-TW" altLang="en-US" sz="2800" dirty="0"/>
+              <a:t> = "-279032146#1"</a:t>
+            </a:r>
+            <a:r>
+              <a:rPr lang="zh-TW" altLang="en-US" sz="2800" dirty="0" smtClean="0"/>
+              <a:t>;.</a:t>
+            </a:r>
+            <a:endParaRPr lang="en-US" altLang="zh-TW" sz="2800" dirty="0" smtClean="0"/>
+          </a:p>
+          <a:p>
+            <a:r>
+              <a:rPr lang="zh-TW" altLang="en-US" sz="2800" dirty="0" smtClean="0"/>
+              <a:t>changeTarget</a:t>
+            </a:r>
+            <a:r>
+              <a:rPr lang="zh-TW" altLang="en-US" sz="2800" dirty="0"/>
+              <a:t>("flow0.0", receiverEdgeID)); </a:t>
+            </a:r>
+            <a:endParaRPr lang="en-US" altLang="zh-TW" sz="2800" dirty="0" smtClean="0"/>
+          </a:p>
+          <a:p>
+            <a:endParaRPr lang="en-US" altLang="zh-TW" sz="2800" dirty="0" smtClean="0"/>
+          </a:p>
+          <a:p>
+            <a:r>
+              <a:rPr lang="zh-TW" altLang="en-US" sz="2800" dirty="0" smtClean="0"/>
+              <a:t>new SumoStopFlags</a:t>
+            </a:r>
+            <a:endParaRPr lang="en-US" altLang="zh-TW" sz="2800" dirty="0" smtClean="0"/>
+          </a:p>
+          <a:p>
+            <a:r>
+              <a:rPr lang="zh-TW" altLang="en-US" sz="2800" dirty="0" smtClean="0"/>
+              <a:t>double </a:t>
+            </a:r>
+            <a:r>
+              <a:rPr lang="zh-TW" altLang="en-US" sz="2800" dirty="0"/>
+              <a:t>duration = 20.0; </a:t>
+            </a:r>
+            <a:endParaRPr lang="en-US" altLang="zh-TW" sz="2800" dirty="0" smtClean="0"/>
+          </a:p>
+          <a:p>
+            <a:endParaRPr lang="en-US" altLang="zh-TW" sz="2800" dirty="0" smtClean="0"/>
+          </a:p>
+          <a:p>
+            <a:r>
+              <a:rPr lang="zh-TW" altLang="en-US" sz="2800" dirty="0" smtClean="0"/>
+              <a:t>setStop</a:t>
+            </a:r>
+            <a:r>
+              <a:rPr lang="zh-TW" altLang="en-US" sz="2800" dirty="0"/>
+              <a:t>("flow0.0", receiverEdgeID, 1.0, (byte)0, duration, sf_rec)); </a:t>
+            </a:r>
+            <a:endParaRPr lang="en-US" altLang="zh-TW" sz="2800" dirty="0" smtClean="0"/>
+          </a:p>
+          <a:p>
+            <a:endParaRPr lang="en-US" altLang="zh-TW" sz="2800" dirty="0" smtClean="0"/>
+          </a:p>
+          <a:p>
+            <a:r>
+              <a:rPr lang="zh-TW" altLang="en-US" sz="2800" dirty="0" smtClean="0"/>
+              <a:t>}</a:t>
+            </a:r>
+            <a:endParaRPr lang="zh-TW" altLang="en-US" sz="2800" dirty="0"/>
+          </a:p>
+        </p:txBody>
+      </p:sp>
+      <p:pic>
+        <p:nvPicPr>
+          <p:cNvPr id="7" name="圖片 6"/>
+          <p:cNvPicPr>
+            <a:picLocks noChangeAspect="1"/>
+          </p:cNvPicPr>
+          <p:nvPr/>
+        </p:nvPicPr>
+        <p:blipFill rotWithShape="1">
+          <a:blip r:embed="rId2">
+            <a:extLst>
+              <a:ext uri="{28A0092B-C50C-407E-A947-70E740481C1C}">
+                <a14:useLocalDpi xmlns:a14="http://schemas.microsoft.com/office/drawing/2010/main" val="0"/>
+              </a:ext>
+            </a:extLst>
+          </a:blip>
+          <a:srcRect r="18573"/>
+          <a:stretch/>
+        </p:blipFill>
+        <p:spPr>
+          <a:xfrm>
+            <a:off x="495300" y="2663687"/>
+            <a:ext cx="4593535" cy="3896595"/>
+          </a:xfrm>
+          <a:prstGeom prst="rect">
+            <a:avLst/>
+          </a:prstGeom>
+        </p:spPr>
+      </p:pic>
+      <p:sp>
+        <p:nvSpPr>
+          <p:cNvPr id="8" name="矩形 7"/>
+          <p:cNvSpPr/>
+          <p:nvPr/>
+        </p:nvSpPr>
+        <p:spPr>
+          <a:xfrm>
+            <a:off x="1119810" y="1709580"/>
+            <a:ext cx="2849217" cy="954107"/>
+          </a:xfrm>
+          <a:prstGeom prst="rect">
+            <a:avLst/>
+          </a:prstGeom>
+          <a:solidFill>
+            <a:schemeClr val="bg1">
+              <a:lumMod val="85000"/>
+            </a:schemeClr>
+          </a:solidFill>
+        </p:spPr>
+        <p:txBody>
+          <a:bodyPr wrap="square">
+            <a:spAutoFit/>
+          </a:bodyPr>
+          <a:lstStyle/>
+          <a:p>
+            <a:r>
+              <a:rPr lang="en-US" altLang="zh-TW" sz="2800" dirty="0">
+                <a:ln w="0"/>
+                <a:effectLst>
+                  <a:outerShdw blurRad="38100" dist="19050" dir="2700000" algn="tl" rotWithShape="0">
+                    <a:schemeClr val="dk1">
+                      <a:alpha val="40000"/>
+                    </a:schemeClr>
+                  </a:outerShdw>
+                </a:effectLst>
+              </a:rPr>
+              <a:t>A_stop:192-</a:t>
+            </a:r>
+            <a:r>
+              <a:rPr lang="en-US" altLang="zh-TW" sz="2800" dirty="0">
+                <a:ln w="0"/>
+                <a:solidFill>
+                  <a:srgbClr val="FF0000"/>
+                </a:solidFill>
+                <a:effectLst>
+                  <a:outerShdw blurRad="38100" dist="19050" dir="2700000" algn="tl" rotWithShape="0">
+                    <a:schemeClr val="dk1">
+                      <a:alpha val="40000"/>
+                    </a:schemeClr>
+                  </a:outerShdw>
+                </a:effectLst>
+              </a:rPr>
+              <a:t>212</a:t>
+            </a:r>
+            <a:r>
+              <a:rPr lang="en-US" altLang="zh-TW" sz="2800" dirty="0">
+                <a:ln w="0"/>
+                <a:effectLst>
+                  <a:outerShdw blurRad="38100" dist="19050" dir="2700000" algn="tl" rotWithShape="0">
+                    <a:schemeClr val="dk1">
+                      <a:alpha val="40000"/>
+                    </a:schemeClr>
+                  </a:outerShdw>
+                </a:effectLst>
+              </a:rPr>
+              <a:t>s</a:t>
+            </a:r>
+          </a:p>
+          <a:p>
+            <a:r>
+              <a:rPr lang="en-US" altLang="zh-TW" sz="2800" dirty="0">
+                <a:ln w="0"/>
+                <a:effectLst>
+                  <a:outerShdw blurRad="38100" dist="19050" dir="2700000" algn="tl" rotWithShape="0">
+                    <a:schemeClr val="dk1">
+                      <a:alpha val="40000"/>
+                    </a:schemeClr>
+                  </a:outerShdw>
+                </a:effectLst>
+              </a:rPr>
+              <a:t>B:</a:t>
+            </a:r>
+            <a:r>
+              <a:rPr lang="en-US" altLang="zh-TW" sz="2800" dirty="0">
+                <a:ln w="0"/>
+                <a:solidFill>
+                  <a:srgbClr val="FF0000"/>
+                </a:solidFill>
+                <a:effectLst>
+                  <a:outerShdw blurRad="38100" dist="19050" dir="2700000" algn="tl" rotWithShape="0">
+                    <a:schemeClr val="dk1">
+                      <a:alpha val="40000"/>
+                    </a:schemeClr>
+                  </a:outerShdw>
+                </a:effectLst>
+              </a:rPr>
+              <a:t>217</a:t>
+            </a:r>
+            <a:r>
+              <a:rPr lang="en-US" altLang="zh-TW" sz="2800" dirty="0">
+                <a:ln w="0"/>
+                <a:effectLst>
+                  <a:outerShdw blurRad="38100" dist="19050" dir="2700000" algn="tl" rotWithShape="0">
+                    <a:schemeClr val="dk1">
+                      <a:alpha val="40000"/>
+                    </a:schemeClr>
+                  </a:outerShdw>
+                </a:effectLst>
+              </a:rPr>
+              <a:t>s</a:t>
+            </a:r>
+          </a:p>
+        </p:txBody>
+      </p:sp>
+    </p:spTree>
+    <p:extLst>
+      <p:ext uri="{BB962C8B-B14F-4D97-AF65-F5344CB8AC3E}">
+        <p14:creationId xmlns:p14="http://schemas.microsoft.com/office/powerpoint/2010/main" val="4289141150"/>
+      </p:ext>
+    </p:extLst>
+  </p:cSld>
+  <p:clrMapOvr>
+    <a:masterClrMapping/>
+  </p:clrMapOvr>
+</p:sld>
+</file>
+
+<file path=ppt/slides/slide4.xml><?xml version="1.0" encoding="utf-8"?>
+<p:sld xmlns:a="http://schemas.openxmlformats.org/drawingml/2006/main" xmlns:r="http://schemas.openxmlformats.org/officeDocument/2006/relationships" xmlns:p="http://schemas.openxmlformats.org/presentationml/2006/main">
+  <p:cSld>
+    <p:spTree>
+      <p:nvGrpSpPr>
+        <p:cNvPr id="1" name=""/>
+        <p:cNvGrpSpPr/>
+        <p:nvPr/>
+      </p:nvGrpSpPr>
+      <p:grpSpPr>
+        <a:xfrm>
+          <a:off x="0" y="0"/>
+          <a:ext cx="0" cy="0"/>
+          <a:chOff x="0" y="0"/>
+          <a:chExt cx="0" cy="0"/>
+        </a:xfrm>
+      </p:grpSpPr>
+      <p:sp>
+        <p:nvSpPr>
+          <p:cNvPr id="2" name="標題 1"/>
+          <p:cNvSpPr>
+            <a:spLocks noGrp="1"/>
+          </p:cNvSpPr>
+          <p:nvPr>
+            <p:ph type="title"/>
+          </p:nvPr>
+        </p:nvSpPr>
+        <p:spPr/>
+        <p:txBody>
+          <a:bodyPr>
+            <a:normAutofit/>
+          </a:bodyPr>
+          <a:lstStyle/>
+          <a:p>
+            <a:r>
+              <a:rPr lang="zh-TW" altLang="en-US" sz="3200" b="1" dirty="0" smtClean="0"/>
+              <a:t>動態路徑規劃</a:t>
+            </a:r>
+            <a:endParaRPr lang="zh-TW" altLang="en-US" sz="3200" b="1" dirty="0"/>
+          </a:p>
+        </p:txBody>
+      </p:sp>
+      <p:sp>
+        <p:nvSpPr>
+          <p:cNvPr id="3" name="內容版面配置區 2"/>
+          <p:cNvSpPr>
+            <a:spLocks noGrp="1"/>
+          </p:cNvSpPr>
+          <p:nvPr>
+            <p:ph idx="1"/>
+          </p:nvPr>
+        </p:nvSpPr>
+        <p:spPr/>
+        <p:txBody>
+          <a:bodyPr>
+            <a:normAutofit/>
+          </a:bodyPr>
+          <a:lstStyle/>
+          <a:p>
+            <a:r>
+              <a:rPr lang="en-US" altLang="zh-TW" dirty="0" smtClean="0"/>
+              <a:t>1.</a:t>
+            </a:r>
+            <a:r>
+              <a:rPr lang="zh-TW" altLang="en-US" dirty="0" smtClean="0"/>
+              <a:t>把剛才挑選的</a:t>
+            </a:r>
+            <a:r>
+              <a:rPr lang="en-US" altLang="zh-TW" dirty="0" smtClean="0"/>
+              <a:t>car5</a:t>
+            </a:r>
+            <a:r>
+              <a:rPr lang="zh-TW" altLang="en-US" dirty="0" smtClean="0"/>
+              <a:t>設定為派遣車輛，取得</a:t>
+            </a:r>
+            <a:r>
+              <a:rPr lang="en-US" altLang="zh-TW" dirty="0" smtClean="0"/>
+              <a:t>car5</a:t>
+            </a:r>
+            <a:r>
+              <a:rPr lang="zh-TW" altLang="en-US" dirty="0" smtClean="0"/>
+              <a:t>的</a:t>
+            </a:r>
+            <a:r>
+              <a:rPr lang="en-US" altLang="zh-TW" dirty="0" err="1" smtClean="0"/>
+              <a:t>gui</a:t>
+            </a:r>
+            <a:r>
+              <a:rPr lang="en-US" altLang="zh-TW" dirty="0" smtClean="0"/>
+              <a:t>-position(</a:t>
+            </a:r>
+            <a:r>
+              <a:rPr lang="en-US" altLang="zh-TW" dirty="0" err="1" smtClean="0"/>
+              <a:t>x,y</a:t>
+            </a:r>
+            <a:r>
+              <a:rPr lang="zh-TW" altLang="en-US" dirty="0" smtClean="0"/>
+              <a:t>座標</a:t>
+            </a:r>
+            <a:r>
+              <a:rPr lang="en-US" altLang="zh-TW" dirty="0" smtClean="0"/>
+              <a:t>)</a:t>
+            </a:r>
+            <a:r>
+              <a:rPr lang="zh-TW" altLang="en-US" dirty="0" smtClean="0"/>
+              <a:t>與</a:t>
+            </a:r>
+            <a:r>
+              <a:rPr lang="en-US" altLang="zh-TW" dirty="0" smtClean="0"/>
+              <a:t>car5_roadID(</a:t>
+            </a:r>
+            <a:r>
+              <a:rPr lang="zh-TW" altLang="en-US" dirty="0" smtClean="0"/>
+              <a:t>也就是</a:t>
+            </a:r>
+            <a:r>
+              <a:rPr lang="en-US" altLang="zh-TW" dirty="0" smtClean="0"/>
+              <a:t>car5_edgID)</a:t>
+            </a:r>
+          </a:p>
+          <a:p>
+            <a:r>
+              <a:rPr lang="en-US" altLang="zh-TW" dirty="0" smtClean="0"/>
+              <a:t>2.</a:t>
+            </a:r>
+            <a:r>
+              <a:rPr lang="zh-TW" altLang="en-US" dirty="0" smtClean="0"/>
+              <a:t>給</a:t>
+            </a:r>
+            <a:r>
+              <a:rPr lang="en-US" altLang="zh-TW" dirty="0" err="1" smtClean="0"/>
+              <a:t>startEdge</a:t>
+            </a:r>
+            <a:r>
+              <a:rPr lang="en-US" altLang="zh-TW" dirty="0" smtClean="0"/>
+              <a:t>: car5_edgID, </a:t>
+            </a:r>
+            <a:r>
+              <a:rPr lang="en-US" altLang="zh-TW" dirty="0" err="1" smtClean="0"/>
+              <a:t>endEdge:sender_address_edgeID</a:t>
+            </a:r>
+            <a:endParaRPr lang="en-US" altLang="zh-TW" dirty="0" smtClean="0"/>
+          </a:p>
+          <a:p>
+            <a:r>
+              <a:rPr lang="en-US" altLang="zh-TW" dirty="0" smtClean="0"/>
+              <a:t>3.</a:t>
+            </a:r>
+            <a:r>
+              <a:rPr lang="zh-TW" altLang="en-US" dirty="0" smtClean="0"/>
+              <a:t>接著是動態規畫路徑，目前還沒查到</a:t>
+            </a:r>
+            <a:r>
+              <a:rPr lang="en-US" altLang="zh-TW" dirty="0" err="1" smtClean="0"/>
+              <a:t>ws</a:t>
+            </a:r>
+            <a:r>
+              <a:rPr lang="zh-TW" altLang="en-US" dirty="0" smtClean="0"/>
+              <a:t>的相關用法，所以用</a:t>
+            </a:r>
+            <a:r>
+              <a:rPr lang="en-US" altLang="zh-TW" dirty="0" err="1" smtClean="0"/>
+              <a:t>TraCI</a:t>
+            </a:r>
+            <a:r>
+              <a:rPr lang="en-US" altLang="zh-TW" dirty="0" smtClean="0"/>
+              <a:t>(python)</a:t>
+            </a:r>
+            <a:r>
+              <a:rPr lang="zh-TW" altLang="en-US" dirty="0" smtClean="0"/>
+              <a:t>代替表示</a:t>
+            </a:r>
+            <a:r>
+              <a:rPr lang="en-US" altLang="zh-TW" dirty="0" smtClean="0"/>
+              <a:t>: </a:t>
+            </a:r>
+          </a:p>
+          <a:p>
+            <a:pPr lvl="1"/>
+            <a:r>
+              <a:rPr lang="en-US" altLang="zh-TW" dirty="0" err="1" smtClean="0"/>
+              <a:t>traci.route.add</a:t>
+            </a:r>
+            <a:r>
+              <a:rPr lang="en-US" altLang="zh-TW" dirty="0" smtClean="0"/>
+              <a:t>("trip", ["</a:t>
+            </a:r>
+            <a:r>
+              <a:rPr lang="en-US" altLang="zh-TW" dirty="0" err="1" smtClean="0"/>
+              <a:t>startEdge</a:t>
+            </a:r>
+            <a:r>
+              <a:rPr lang="en-US" altLang="zh-TW" dirty="0" smtClean="0"/>
+              <a:t>", "</a:t>
+            </a:r>
+            <a:r>
+              <a:rPr lang="en-US" altLang="zh-TW" dirty="0" err="1" smtClean="0"/>
+              <a:t>endEdge</a:t>
+            </a:r>
+            <a:r>
+              <a:rPr lang="en-US" altLang="zh-TW" dirty="0" smtClean="0"/>
+              <a:t>"])</a:t>
+            </a:r>
+          </a:p>
+          <a:p>
+            <a:pPr lvl="1"/>
+            <a:r>
+              <a:rPr lang="en-US" altLang="zh-TW" dirty="0" err="1" smtClean="0"/>
+              <a:t>traci.vehicle.add</a:t>
+            </a:r>
+            <a:r>
+              <a:rPr lang="en-US" altLang="zh-TW" dirty="0" smtClean="0"/>
+              <a:t>(“</a:t>
+            </a:r>
+            <a:r>
+              <a:rPr lang="en-US" altLang="zh-TW" dirty="0" err="1" smtClean="0"/>
+              <a:t>newVeh</a:t>
+            </a:r>
+            <a:r>
+              <a:rPr lang="en-US" altLang="zh-TW" dirty="0" smtClean="0"/>
+              <a:t>”, “trip”, </a:t>
+            </a:r>
+            <a:r>
+              <a:rPr lang="en-US" altLang="zh-TW" dirty="0" err="1" smtClean="0"/>
+              <a:t>typeID</a:t>
+            </a:r>
+            <a:r>
+              <a:rPr lang="en-US" altLang="zh-TW" dirty="0" smtClean="0"/>
+              <a:t>=“</a:t>
+            </a:r>
+            <a:r>
+              <a:rPr lang="en-US" altLang="zh-TW" dirty="0" err="1" smtClean="0"/>
+              <a:t>reroutingType</a:t>
+            </a:r>
+            <a:r>
+              <a:rPr lang="en-US" altLang="zh-TW" dirty="0" smtClean="0"/>
+              <a:t>”) //</a:t>
+            </a:r>
+            <a:r>
+              <a:rPr lang="zh-TW" altLang="en-US" dirty="0" smtClean="0"/>
+              <a:t>增加這台車</a:t>
+            </a:r>
+            <a:endParaRPr lang="en-US" altLang="zh-TW" dirty="0" smtClean="0"/>
+          </a:p>
+          <a:p>
+            <a:pPr lvl="1"/>
+            <a:endParaRPr lang="en-US" altLang="zh-TW" dirty="0" smtClean="0"/>
+          </a:p>
+          <a:p>
+            <a:r>
+              <a:rPr lang="en-US" altLang="zh-TW" dirty="0" smtClean="0"/>
+              <a:t>4.</a:t>
+            </a:r>
+            <a:r>
+              <a:rPr lang="zh-TW" altLang="en-US" dirty="0" smtClean="0"/>
+              <a:t>關鍵在於如何用</a:t>
+            </a:r>
+            <a:r>
+              <a:rPr lang="en-US" altLang="zh-TW" dirty="0" smtClean="0"/>
+              <a:t>scripts</a:t>
+            </a:r>
+            <a:r>
+              <a:rPr lang="zh-TW" altLang="en-US" dirty="0" smtClean="0"/>
+              <a:t>與起始終點邊，規劃出一條</a:t>
+            </a:r>
+            <a:r>
+              <a:rPr lang="en-US" altLang="zh-TW" dirty="0" smtClean="0"/>
+              <a:t>route</a:t>
+            </a:r>
+            <a:r>
+              <a:rPr lang="zh-TW" altLang="en-US" dirty="0" smtClean="0"/>
+              <a:t>，，比較接近的是</a:t>
+            </a:r>
+            <a:r>
+              <a:rPr lang="en-US" altLang="zh-TW" dirty="0" err="1" smtClean="0"/>
+              <a:t>ws.RouteAdd</a:t>
+            </a:r>
+            <a:r>
+              <a:rPr lang="en-US" altLang="zh-TW" dirty="0" smtClean="0"/>
+              <a:t>(String </a:t>
+            </a:r>
+            <a:r>
+              <a:rPr lang="en-US" altLang="zh-TW" dirty="0" err="1" smtClean="0"/>
+              <a:t>routeID</a:t>
+            </a:r>
+            <a:r>
+              <a:rPr lang="en-US" altLang="zh-TW" dirty="0" smtClean="0"/>
+              <a:t>, List&lt;String&gt; edges)</a:t>
+            </a:r>
+          </a:p>
+          <a:p>
+            <a:endParaRPr lang="en-US" altLang="zh-TW" dirty="0" smtClean="0"/>
+          </a:p>
+          <a:p>
+            <a:endParaRPr lang="en-US" altLang="zh-TW" dirty="0" smtClean="0"/>
+          </a:p>
+          <a:p>
+            <a:endParaRPr lang="zh-TW" altLang="en-US" dirty="0"/>
+          </a:p>
+        </p:txBody>
+      </p:sp>
+    </p:spTree>
+    <p:extLst>
+      <p:ext uri="{BB962C8B-B14F-4D97-AF65-F5344CB8AC3E}">
+        <p14:creationId xmlns:p14="http://schemas.microsoft.com/office/powerpoint/2010/main" val="1553269630"/>
+      </p:ext>
+    </p:extLst>
+  </p:cSld>
+  <p:clrMapOvr>
+    <a:masterClrMapping/>
+  </p:clrMapOvr>
+  <p:timing>
+    <p:tnLst>
+      <p:par>
+        <p:cTn id="1" dur="indefinite" restart="never" nodeType="tmRoot"/>
+      </p:par>
+    </p:tnLst>
+  </p:timing>
+</p:sld>
+</file>
+
+<file path=ppt/slides/slide40.xml><?xml version="1.0" encoding="utf-8"?>
 <p:sld xmlns:a="http://schemas.openxmlformats.org/drawingml/2006/main" xmlns:r="http://schemas.openxmlformats.org/officeDocument/2006/relationships" xmlns:p="http://schemas.openxmlformats.org/presentationml/2006/main">
   <p:cSld>
     <p:spTree>
@@ -10361,8 +11845,8 @@
         </p:blipFill>
         <p:spPr>
           <a:xfrm>
-            <a:off x="291550" y="2198913"/>
-            <a:ext cx="6852697" cy="4351815"/>
+            <a:off x="-1" y="220939"/>
+            <a:ext cx="7873926" cy="5994331"/>
           </a:xfrm>
           <a:prstGeom prst="rect">
             <a:avLst/>
@@ -10371,19 +11855,24 @@
       </p:pic>
       <p:sp>
         <p:nvSpPr>
-          <p:cNvPr id="6" name="矩形 5"/>
+          <p:cNvPr id="4" name="矩形 3"/>
           <p:cNvSpPr/>
           <p:nvPr/>
         </p:nvSpPr>
         <p:spPr>
           <a:xfrm>
-            <a:off x="163286" y="429709"/>
-            <a:ext cx="10352315" cy="1323439"/>
+            <a:off x="8229600" y="1687900"/>
+            <a:ext cx="3869635" cy="3970318"/>
           </a:xfrm>
           <a:prstGeom prst="rect">
             <a:avLst/>
           </a:prstGeom>
-          <a:noFill/>
+          <a:solidFill>
+            <a:schemeClr val="accent2">
+              <a:lumMod val="40000"/>
+              <a:lumOff val="60000"/>
+            </a:schemeClr>
+          </a:solidFill>
         </p:spPr>
         <p:txBody>
           <a:bodyPr wrap="square" lIns="91440" tIns="45720" rIns="91440" bIns="45720">
@@ -10391,187 +11880,96 @@
           </a:bodyPr>
           <a:lstStyle/>
           <a:p>
-            <a:pPr algn="ctr"/>
-            <a:r>
-              <a:rPr lang="en-US" altLang="zh-TW" sz="4000" b="0" cap="none" spc="0" dirty="0" smtClean="0">
-                <a:ln w="0"/>
-                <a:effectLst>
-                  <a:outerShdw blurRad="38100" dist="19050" dir="2700000" algn="tl" rotWithShape="0">
-                    <a:schemeClr val="dk1">
-                      <a:alpha val="40000"/>
-                    </a:schemeClr>
-                  </a:outerShdw>
-                </a:effectLst>
-              </a:rPr>
-              <a:t>Vehicle </a:t>
-            </a:r>
-            <a:r>
-              <a:rPr lang="en-US" altLang="zh-TW" sz="4000" b="0" cap="none" spc="0" dirty="0" err="1" smtClean="0">
-                <a:ln w="0"/>
-                <a:effectLst>
-                  <a:outerShdw blurRad="38100" dist="19050" dir="2700000" algn="tl" rotWithShape="0">
-                    <a:schemeClr val="dk1">
-                      <a:alpha val="40000"/>
-                    </a:schemeClr>
-                  </a:outerShdw>
-                </a:effectLst>
-              </a:rPr>
-              <a:t>stoped</a:t>
-            </a:r>
-            <a:r>
-              <a:rPr lang="en-US" altLang="zh-TW" sz="4000" b="0" cap="none" spc="0" dirty="0" smtClean="0">
-                <a:ln w="0"/>
-                <a:effectLst>
-                  <a:outerShdw blurRad="38100" dist="19050" dir="2700000" algn="tl" rotWithShape="0">
-                    <a:schemeClr val="dk1">
-                      <a:alpha val="40000"/>
-                    </a:schemeClr>
-                  </a:outerShdw>
-                </a:effectLst>
-              </a:rPr>
-              <a:t> at position </a:t>
-            </a:r>
-            <a:r>
-              <a:rPr lang="en-US" altLang="zh-TW" sz="4000" b="0" cap="none" spc="0" dirty="0" smtClean="0">
-                <a:ln w="0"/>
+            <a:r>
+              <a:rPr lang="zh-TW" altLang="en-US" sz="2800" dirty="0"/>
+              <a:t>if(timeSeconds==</a:t>
+            </a:r>
+            <a:r>
+              <a:rPr lang="zh-TW" altLang="en-US" sz="2800" dirty="0">
                 <a:solidFill>
                   <a:srgbClr val="FF0000"/>
                 </a:solidFill>
-                <a:effectLst>
-                  <a:outerShdw blurRad="38100" dist="19050" dir="2700000" algn="tl" rotWithShape="0">
-                    <a:schemeClr val="dk1">
-                      <a:alpha val="40000"/>
-                    </a:schemeClr>
-                  </a:outerShdw>
-                </a:effectLst>
               </a:rPr>
-              <a:t>1.0 of the lane </a:t>
-            </a:r>
-            <a:r>
-              <a:rPr lang="en-US" altLang="zh-TW" sz="4000" b="0" cap="none" spc="0" dirty="0" smtClean="0">
-                <a:ln w="0"/>
-                <a:effectLst>
-                  <a:outerShdw blurRad="38100" dist="19050" dir="2700000" algn="tl" rotWithShape="0">
-                    <a:schemeClr val="dk1">
-                      <a:alpha val="40000"/>
-                    </a:schemeClr>
-                  </a:outerShdw>
-                </a:effectLst>
+              <a:t>214</a:t>
+            </a:r>
+            <a:r>
+              <a:rPr lang="zh-TW" altLang="en-US" sz="2800" dirty="0"/>
+              <a:t>.</a:t>
+            </a:r>
+            <a:r>
+              <a:rPr lang="zh-TW" altLang="en-US" sz="2800" dirty="0">
+                <a:solidFill>
+                  <a:srgbClr val="FF0000"/>
+                </a:solidFill>
               </a:rPr>
-              <a:t>in 190.0s</a:t>
-            </a:r>
-            <a:endParaRPr lang="zh-TW" altLang="en-US" sz="4000" b="0" cap="none" spc="0" dirty="0">
-              <a:ln w="0"/>
-              <a:effectLst>
-                <a:outerShdw blurRad="38100" dist="19050" dir="2700000" algn="tl" rotWithShape="0">
-                  <a:schemeClr val="dk1">
-                    <a:alpha val="40000"/>
-                  </a:schemeClr>
-                </a:outerShdw>
-              </a:effectLst>
-            </a:endParaRPr>
-          </a:p>
-        </p:txBody>
-      </p:sp>
-      <p:sp>
-        <p:nvSpPr>
-          <p:cNvPr id="7" name="矩形 6"/>
-          <p:cNvSpPr/>
-          <p:nvPr/>
-        </p:nvSpPr>
-        <p:spPr>
-          <a:xfrm>
-            <a:off x="7691637" y="2128052"/>
-            <a:ext cx="4184677" cy="2246769"/>
-          </a:xfrm>
-          <a:prstGeom prst="rect">
-            <a:avLst/>
-          </a:prstGeom>
-          <a:noFill/>
-        </p:spPr>
-        <p:txBody>
-          <a:bodyPr wrap="square" lIns="91440" tIns="45720" rIns="91440" bIns="45720">
-            <a:spAutoFit/>
-          </a:bodyPr>
-          <a:lstStyle/>
-          <a:p>
-            <a:pPr algn="ctr"/>
-            <a:r>
-              <a:rPr lang="en-US" altLang="zh-TW" sz="2800" dirty="0" err="1" smtClean="0"/>
-              <a:t>Vehicle.setStop</a:t>
+              <a:t>0</a:t>
+            </a:r>
+            <a:r>
+              <a:rPr lang="zh-TW" altLang="en-US" sz="2800" dirty="0"/>
+              <a:t>) </a:t>
             </a:r>
             <a:endParaRPr lang="en-US" altLang="zh-TW" sz="2800" dirty="0" smtClean="0"/>
           </a:p>
           <a:p>
-            <a:pPr algn="ctr"/>
-            <a:r>
-              <a:rPr lang="en-US" altLang="zh-TW" sz="2800" dirty="0" smtClean="0"/>
-              <a:t>("</a:t>
-            </a:r>
-            <a:r>
-              <a:rPr lang="en-US" altLang="zh-TW" sz="2800" dirty="0"/>
-              <a:t>flow0.0", </a:t>
-            </a:r>
-            <a:r>
-              <a:rPr lang="en-US" altLang="zh-TW" sz="2800" dirty="0" err="1" smtClean="0"/>
-              <a:t>senderEdgeID</a:t>
-            </a:r>
-            <a:r>
-              <a:rPr lang="en-US" altLang="zh-TW" sz="2800" dirty="0"/>
-              <a:t>, </a:t>
-            </a:r>
-            <a:r>
-              <a:rPr lang="en-US" altLang="zh-TW" sz="2800" b="1" dirty="0"/>
-              <a:t>1.0</a:t>
-            </a:r>
-            <a:r>
-              <a:rPr lang="en-US" altLang="zh-TW" sz="2800" dirty="0"/>
-              <a:t>, (byte)1,  </a:t>
+            <a:r>
+              <a:rPr lang="zh-TW" altLang="en-US" sz="2800" dirty="0" smtClean="0"/>
+              <a:t>{ </a:t>
             </a:r>
             <a:endParaRPr lang="en-US" altLang="zh-TW" sz="2800" dirty="0" smtClean="0"/>
           </a:p>
           <a:p>
-            <a:pPr algn="ctr"/>
-            <a:r>
-              <a:rPr lang="en-US" altLang="zh-TW" sz="2800" dirty="0" smtClean="0"/>
-              <a:t>duration</a:t>
-            </a:r>
-            <a:r>
-              <a:rPr lang="en-US" altLang="zh-TW" sz="2800" dirty="0"/>
-              <a:t>, </a:t>
-            </a:r>
-            <a:r>
-              <a:rPr lang="en-US" altLang="zh-TW" sz="2800" dirty="0" err="1"/>
-              <a:t>SumoStopFlags</a:t>
-            </a:r>
-            <a:r>
-              <a:rPr lang="en-US" altLang="zh-TW" sz="2800" dirty="0" smtClean="0"/>
-              <a:t>));</a:t>
-            </a:r>
-            <a:endParaRPr lang="en-US" altLang="zh-TW" sz="2800" dirty="0"/>
-          </a:p>
-          <a:p>
-            <a:pPr algn="ctr"/>
-            <a:endParaRPr lang="zh-TW" altLang="en-US" sz="2800" b="0" cap="none" spc="0" dirty="0">
-              <a:ln w="0"/>
-              <a:solidFill>
-                <a:srgbClr val="FF0000"/>
-              </a:solidFill>
-              <a:effectLst>
-                <a:outerShdw blurRad="38100" dist="19050" dir="2700000" algn="tl" rotWithShape="0">
-                  <a:schemeClr val="dk1">
-                    <a:alpha val="40000"/>
-                  </a:schemeClr>
-                </a:outerShdw>
-              </a:effectLst>
-            </a:endParaRPr>
+            <a:r>
+              <a:rPr lang="zh-TW" altLang="en-US" sz="2800" dirty="0" smtClean="0"/>
+              <a:t>String </a:t>
+            </a:r>
+            <a:r>
+              <a:rPr lang="zh-TW" altLang="en-US" sz="2800" dirty="0">
+                <a:solidFill>
+                  <a:srgbClr val="FF0000"/>
+                </a:solidFill>
+              </a:rPr>
+              <a:t>receiverEdgeID</a:t>
+            </a:r>
+            <a:r>
+              <a:rPr lang="zh-TW" altLang="en-US" sz="2800" dirty="0"/>
+              <a:t> = "-279032146#1"</a:t>
+            </a:r>
+            <a:r>
+              <a:rPr lang="zh-TW" altLang="en-US" sz="2800" dirty="0" smtClean="0"/>
+              <a:t>;.</a:t>
+            </a:r>
+            <a:endParaRPr lang="en-US" altLang="zh-TW" sz="2800" dirty="0" smtClean="0"/>
+          </a:p>
+          <a:p>
+            <a:endParaRPr lang="en-US" altLang="zh-TW" sz="2800" dirty="0" smtClean="0"/>
+          </a:p>
+          <a:p>
+            <a:r>
+              <a:rPr lang="zh-TW" altLang="en-US" sz="2800" dirty="0" smtClean="0"/>
+              <a:t>changeTarget</a:t>
+            </a:r>
+            <a:r>
+              <a:rPr lang="zh-TW" altLang="en-US" sz="2800" dirty="0"/>
+              <a:t>("flow0.0", receiverEdgeID)); </a:t>
+            </a:r>
+            <a:endParaRPr lang="en-US" altLang="zh-TW" sz="2800" dirty="0" smtClean="0"/>
+          </a:p>
+          <a:p>
+            <a:endParaRPr lang="en-US" altLang="zh-TW" sz="2800" dirty="0" smtClean="0"/>
+          </a:p>
+          <a:p>
+            <a:r>
+              <a:rPr lang="zh-TW" altLang="en-US" sz="2800" dirty="0" smtClean="0"/>
+              <a:t>}</a:t>
+            </a:r>
+            <a:endParaRPr lang="zh-TW" altLang="en-US" sz="2800" dirty="0"/>
           </a:p>
         </p:txBody>
       </p:sp>
     </p:spTree>
     <p:extLst>
       <p:ext uri="{BB962C8B-B14F-4D97-AF65-F5344CB8AC3E}">
-        <p14:creationId xmlns:p14="http://schemas.microsoft.com/office/powerpoint/2010/main" val="861308970"/>
+        <p14:creationId xmlns:p14="http://schemas.microsoft.com/office/powerpoint/2010/main" val="3681014353"/>
       </p:ext>
     </p:extLst>
   </p:cSld>
@@ -10581,7 +11979,7 @@
 </p:sld>
 </file>
 
-<file path=ppt/slides/slide4.xml><?xml version="1.0" encoding="utf-8"?>
+<file path=ppt/slides/slide41.xml><?xml version="1.0" encoding="utf-8"?>
 <p:sld xmlns:a="http://schemas.openxmlformats.org/drawingml/2006/main" xmlns:r="http://schemas.openxmlformats.org/officeDocument/2006/relationships" xmlns:p="http://schemas.openxmlformats.org/presentationml/2006/main">
   <p:cSld>
     <p:spTree>
@@ -10598,9 +11996,243 @@
           <a:chExt cx="0" cy="0"/>
         </a:xfrm>
       </p:grpSpPr>
-      <p:sp>
-        <p:nvSpPr>
-          <p:cNvPr id="2" name="標題 1"/>
+      <p:pic>
+        <p:nvPicPr>
+          <p:cNvPr id="6" name="圖片 5"/>
+          <p:cNvPicPr>
+            <a:picLocks noChangeAspect="1"/>
+          </p:cNvPicPr>
+          <p:nvPr/>
+        </p:nvPicPr>
+        <p:blipFill>
+          <a:blip r:embed="rId2">
+            <a:extLst>
+              <a:ext uri="{28A0092B-C50C-407E-A947-70E740481C1C}">
+                <a14:useLocalDpi xmlns:a14="http://schemas.microsoft.com/office/drawing/2010/main" val="0"/>
+              </a:ext>
+            </a:extLst>
+          </a:blip>
+          <a:stretch>
+            <a:fillRect/>
+          </a:stretch>
+        </p:blipFill>
+        <p:spPr>
+          <a:xfrm>
+            <a:off x="330268" y="270633"/>
+            <a:ext cx="8773975" cy="6192664"/>
+          </a:xfrm>
+          <a:prstGeom prst="rect">
+            <a:avLst/>
+          </a:prstGeom>
+        </p:spPr>
+      </p:pic>
+      <p:sp>
+        <p:nvSpPr>
+          <p:cNvPr id="7" name="矩形 6"/>
+          <p:cNvSpPr/>
+          <p:nvPr/>
+        </p:nvSpPr>
+        <p:spPr>
+          <a:xfrm>
+            <a:off x="9219424" y="992384"/>
+            <a:ext cx="2972576" cy="923330"/>
+          </a:xfrm>
+          <a:prstGeom prst="rect">
+            <a:avLst/>
+          </a:prstGeom>
+          <a:noFill/>
+        </p:spPr>
+        <p:txBody>
+          <a:bodyPr wrap="square" lIns="91440" tIns="45720" rIns="91440" bIns="45720">
+            <a:spAutoFit/>
+          </a:bodyPr>
+          <a:lstStyle/>
+          <a:p>
+            <a:pPr algn="ctr"/>
+            <a:r>
+              <a:rPr lang="en-US" altLang="zh-TW" sz="5400" b="0" cap="none" spc="0" dirty="0" smtClean="0">
+                <a:ln w="0"/>
+                <a:solidFill>
+                  <a:srgbClr val="FF0000"/>
+                </a:solidFill>
+                <a:effectLst>
+                  <a:outerShdw blurRad="38100" dist="19050" dir="2700000" algn="tl" rotWithShape="0">
+                    <a:schemeClr val="dk1">
+                      <a:alpha val="40000"/>
+                    </a:schemeClr>
+                  </a:outerShdw>
+                </a:effectLst>
+              </a:rPr>
+              <a:t>215.17s</a:t>
+            </a:r>
+            <a:endParaRPr lang="zh-TW" altLang="en-US" sz="5400" b="0" cap="none" spc="0" dirty="0">
+              <a:ln w="0"/>
+              <a:solidFill>
+                <a:srgbClr val="FF0000"/>
+              </a:solidFill>
+              <a:effectLst>
+                <a:outerShdw blurRad="38100" dist="19050" dir="2700000" algn="tl" rotWithShape="0">
+                  <a:schemeClr val="dk1">
+                    <a:alpha val="40000"/>
+                  </a:schemeClr>
+                </a:outerShdw>
+              </a:effectLst>
+            </a:endParaRPr>
+          </a:p>
+        </p:txBody>
+      </p:sp>
+    </p:spTree>
+    <p:extLst>
+      <p:ext uri="{BB962C8B-B14F-4D97-AF65-F5344CB8AC3E}">
+        <p14:creationId xmlns:p14="http://schemas.microsoft.com/office/powerpoint/2010/main" val="4276570238"/>
+      </p:ext>
+    </p:extLst>
+  </p:cSld>
+  <p:clrMapOvr>
+    <a:masterClrMapping/>
+  </p:clrMapOvr>
+</p:sld>
+</file>
+
+<file path=ppt/slides/slide42.xml><?xml version="1.0" encoding="utf-8"?>
+<p:sld xmlns:a="http://schemas.openxmlformats.org/drawingml/2006/main" xmlns:r="http://schemas.openxmlformats.org/officeDocument/2006/relationships" xmlns:p="http://schemas.openxmlformats.org/presentationml/2006/main">
+  <p:cSld>
+    <p:spTree>
+      <p:nvGrpSpPr>
+        <p:cNvPr id="1" name=""/>
+        <p:cNvGrpSpPr/>
+        <p:nvPr/>
+      </p:nvGrpSpPr>
+      <p:grpSpPr>
+        <a:xfrm>
+          <a:off x="0" y="0"/>
+          <a:ext cx="0" cy="0"/>
+          <a:chOff x="0" y="0"/>
+          <a:chExt cx="0" cy="0"/>
+        </a:xfrm>
+      </p:grpSpPr>
+      <p:pic>
+        <p:nvPicPr>
+          <p:cNvPr id="3" name="圖片 2"/>
+          <p:cNvPicPr>
+            <a:picLocks noChangeAspect="1"/>
+          </p:cNvPicPr>
+          <p:nvPr/>
+        </p:nvPicPr>
+        <p:blipFill rotWithShape="1">
+          <a:blip r:embed="rId2">
+            <a:extLst>
+              <a:ext uri="{28A0092B-C50C-407E-A947-70E740481C1C}">
+                <a14:useLocalDpi xmlns:a14="http://schemas.microsoft.com/office/drawing/2010/main" val="0"/>
+              </a:ext>
+            </a:extLst>
+          </a:blip>
+          <a:srcRect l="8709" r="6106"/>
+          <a:stretch/>
+        </p:blipFill>
+        <p:spPr>
+          <a:xfrm>
+            <a:off x="145774" y="133725"/>
+            <a:ext cx="8097078" cy="6591754"/>
+          </a:xfrm>
+          <a:prstGeom prst="rect">
+            <a:avLst/>
+          </a:prstGeom>
+          <a:ln w="6350">
+            <a:solidFill>
+              <a:schemeClr val="tx1"/>
+            </a:solidFill>
+          </a:ln>
+        </p:spPr>
+      </p:pic>
+      <p:sp>
+        <p:nvSpPr>
+          <p:cNvPr id="4" name="矩形 3"/>
+          <p:cNvSpPr/>
+          <p:nvPr/>
+        </p:nvSpPr>
+        <p:spPr>
+          <a:xfrm>
+            <a:off x="8136835" y="992384"/>
+            <a:ext cx="4055165" cy="1384995"/>
+          </a:xfrm>
+          <a:prstGeom prst="rect">
+            <a:avLst/>
+          </a:prstGeom>
+          <a:noFill/>
+        </p:spPr>
+        <p:txBody>
+          <a:bodyPr wrap="square" lIns="91440" tIns="45720" rIns="91440" bIns="45720">
+            <a:spAutoFit/>
+          </a:bodyPr>
+          <a:lstStyle/>
+          <a:p>
+            <a:pPr algn="ctr"/>
+            <a:r>
+              <a:rPr lang="en-US" altLang="zh-TW" sz="2800" b="0" cap="none" spc="0" dirty="0" smtClean="0">
+                <a:ln w="0"/>
+                <a:solidFill>
+                  <a:srgbClr val="FF0000"/>
+                </a:solidFill>
+                <a:effectLst>
+                  <a:outerShdw blurRad="38100" dist="19050" dir="2700000" algn="tl" rotWithShape="0">
+                    <a:schemeClr val="dk1">
+                      <a:alpha val="40000"/>
+                    </a:schemeClr>
+                  </a:outerShdw>
+                </a:effectLst>
+              </a:rPr>
+              <a:t>The car should stop for 20s in the edge of the receiver.</a:t>
+            </a:r>
+            <a:endParaRPr lang="zh-TW" altLang="en-US" sz="2800" b="0" cap="none" spc="0" dirty="0">
+              <a:ln w="0"/>
+              <a:solidFill>
+                <a:srgbClr val="FF0000"/>
+              </a:solidFill>
+              <a:effectLst>
+                <a:outerShdw blurRad="38100" dist="19050" dir="2700000" algn="tl" rotWithShape="0">
+                  <a:schemeClr val="dk1">
+                    <a:alpha val="40000"/>
+                  </a:schemeClr>
+                </a:outerShdw>
+              </a:effectLst>
+            </a:endParaRPr>
+          </a:p>
+        </p:txBody>
+      </p:sp>
+    </p:spTree>
+    <p:extLst>
+      <p:ext uri="{BB962C8B-B14F-4D97-AF65-F5344CB8AC3E}">
+        <p14:creationId xmlns:p14="http://schemas.microsoft.com/office/powerpoint/2010/main" val="4213665476"/>
+      </p:ext>
+    </p:extLst>
+  </p:cSld>
+  <p:clrMapOvr>
+    <a:masterClrMapping/>
+  </p:clrMapOvr>
+</p:sld>
+</file>
+
+<file path=ppt/slides/slide43.xml><?xml version="1.0" encoding="utf-8"?>
+<p:sld xmlns:a="http://schemas.openxmlformats.org/drawingml/2006/main" xmlns:r="http://schemas.openxmlformats.org/officeDocument/2006/relationships" xmlns:p="http://schemas.openxmlformats.org/presentationml/2006/main">
+  <p:cSld>
+    <p:spTree>
+      <p:nvGrpSpPr>
+        <p:cNvPr id="1" name=""/>
+        <p:cNvGrpSpPr/>
+        <p:nvPr/>
+      </p:nvGrpSpPr>
+      <p:grpSpPr>
+        <a:xfrm>
+          <a:off x="0" y="0"/>
+          <a:ext cx="0" cy="0"/>
+          <a:chOff x="0" y="0"/>
+          <a:chExt cx="0" cy="0"/>
+        </a:xfrm>
+      </p:grpSpPr>
+      <p:sp>
+        <p:nvSpPr>
+          <p:cNvPr id="4" name="標題 3"/>
           <p:cNvSpPr>
             <a:spLocks noGrp="1"/>
           </p:cNvSpPr>
@@ -10610,22 +12242,24 @@
         </p:nvSpPr>
         <p:spPr/>
         <p:txBody>
-          <a:bodyPr>
-            <a:normAutofit/>
-          </a:bodyPr>
-          <a:lstStyle/>
-          <a:p>
-            <a:r>
-              <a:rPr lang="zh-TW" altLang="en-US" sz="3200" b="1" dirty="0" smtClean="0"/>
-              <a:t>動態路徑規劃</a:t>
-            </a:r>
-            <a:endParaRPr lang="zh-TW" altLang="en-US" sz="3200" b="1" dirty="0"/>
-          </a:p>
-        </p:txBody>
-      </p:sp>
-      <p:sp>
-        <p:nvSpPr>
-          <p:cNvPr id="3" name="內容版面配置區 2"/>
+          <a:bodyPr/>
+          <a:lstStyle/>
+          <a:p>
+            <a:r>
+              <a:rPr lang="en-US" altLang="zh-TW" b="1" dirty="0" smtClean="0"/>
+              <a:t>Next ste</a:t>
+            </a:r>
+            <a:r>
+              <a:rPr lang="en-US" altLang="zh-TW" b="1" dirty="0"/>
+              <a:t>p</a:t>
+            </a:r>
+            <a:endParaRPr lang="zh-TW" altLang="en-US" b="1" dirty="0"/>
+          </a:p>
+        </p:txBody>
+      </p:sp>
+      <p:sp>
+        <p:nvSpPr>
+          <p:cNvPr id="5" name="內容版面配置區 4"/>
           <p:cNvSpPr>
             <a:spLocks noGrp="1"/>
           </p:cNvSpPr>
@@ -10633,251 +12267,105 @@
             <p:ph idx="1"/>
           </p:nvPr>
         </p:nvSpPr>
-        <p:spPr/>
+        <p:spPr>
+          <a:xfrm>
+            <a:off x="291548" y="1825625"/>
+            <a:ext cx="11441416" cy="4351338"/>
+          </a:xfrm>
+          <a:solidFill>
+            <a:schemeClr val="accent2">
+              <a:lumMod val="40000"/>
+              <a:lumOff val="60000"/>
+            </a:schemeClr>
+          </a:solidFill>
+        </p:spPr>
         <p:txBody>
           <a:bodyPr>
             <a:normAutofit/>
           </a:bodyPr>
           <a:lstStyle/>
           <a:p>
-            <a:r>
-              <a:rPr lang="en-US" altLang="zh-TW" dirty="0" smtClean="0"/>
-              <a:t>1.</a:t>
-            </a:r>
-            <a:r>
-              <a:rPr lang="zh-TW" altLang="en-US" dirty="0" smtClean="0"/>
-              <a:t>把剛才挑選的</a:t>
-            </a:r>
-            <a:r>
-              <a:rPr lang="en-US" altLang="zh-TW" dirty="0" smtClean="0"/>
-              <a:t>car5</a:t>
-            </a:r>
-            <a:r>
-              <a:rPr lang="zh-TW" altLang="en-US" dirty="0" smtClean="0"/>
-              <a:t>設定為派遣車輛，取得</a:t>
-            </a:r>
-            <a:r>
-              <a:rPr lang="en-US" altLang="zh-TW" dirty="0" smtClean="0"/>
-              <a:t>car5</a:t>
-            </a:r>
-            <a:r>
-              <a:rPr lang="zh-TW" altLang="en-US" dirty="0" smtClean="0"/>
-              <a:t>的</a:t>
+            <a:pPr marL="0" indent="0">
+              <a:buNone/>
+            </a:pPr>
+            <a:r>
+              <a:rPr lang="en-US" altLang="zh-TW" dirty="0" smtClean="0"/>
+              <a:t>1.arrange 10 random cars in the more concise map</a:t>
+            </a:r>
+          </a:p>
+          <a:p>
+            <a:pPr marL="0" indent="0">
+              <a:buNone/>
+            </a:pPr>
+            <a:r>
+              <a:rPr lang="en-US" altLang="zh-TW" dirty="0" smtClean="0"/>
+              <a:t>2.compute the minimum distance between the sender and the ten cars</a:t>
+            </a:r>
+          </a:p>
+          <a:p>
+            <a:pPr marL="0" indent="0">
+              <a:buNone/>
+            </a:pPr>
+            <a:r>
+              <a:rPr lang="en-US" altLang="zh-TW" dirty="0" smtClean="0"/>
+              <a:t>3.Dispatch the selected car to the sender</a:t>
+            </a:r>
+          </a:p>
+          <a:p>
+            <a:pPr marL="0" indent="0">
+              <a:buNone/>
+            </a:pPr>
+            <a:r>
+              <a:rPr lang="en-US" altLang="zh-TW" dirty="0" smtClean="0"/>
+              <a:t>4.Add travel-time estimation function and </a:t>
+            </a:r>
+            <a:r>
+              <a:rPr lang="en-US" altLang="zh-TW" dirty="0"/>
+              <a:t>notification </a:t>
+            </a:r>
+            <a:r>
+              <a:rPr lang="en-US" altLang="zh-TW" dirty="0" smtClean="0"/>
+              <a:t>to the user connecting the Android</a:t>
+            </a:r>
+          </a:p>
+          <a:p>
+            <a:pPr marL="0" indent="0">
+              <a:buNone/>
+            </a:pPr>
+            <a:r>
+              <a:rPr lang="en-US" altLang="zh-TW" dirty="0" smtClean="0"/>
+              <a:t>5.Try to receive the geo-position from user’s request and save it in a appropriate  datatype (ex. </a:t>
             </a:r>
             <a:r>
               <a:rPr lang="en-US" altLang="zh-TW" dirty="0" err="1" smtClean="0"/>
-              <a:t>gui</a:t>
-            </a:r>
-            <a:r>
-              <a:rPr lang="en-US" altLang="zh-TW" dirty="0" smtClean="0"/>
-              <a:t>-position(</a:t>
+              <a:t>arrayList</a:t>
+            </a:r>
+            <a:r>
+              <a:rPr lang="en-US" altLang="zh-TW" dirty="0" smtClean="0"/>
+              <a:t>)</a:t>
+            </a:r>
+          </a:p>
+          <a:p>
+            <a:pPr marL="0" indent="0">
+              <a:buNone/>
+            </a:pPr>
+            <a:r>
+              <a:rPr lang="en-US" altLang="zh-TW" dirty="0" smtClean="0"/>
+              <a:t>6.Report the related data to the webserver (</a:t>
             </a:r>
             <a:r>
               <a:rPr lang="en-US" altLang="zh-TW" dirty="0" err="1" smtClean="0"/>
-              <a:t>x,y</a:t>
-            </a:r>
-            <a:r>
-              <a:rPr lang="zh-TW" altLang="en-US" dirty="0" smtClean="0"/>
-              <a:t>座標</a:t>
-            </a:r>
-            <a:r>
-              <a:rPr lang="en-US" altLang="zh-TW" dirty="0" smtClean="0"/>
-              <a:t>)</a:t>
-            </a:r>
-            <a:r>
-              <a:rPr lang="zh-TW" altLang="en-US" dirty="0" smtClean="0"/>
-              <a:t>與</a:t>
-            </a:r>
-            <a:r>
-              <a:rPr lang="en-US" altLang="zh-TW" dirty="0" smtClean="0"/>
-              <a:t>car5_roadID(</a:t>
-            </a:r>
-            <a:r>
-              <a:rPr lang="zh-TW" altLang="en-US" dirty="0" smtClean="0"/>
-              <a:t>也就是</a:t>
-            </a:r>
-            <a:r>
-              <a:rPr lang="en-US" altLang="zh-TW" dirty="0" smtClean="0"/>
-              <a:t>car5_edgID)</a:t>
-            </a:r>
-          </a:p>
-          <a:p>
-            <a:r>
-              <a:rPr lang="en-US" altLang="zh-TW" dirty="0" smtClean="0"/>
-              <a:t>2.</a:t>
-            </a:r>
-            <a:r>
-              <a:rPr lang="zh-TW" altLang="en-US" dirty="0" smtClean="0"/>
-              <a:t>給</a:t>
-            </a:r>
-            <a:r>
-              <a:rPr lang="en-US" altLang="zh-TW" dirty="0" err="1" smtClean="0"/>
-              <a:t>startEdge</a:t>
-            </a:r>
-            <a:r>
-              <a:rPr lang="en-US" altLang="zh-TW" dirty="0" smtClean="0"/>
-              <a:t>: car5_edgID, </a:t>
-            </a:r>
-            <a:r>
-              <a:rPr lang="en-US" altLang="zh-TW" dirty="0" err="1" smtClean="0"/>
-              <a:t>endEdge:sender_address_edgeID</a:t>
-            </a:r>
-            <a:endParaRPr lang="en-US" altLang="zh-TW" dirty="0" smtClean="0"/>
-          </a:p>
-          <a:p>
-            <a:r>
-              <a:rPr lang="en-US" altLang="zh-TW" dirty="0" smtClean="0"/>
-              <a:t>3.</a:t>
-            </a:r>
-            <a:r>
-              <a:rPr lang="zh-TW" altLang="en-US" dirty="0" smtClean="0"/>
-              <a:t>接著是動態規畫路徑，目前還沒查到</a:t>
-            </a:r>
-            <a:r>
-              <a:rPr lang="en-US" altLang="zh-TW" dirty="0" err="1" smtClean="0"/>
-              <a:t>ws</a:t>
-            </a:r>
-            <a:r>
-              <a:rPr lang="zh-TW" altLang="en-US" dirty="0" smtClean="0"/>
-              <a:t>的相關用法，所以用</a:t>
-            </a:r>
-            <a:r>
-              <a:rPr lang="en-US" altLang="zh-TW" dirty="0" err="1" smtClean="0"/>
-              <a:t>TraCI</a:t>
-            </a:r>
-            <a:r>
-              <a:rPr lang="en-US" altLang="zh-TW" dirty="0" smtClean="0"/>
-              <a:t>(python)</a:t>
-            </a:r>
-            <a:r>
-              <a:rPr lang="zh-TW" altLang="en-US" dirty="0" smtClean="0"/>
-              <a:t>代替表示</a:t>
-            </a:r>
-            <a:r>
-              <a:rPr lang="en-US" altLang="zh-TW" dirty="0" smtClean="0"/>
-              <a:t>: </a:t>
-            </a:r>
-          </a:p>
-          <a:p>
-            <a:pPr lvl="1"/>
-            <a:r>
-              <a:rPr lang="en-US" altLang="zh-TW" dirty="0" err="1" smtClean="0"/>
-              <a:t>traci.route.add</a:t>
-            </a:r>
-            <a:r>
-              <a:rPr lang="en-US" altLang="zh-TW" dirty="0" smtClean="0"/>
-              <a:t>("trip", ["</a:t>
-            </a:r>
-            <a:r>
-              <a:rPr lang="en-US" altLang="zh-TW" dirty="0" err="1" smtClean="0"/>
-              <a:t>startEdge</a:t>
-            </a:r>
-            <a:r>
-              <a:rPr lang="en-US" altLang="zh-TW" dirty="0" smtClean="0"/>
-              <a:t>", "</a:t>
-            </a:r>
-            <a:r>
-              <a:rPr lang="en-US" altLang="zh-TW" dirty="0" err="1" smtClean="0"/>
-              <a:t>endEdge</a:t>
-            </a:r>
-            <a:r>
-              <a:rPr lang="en-US" altLang="zh-TW" dirty="0" smtClean="0"/>
-              <a:t>"])</a:t>
-            </a:r>
-          </a:p>
-          <a:p>
-            <a:pPr lvl="1"/>
-            <a:r>
-              <a:rPr lang="en-US" altLang="zh-TW" dirty="0" err="1" smtClean="0"/>
-              <a:t>traci.vehicle.add</a:t>
-            </a:r>
-            <a:r>
-              <a:rPr lang="en-US" altLang="zh-TW" dirty="0" smtClean="0"/>
-              <a:t>(“</a:t>
-            </a:r>
-            <a:r>
-              <a:rPr lang="en-US" altLang="zh-TW" dirty="0" err="1" smtClean="0"/>
-              <a:t>newVeh</a:t>
-            </a:r>
-            <a:r>
-              <a:rPr lang="en-US" altLang="zh-TW" dirty="0" smtClean="0"/>
-              <a:t>”, “trip”, </a:t>
-            </a:r>
-            <a:r>
-              <a:rPr lang="en-US" altLang="zh-TW" dirty="0" err="1" smtClean="0"/>
-              <a:t>typeID</a:t>
-            </a:r>
-            <a:r>
-              <a:rPr lang="en-US" altLang="zh-TW" dirty="0" smtClean="0"/>
-              <a:t>=“</a:t>
-            </a:r>
-            <a:r>
-              <a:rPr lang="en-US" altLang="zh-TW" dirty="0" err="1" smtClean="0"/>
-              <a:t>reroutingType</a:t>
-            </a:r>
-            <a:r>
-              <a:rPr lang="en-US" altLang="zh-TW" dirty="0" smtClean="0"/>
-              <a:t>”) //</a:t>
-            </a:r>
-            <a:r>
-              <a:rPr lang="zh-TW" altLang="en-US" dirty="0" smtClean="0"/>
-              <a:t>增加這台車</a:t>
-            </a:r>
-            <a:endParaRPr lang="en-US" altLang="zh-TW" dirty="0" smtClean="0"/>
-          </a:p>
-          <a:p>
-            <a:pPr lvl="1"/>
-            <a:endParaRPr lang="en-US" altLang="zh-TW" dirty="0" smtClean="0"/>
-          </a:p>
-          <a:p>
-            <a:r>
-              <a:rPr lang="en-US" altLang="zh-TW" dirty="0" smtClean="0"/>
-              <a:t>4.</a:t>
-            </a:r>
-            <a:r>
-              <a:rPr lang="zh-TW" altLang="en-US" dirty="0" smtClean="0"/>
-              <a:t>關鍵在於如何用</a:t>
-            </a:r>
-            <a:r>
-              <a:rPr lang="en-US" altLang="zh-TW" dirty="0" smtClean="0"/>
-              <a:t>scripts</a:t>
-            </a:r>
-            <a:r>
-              <a:rPr lang="zh-TW" altLang="en-US" dirty="0" smtClean="0"/>
-              <a:t>與起始終點邊，規劃出一條</a:t>
-            </a:r>
-            <a:r>
-              <a:rPr lang="en-US" altLang="zh-TW" dirty="0" smtClean="0"/>
-              <a:t>route</a:t>
-            </a:r>
-            <a:r>
-              <a:rPr lang="zh-TW" altLang="en-US" dirty="0" smtClean="0"/>
-              <a:t>，，比較接近的是</a:t>
-            </a:r>
-            <a:r>
-              <a:rPr lang="en-US" altLang="zh-TW" dirty="0" err="1" smtClean="0"/>
-              <a:t>ws.RouteAdd</a:t>
-            </a:r>
-            <a:r>
-              <a:rPr lang="en-US" altLang="zh-TW" dirty="0" smtClean="0"/>
-              <a:t>(String </a:t>
-            </a:r>
-            <a:r>
-              <a:rPr lang="en-US" altLang="zh-TW" dirty="0" err="1" smtClean="0"/>
-              <a:t>routeID</a:t>
-            </a:r>
-            <a:r>
-              <a:rPr lang="en-US" altLang="zh-TW" dirty="0" smtClean="0"/>
-              <a:t>, List&lt;String&gt; edges)</a:t>
-            </a:r>
-          </a:p>
-          <a:p>
-            <a:endParaRPr lang="en-US" altLang="zh-TW" dirty="0" smtClean="0"/>
-          </a:p>
-          <a:p>
-            <a:endParaRPr lang="en-US" altLang="zh-TW" dirty="0" smtClean="0"/>
-          </a:p>
-          <a:p>
+              <a:t>eg</a:t>
+            </a:r>
+            <a:r>
+              <a:rPr lang="en-US" altLang="zh-TW" dirty="0" smtClean="0"/>
+              <a:t>. the geo-position of the car)</a:t>
+            </a:r>
+          </a:p>
+          <a:p>
+            <a:pPr marL="0" indent="0">
+              <a:buNone/>
+            </a:pPr>
             <a:endParaRPr lang="zh-TW" altLang="en-US" dirty="0"/>
           </a:p>
         </p:txBody>
@@ -10885,20 +12373,13 @@
     </p:spTree>
     <p:extLst>
       <p:ext uri="{BB962C8B-B14F-4D97-AF65-F5344CB8AC3E}">
-        <p14:creationId xmlns:p14="http://schemas.microsoft.com/office/powerpoint/2010/main" val="1553269630"/>
+        <p14:creationId xmlns:p14="http://schemas.microsoft.com/office/powerpoint/2010/main" val="1755397348"/>
       </p:ext>
     </p:extLst>
   </p:cSld>
   <p:clrMapOvr>
     <a:masterClrMapping/>
   </p:clrMapOvr>
-  <p:timing>
-    <p:tnLst>
-      <p:par>
-        <p:cTn id="1" dur="indefinite" restart="never" nodeType="tmRoot"/>
-      </p:par>
-    </p:tnLst>
-  </p:timing>
 </p:sld>
 </file>
 

</xml_diff>

<commit_message>
compare the distanceTo sneder between v8 and v9
</commit_message>
<xml_diff>
--- a/eclipse workspace/java_library/sumo_implementation recording.pptx
+++ b/eclipse workspace/java_library/sumo_implementation recording.pptx
@@ -287,7 +287,7 @@
           <a:p>
             <a:fld id="{0D31214C-D292-456A-85AA-94C340B15432}" type="datetimeFigureOut">
               <a:rPr lang="zh-TW" altLang="en-US" smtClean="0"/>
-              <a:t>2019/4/29</a:t>
+              <a:t>2019/4/30</a:t>
             </a:fld>
             <a:endParaRPr lang="zh-TW" altLang="en-US"/>
           </a:p>
@@ -457,7 +457,7 @@
           <a:p>
             <a:fld id="{0D31214C-D292-456A-85AA-94C340B15432}" type="datetimeFigureOut">
               <a:rPr lang="zh-TW" altLang="en-US" smtClean="0"/>
-              <a:t>2019/4/29</a:t>
+              <a:t>2019/4/30</a:t>
             </a:fld>
             <a:endParaRPr lang="zh-TW" altLang="en-US"/>
           </a:p>
@@ -637,7 +637,7 @@
           <a:p>
             <a:fld id="{0D31214C-D292-456A-85AA-94C340B15432}" type="datetimeFigureOut">
               <a:rPr lang="zh-TW" altLang="en-US" smtClean="0"/>
-              <a:t>2019/4/29</a:t>
+              <a:t>2019/4/30</a:t>
             </a:fld>
             <a:endParaRPr lang="zh-TW" altLang="en-US"/>
           </a:p>
@@ -807,7 +807,7 @@
           <a:p>
             <a:fld id="{0D31214C-D292-456A-85AA-94C340B15432}" type="datetimeFigureOut">
               <a:rPr lang="zh-TW" altLang="en-US" smtClean="0"/>
-              <a:t>2019/4/29</a:t>
+              <a:t>2019/4/30</a:t>
             </a:fld>
             <a:endParaRPr lang="zh-TW" altLang="en-US"/>
           </a:p>
@@ -1053,7 +1053,7 @@
           <a:p>
             <a:fld id="{0D31214C-D292-456A-85AA-94C340B15432}" type="datetimeFigureOut">
               <a:rPr lang="zh-TW" altLang="en-US" smtClean="0"/>
-              <a:t>2019/4/29</a:t>
+              <a:t>2019/4/30</a:t>
             </a:fld>
             <a:endParaRPr lang="zh-TW" altLang="en-US"/>
           </a:p>
@@ -1285,7 +1285,7 @@
           <a:p>
             <a:fld id="{0D31214C-D292-456A-85AA-94C340B15432}" type="datetimeFigureOut">
               <a:rPr lang="zh-TW" altLang="en-US" smtClean="0"/>
-              <a:t>2019/4/29</a:t>
+              <a:t>2019/4/30</a:t>
             </a:fld>
             <a:endParaRPr lang="zh-TW" altLang="en-US"/>
           </a:p>
@@ -1652,7 +1652,7 @@
           <a:p>
             <a:fld id="{0D31214C-D292-456A-85AA-94C340B15432}" type="datetimeFigureOut">
               <a:rPr lang="zh-TW" altLang="en-US" smtClean="0"/>
-              <a:t>2019/4/29</a:t>
+              <a:t>2019/4/30</a:t>
             </a:fld>
             <a:endParaRPr lang="zh-TW" altLang="en-US"/>
           </a:p>
@@ -1770,7 +1770,7 @@
           <a:p>
             <a:fld id="{0D31214C-D292-456A-85AA-94C340B15432}" type="datetimeFigureOut">
               <a:rPr lang="zh-TW" altLang="en-US" smtClean="0"/>
-              <a:t>2019/4/29</a:t>
+              <a:t>2019/4/30</a:t>
             </a:fld>
             <a:endParaRPr lang="zh-TW" altLang="en-US"/>
           </a:p>
@@ -1865,7 +1865,7 @@
           <a:p>
             <a:fld id="{0D31214C-D292-456A-85AA-94C340B15432}" type="datetimeFigureOut">
               <a:rPr lang="zh-TW" altLang="en-US" smtClean="0"/>
-              <a:t>2019/4/29</a:t>
+              <a:t>2019/4/30</a:t>
             </a:fld>
             <a:endParaRPr lang="zh-TW" altLang="en-US"/>
           </a:p>
@@ -2142,7 +2142,7 @@
           <a:p>
             <a:fld id="{0D31214C-D292-456A-85AA-94C340B15432}" type="datetimeFigureOut">
               <a:rPr lang="zh-TW" altLang="en-US" smtClean="0"/>
-              <a:t>2019/4/29</a:t>
+              <a:t>2019/4/30</a:t>
             </a:fld>
             <a:endParaRPr lang="zh-TW" altLang="en-US"/>
           </a:p>
@@ -2395,7 +2395,7 @@
           <a:p>
             <a:fld id="{0D31214C-D292-456A-85AA-94C340B15432}" type="datetimeFigureOut">
               <a:rPr lang="zh-TW" altLang="en-US" smtClean="0"/>
-              <a:t>2019/4/29</a:t>
+              <a:t>2019/4/30</a:t>
             </a:fld>
             <a:endParaRPr lang="zh-TW" altLang="en-US"/>
           </a:p>
@@ -2608,7 +2608,7 @@
           <a:p>
             <a:fld id="{0D31214C-D292-456A-85AA-94C340B15432}" type="datetimeFigureOut">
               <a:rPr lang="zh-TW" altLang="en-US" smtClean="0"/>
-              <a:t>2019/4/29</a:t>
+              <a:t>2019/4/30</a:t>
             </a:fld>
             <a:endParaRPr lang="zh-TW" altLang="en-US"/>
           </a:p>
@@ -12875,8 +12875,96 @@
         </p:nvSpPr>
         <p:spPr/>
         <p:txBody>
-          <a:bodyPr/>
-          <a:lstStyle/>
+          <a:bodyPr>
+            <a:normAutofit fontScale="62500" lnSpcReduction="20000"/>
+          </a:bodyPr>
+          <a:lstStyle/>
+          <a:p>
+            <a:r>
+              <a:rPr lang="en-US" altLang="zh-TW" b="1" dirty="0" err="1"/>
+              <a:t>defaultRouteList</a:t>
+            </a:r>
+            <a:r>
+              <a:rPr lang="en-US" altLang="zh-TW" dirty="0"/>
+              <a:t>:[</a:t>
+            </a:r>
+            <a:endParaRPr lang="zh-TW" altLang="zh-TW" dirty="0"/>
+          </a:p>
+          <a:p>
+            <a:r>
+              <a:rPr lang="en-US" altLang="zh-TW" dirty="0"/>
+              <a:t>313194185#3, 313194185#6, 313194185#11, 313194185#14, 496257370#0, 405115648#1, 313194390#0, 675775398, 496257372, -315702598#2, </a:t>
+            </a:r>
+            <a:endParaRPr lang="zh-TW" altLang="zh-TW" dirty="0"/>
+          </a:p>
+          <a:p>
+            <a:r>
+              <a:rPr lang="en-US" altLang="zh-TW" dirty="0"/>
+              <a:t>-228022792#6, -228022792#2, 72871344, 72871329#2, 72871329#3, 27067581, 228022808#0, 228022808#2, 228022808#4, 228022808#6, 306974310#0, 306974310#1]</a:t>
+            </a:r>
+            <a:endParaRPr lang="zh-TW" altLang="zh-TW" dirty="0"/>
+          </a:p>
+          <a:p>
+            <a:r>
+              <a:rPr lang="en-US" altLang="zh-TW" dirty="0"/>
+              <a:t> </a:t>
+            </a:r>
+            <a:endParaRPr lang="zh-TW" altLang="zh-TW" dirty="0"/>
+          </a:p>
+          <a:p>
+            <a:r>
+              <a:rPr lang="en-US" altLang="zh-TW" b="1" dirty="0"/>
+              <a:t>changing Route:</a:t>
+            </a:r>
+            <a:endParaRPr lang="zh-TW" altLang="zh-TW" dirty="0"/>
+          </a:p>
+          <a:p>
+            <a:r>
+              <a:rPr lang="en-US" altLang="zh-TW" b="1" dirty="0" err="1"/>
+              <a:t>changedRouteList</a:t>
+            </a:r>
+            <a:r>
+              <a:rPr lang="en-US" altLang="zh-TW" dirty="0"/>
+              <a:t>:[313194185#3, 313194185#6, 313194185#11, 313194185#14, 496257370#0, 405115648#1, -307096543#5, -537706053#4,</a:t>
+            </a:r>
+            <a:r>
+              <a:rPr lang="en-US" altLang="zh-TW" b="1" dirty="0"/>
+              <a:t> -537706053#2</a:t>
+            </a:r>
+            <a:r>
+              <a:rPr lang="en-US" altLang="zh-TW" dirty="0"/>
+              <a:t>]</a:t>
+            </a:r>
+            <a:endParaRPr lang="zh-TW" altLang="zh-TW" dirty="0"/>
+          </a:p>
+          <a:p>
+            <a:r>
+              <a:rPr lang="en-US" altLang="zh-TW" dirty="0"/>
+              <a:t> </a:t>
+            </a:r>
+            <a:endParaRPr lang="zh-TW" altLang="zh-TW" dirty="0"/>
+          </a:p>
+          <a:p>
+            <a:r>
+              <a:rPr lang="en-US" altLang="zh-TW" b="1" dirty="0"/>
+              <a:t>route from rou.xml</a:t>
+            </a:r>
+            <a:endParaRPr lang="zh-TW" altLang="zh-TW" dirty="0"/>
+          </a:p>
+          <a:p>
+            <a:r>
+              <a:rPr lang="en-US" altLang="zh-TW" dirty="0"/>
+              <a:t>"313194185#3 313194185#6 313194185#11 313194185#14 496257370#0 405115648#1 313194390#0 675775398 496257372 -315702598#2 </a:t>
+            </a:r>
+            <a:endParaRPr lang="zh-TW" altLang="zh-TW" dirty="0"/>
+          </a:p>
+          <a:p>
+            <a:r>
+              <a:rPr lang="en-US" altLang="zh-TW" dirty="0"/>
+              <a:t>-228022792#6 -228022792#2 72871344 72871329#2 72871329#3 27067581 228022808#0 228022808#2 228022808#4 228022808#6 306974310#0 306974310#1"</a:t>
+            </a:r>
+            <a:endParaRPr lang="zh-TW" altLang="zh-TW" dirty="0"/>
+          </a:p>
           <a:p>
             <a:endParaRPr lang="zh-TW" altLang="en-US" dirty="0"/>
           </a:p>

</xml_diff>

<commit_message>
addPerson but vanish immediately
</commit_message>
<xml_diff>
--- a/eclipse workspace/java_library/sumo_implementation recording.pptx
+++ b/eclipse workspace/java_library/sumo_implementation recording.pptx
@@ -52,6 +52,7 @@
     <p:sldId id="308" r:id="rId46"/>
     <p:sldId id="310" r:id="rId47"/>
     <p:sldId id="309" r:id="rId48"/>
+    <p:sldId id="311" r:id="rId49"/>
   </p:sldIdLst>
   <p:sldSz cx="12192000" cy="6858000"/>
   <p:notesSz cx="6858000" cy="9144000"/>
@@ -289,7 +290,7 @@
           <a:p>
             <a:fld id="{0D31214C-D292-456A-85AA-94C340B15432}" type="datetimeFigureOut">
               <a:rPr lang="zh-TW" altLang="en-US" smtClean="0"/>
-              <a:t>2019/5/1</a:t>
+              <a:t>2019/5/2</a:t>
             </a:fld>
             <a:endParaRPr lang="zh-TW" altLang="en-US"/>
           </a:p>
@@ -459,7 +460,7 @@
           <a:p>
             <a:fld id="{0D31214C-D292-456A-85AA-94C340B15432}" type="datetimeFigureOut">
               <a:rPr lang="zh-TW" altLang="en-US" smtClean="0"/>
-              <a:t>2019/5/1</a:t>
+              <a:t>2019/5/2</a:t>
             </a:fld>
             <a:endParaRPr lang="zh-TW" altLang="en-US"/>
           </a:p>
@@ -639,7 +640,7 @@
           <a:p>
             <a:fld id="{0D31214C-D292-456A-85AA-94C340B15432}" type="datetimeFigureOut">
               <a:rPr lang="zh-TW" altLang="en-US" smtClean="0"/>
-              <a:t>2019/5/1</a:t>
+              <a:t>2019/5/2</a:t>
             </a:fld>
             <a:endParaRPr lang="zh-TW" altLang="en-US"/>
           </a:p>
@@ -809,7 +810,7 @@
           <a:p>
             <a:fld id="{0D31214C-D292-456A-85AA-94C340B15432}" type="datetimeFigureOut">
               <a:rPr lang="zh-TW" altLang="en-US" smtClean="0"/>
-              <a:t>2019/5/1</a:t>
+              <a:t>2019/5/2</a:t>
             </a:fld>
             <a:endParaRPr lang="zh-TW" altLang="en-US"/>
           </a:p>
@@ -1055,7 +1056,7 @@
           <a:p>
             <a:fld id="{0D31214C-D292-456A-85AA-94C340B15432}" type="datetimeFigureOut">
               <a:rPr lang="zh-TW" altLang="en-US" smtClean="0"/>
-              <a:t>2019/5/1</a:t>
+              <a:t>2019/5/2</a:t>
             </a:fld>
             <a:endParaRPr lang="zh-TW" altLang="en-US"/>
           </a:p>
@@ -1287,7 +1288,7 @@
           <a:p>
             <a:fld id="{0D31214C-D292-456A-85AA-94C340B15432}" type="datetimeFigureOut">
               <a:rPr lang="zh-TW" altLang="en-US" smtClean="0"/>
-              <a:t>2019/5/1</a:t>
+              <a:t>2019/5/2</a:t>
             </a:fld>
             <a:endParaRPr lang="zh-TW" altLang="en-US"/>
           </a:p>
@@ -1654,7 +1655,7 @@
           <a:p>
             <a:fld id="{0D31214C-D292-456A-85AA-94C340B15432}" type="datetimeFigureOut">
               <a:rPr lang="zh-TW" altLang="en-US" smtClean="0"/>
-              <a:t>2019/5/1</a:t>
+              <a:t>2019/5/2</a:t>
             </a:fld>
             <a:endParaRPr lang="zh-TW" altLang="en-US"/>
           </a:p>
@@ -1772,7 +1773,7 @@
           <a:p>
             <a:fld id="{0D31214C-D292-456A-85AA-94C340B15432}" type="datetimeFigureOut">
               <a:rPr lang="zh-TW" altLang="en-US" smtClean="0"/>
-              <a:t>2019/5/1</a:t>
+              <a:t>2019/5/2</a:t>
             </a:fld>
             <a:endParaRPr lang="zh-TW" altLang="en-US"/>
           </a:p>
@@ -1867,7 +1868,7 @@
           <a:p>
             <a:fld id="{0D31214C-D292-456A-85AA-94C340B15432}" type="datetimeFigureOut">
               <a:rPr lang="zh-TW" altLang="en-US" smtClean="0"/>
-              <a:t>2019/5/1</a:t>
+              <a:t>2019/5/2</a:t>
             </a:fld>
             <a:endParaRPr lang="zh-TW" altLang="en-US"/>
           </a:p>
@@ -2144,7 +2145,7 @@
           <a:p>
             <a:fld id="{0D31214C-D292-456A-85AA-94C340B15432}" type="datetimeFigureOut">
               <a:rPr lang="zh-TW" altLang="en-US" smtClean="0"/>
-              <a:t>2019/5/1</a:t>
+              <a:t>2019/5/2</a:t>
             </a:fld>
             <a:endParaRPr lang="zh-TW" altLang="en-US"/>
           </a:p>
@@ -2397,7 +2398,7 @@
           <a:p>
             <a:fld id="{0D31214C-D292-456A-85AA-94C340B15432}" type="datetimeFigureOut">
               <a:rPr lang="zh-TW" altLang="en-US" smtClean="0"/>
-              <a:t>2019/5/1</a:t>
+              <a:t>2019/5/2</a:t>
             </a:fld>
             <a:endParaRPr lang="zh-TW" altLang="en-US"/>
           </a:p>
@@ -2610,7 +2611,7 @@
           <a:p>
             <a:fld id="{0D31214C-D292-456A-85AA-94C340B15432}" type="datetimeFigureOut">
               <a:rPr lang="zh-TW" altLang="en-US" smtClean="0"/>
-              <a:t>2019/5/1</a:t>
+              <a:t>2019/5/2</a:t>
             </a:fld>
             <a:endParaRPr lang="zh-TW" altLang="en-US"/>
           </a:p>
@@ -13590,6 +13591,553 @@
 </p:sld>
 </file>
 
+<file path=ppt/slides/slide48.xml><?xml version="1.0" encoding="utf-8"?>
+<p:sld xmlns:a="http://schemas.openxmlformats.org/drawingml/2006/main" xmlns:r="http://schemas.openxmlformats.org/officeDocument/2006/relationships" xmlns:p="http://schemas.openxmlformats.org/presentationml/2006/main">
+  <p:cSld>
+    <p:spTree>
+      <p:nvGrpSpPr>
+        <p:cNvPr id="1" name=""/>
+        <p:cNvGrpSpPr/>
+        <p:nvPr/>
+      </p:nvGrpSpPr>
+      <p:grpSpPr>
+        <a:xfrm>
+          <a:off x="0" y="0"/>
+          <a:ext cx="0" cy="0"/>
+          <a:chOff x="0" y="0"/>
+          <a:chExt cx="0" cy="0"/>
+        </a:xfrm>
+      </p:grpSpPr>
+      <p:sp>
+        <p:nvSpPr>
+          <p:cNvPr id="2" name="標題 1"/>
+          <p:cNvSpPr>
+            <a:spLocks noGrp="1"/>
+          </p:cNvSpPr>
+          <p:nvPr>
+            <p:ph type="title"/>
+          </p:nvPr>
+        </p:nvSpPr>
+        <p:spPr>
+          <a:xfrm>
+            <a:off x="268941" y="251010"/>
+            <a:ext cx="11241741" cy="3316941"/>
+          </a:xfrm>
+          <a:solidFill>
+            <a:schemeClr val="accent2">
+              <a:lumMod val="20000"/>
+              <a:lumOff val="80000"/>
+            </a:schemeClr>
+          </a:solidFill>
+        </p:spPr>
+        <p:txBody>
+          <a:bodyPr>
+            <a:noAutofit/>
+          </a:bodyPr>
+          <a:lstStyle/>
+          <a:p>
+            <a:r>
+              <a:rPr lang="en-US" altLang="zh-TW" sz="2400" dirty="0"/>
+              <a:t/>
+            </a:r>
+            <a:br>
+              <a:rPr lang="en-US" altLang="zh-TW" sz="2400" dirty="0"/>
+            </a:br>
+            <a:r>
+              <a:rPr lang="en-US" altLang="zh-TW" sz="2400" dirty="0"/>
+              <a:t>String </a:t>
+            </a:r>
+            <a:r>
+              <a:rPr lang="en-US" altLang="zh-TW" sz="2400" dirty="0" err="1"/>
+              <a:t>testPersonID</a:t>
+            </a:r>
+            <a:r>
+              <a:rPr lang="en-US" altLang="zh-TW" sz="2400" dirty="0"/>
+              <a:t> = "</a:t>
+            </a:r>
+            <a:r>
+              <a:rPr lang="en-US" altLang="zh-TW" sz="2400" dirty="0" err="1"/>
+              <a:t>ffw</a:t>
+            </a:r>
+            <a:r>
+              <a:rPr lang="en-US" altLang="zh-TW" sz="2400" dirty="0"/>
+              <a:t>";String </a:t>
+            </a:r>
+            <a:r>
+              <a:rPr lang="en-US" altLang="zh-TW" sz="2400" dirty="0" err="1"/>
+              <a:t>TestEdgeID</a:t>
+            </a:r>
+            <a:r>
+              <a:rPr lang="en-US" altLang="zh-TW" sz="2400" dirty="0"/>
+              <a:t> = "160253722#1</a:t>
+            </a:r>
+            <a:r>
+              <a:rPr lang="en-US" altLang="zh-TW" sz="2400" dirty="0" smtClean="0"/>
+              <a:t>";</a:t>
+            </a:r>
+            <a:br>
+              <a:rPr lang="en-US" altLang="zh-TW" sz="2400" dirty="0" smtClean="0"/>
+            </a:br>
+            <a:r>
+              <a:rPr lang="en-US" altLang="zh-TW" sz="2400" dirty="0" smtClean="0"/>
+              <a:t>double </a:t>
+            </a:r>
+            <a:r>
+              <a:rPr lang="en-US" altLang="zh-TW" sz="2400" dirty="0" err="1"/>
+              <a:t>testPos</a:t>
+            </a:r>
+            <a:r>
+              <a:rPr lang="en-US" altLang="zh-TW" sz="2400" dirty="0"/>
+              <a:t> = 1.0</a:t>
+            </a:r>
+            <a:r>
+              <a:rPr lang="en-US" altLang="zh-TW" sz="2400" dirty="0" smtClean="0"/>
+              <a:t>;</a:t>
+            </a:r>
+            <a:br>
+              <a:rPr lang="en-US" altLang="zh-TW" sz="2400" dirty="0" smtClean="0"/>
+            </a:br>
+            <a:r>
+              <a:rPr lang="en-US" altLang="zh-TW" sz="2400" dirty="0" smtClean="0"/>
+              <a:t>double </a:t>
+            </a:r>
+            <a:r>
+              <a:rPr lang="en-US" altLang="zh-TW" sz="2400" dirty="0" err="1"/>
+              <a:t>testDepart</a:t>
+            </a:r>
+            <a:r>
+              <a:rPr lang="en-US" altLang="zh-TW" sz="2400" dirty="0"/>
+              <a:t> = </a:t>
+            </a:r>
+            <a:r>
+              <a:rPr lang="en-US" altLang="zh-TW" sz="2400" dirty="0" err="1"/>
+              <a:t>timeSeconds</a:t>
+            </a:r>
+            <a:r>
+              <a:rPr lang="en-US" altLang="zh-TW" sz="2400" dirty="0" smtClean="0"/>
+              <a:t>;</a:t>
+            </a:r>
+            <a:br>
+              <a:rPr lang="en-US" altLang="zh-TW" sz="2400" dirty="0" smtClean="0"/>
+            </a:br>
+            <a:r>
+              <a:rPr lang="en-US" altLang="zh-TW" sz="2400" dirty="0" smtClean="0"/>
+              <a:t>String </a:t>
+            </a:r>
+            <a:r>
+              <a:rPr lang="en-US" altLang="zh-TW" sz="2400" dirty="0" err="1"/>
+              <a:t>testTypeID</a:t>
+            </a:r>
+            <a:r>
+              <a:rPr lang="en-US" altLang="zh-TW" sz="2400" dirty="0"/>
+              <a:t> = "DEFAULT_PEDTYPE</a:t>
+            </a:r>
+            <a:r>
+              <a:rPr lang="en-US" altLang="zh-TW" sz="2400" dirty="0" smtClean="0"/>
+              <a:t>";</a:t>
+            </a:r>
+            <a:br>
+              <a:rPr lang="en-US" altLang="zh-TW" sz="2400" dirty="0" smtClean="0"/>
+            </a:br>
+            <a:r>
+              <a:rPr lang="en-US" altLang="zh-TW" sz="2400" dirty="0" err="1" smtClean="0"/>
+              <a:t>conn.do_job_set</a:t>
+            </a:r>
+            <a:r>
+              <a:rPr lang="en-US" altLang="zh-TW" sz="2400" dirty="0" smtClean="0"/>
+              <a:t>(</a:t>
+            </a:r>
+            <a:r>
+              <a:rPr lang="en-US" altLang="zh-TW" sz="2400" b="1" dirty="0" err="1" smtClean="0">
+                <a:solidFill>
+                  <a:srgbClr val="FF0000"/>
+                </a:solidFill>
+              </a:rPr>
+              <a:t>Person.add</a:t>
+            </a:r>
+            <a:r>
+              <a:rPr lang="en-US" altLang="zh-TW" sz="2400" dirty="0" smtClean="0"/>
+              <a:t>(</a:t>
+            </a:r>
+            <a:r>
+              <a:rPr lang="en-US" altLang="zh-TW" sz="2400" dirty="0" err="1" smtClean="0"/>
+              <a:t>testPersonID</a:t>
+            </a:r>
+            <a:r>
+              <a:rPr lang="en-US" altLang="zh-TW" sz="2400" dirty="0"/>
+              <a:t>, </a:t>
+            </a:r>
+            <a:r>
+              <a:rPr lang="en-US" altLang="zh-TW" sz="2400" dirty="0" err="1"/>
+              <a:t>TestEdgeID</a:t>
+            </a:r>
+            <a:r>
+              <a:rPr lang="en-US" altLang="zh-TW" sz="2400" dirty="0"/>
+              <a:t>, </a:t>
+            </a:r>
+            <a:r>
+              <a:rPr lang="en-US" altLang="zh-TW" sz="2400" dirty="0" err="1"/>
+              <a:t>testPos</a:t>
+            </a:r>
+            <a:r>
+              <a:rPr lang="en-US" altLang="zh-TW" sz="2400" dirty="0"/>
+              <a:t>, </a:t>
+            </a:r>
+            <a:r>
+              <a:rPr lang="en-US" altLang="zh-TW" sz="2400" dirty="0" err="1"/>
+              <a:t>testDepart</a:t>
+            </a:r>
+            <a:r>
+              <a:rPr lang="en-US" altLang="zh-TW" sz="2400" dirty="0"/>
+              <a:t>, </a:t>
+            </a:r>
+            <a:r>
+              <a:rPr lang="en-US" altLang="zh-TW" sz="2400" dirty="0" err="1"/>
+              <a:t>testTypeID</a:t>
+            </a:r>
+            <a:r>
+              <a:rPr lang="en-US" altLang="zh-TW" sz="2400" dirty="0" smtClean="0"/>
+              <a:t>));</a:t>
+            </a:r>
+            <a:br>
+              <a:rPr lang="en-US" altLang="zh-TW" sz="2400" dirty="0" smtClean="0"/>
+            </a:br>
+            <a:r>
+              <a:rPr lang="en-US" altLang="zh-TW" sz="2400" dirty="0"/>
+              <a:t/>
+            </a:r>
+            <a:br>
+              <a:rPr lang="en-US" altLang="zh-TW" sz="2400" dirty="0"/>
+            </a:br>
+            <a:r>
+              <a:rPr lang="en-US" altLang="zh-TW" sz="2400" dirty="0" err="1" smtClean="0"/>
+              <a:t>System.out.print</a:t>
+            </a:r>
+            <a:r>
+              <a:rPr lang="en-US" altLang="zh-TW" sz="2400" dirty="0" smtClean="0"/>
+              <a:t>(</a:t>
+            </a:r>
+            <a:r>
+              <a:rPr lang="en-US" altLang="zh-TW" sz="2400" dirty="0" err="1" smtClean="0"/>
+              <a:t>conn.do_job_get</a:t>
+            </a:r>
+            <a:r>
+              <a:rPr lang="en-US" altLang="zh-TW" sz="2400" dirty="0" smtClean="0"/>
+              <a:t>(</a:t>
+            </a:r>
+            <a:r>
+              <a:rPr lang="en-US" altLang="zh-TW" sz="2400" dirty="0" err="1" smtClean="0"/>
+              <a:t>Person.getPosition</a:t>
+            </a:r>
+            <a:r>
+              <a:rPr lang="en-US" altLang="zh-TW" sz="2400" dirty="0"/>
+              <a:t>("</a:t>
+            </a:r>
+            <a:r>
+              <a:rPr lang="en-US" altLang="zh-TW" sz="2400" dirty="0" err="1"/>
+              <a:t>ffw</a:t>
+            </a:r>
+            <a:r>
+              <a:rPr lang="en-US" altLang="zh-TW" sz="2400" dirty="0" smtClean="0"/>
+              <a:t>")));</a:t>
+            </a:r>
+            <a:br>
+              <a:rPr lang="en-US" altLang="zh-TW" sz="2400" dirty="0" smtClean="0"/>
+            </a:br>
+            <a:r>
+              <a:rPr lang="en-US" altLang="zh-TW" sz="2400" dirty="0" smtClean="0"/>
+              <a:t>String </a:t>
+            </a:r>
+            <a:r>
+              <a:rPr lang="en-US" altLang="zh-TW" sz="2400" dirty="0" err="1"/>
+              <a:t>stopID</a:t>
+            </a:r>
+            <a:r>
+              <a:rPr lang="en-US" altLang="zh-TW" sz="2400" dirty="0"/>
+              <a:t> = "containerStop1</a:t>
+            </a:r>
+            <a:r>
+              <a:rPr lang="en-US" altLang="zh-TW" sz="2400" dirty="0" smtClean="0"/>
+              <a:t>";</a:t>
+            </a:r>
+            <a:br>
+              <a:rPr lang="en-US" altLang="zh-TW" sz="2400" dirty="0" smtClean="0"/>
+            </a:br>
+            <a:r>
+              <a:rPr lang="en-US" altLang="zh-TW" sz="2400" dirty="0" err="1" smtClean="0"/>
+              <a:t>conn.do_job_set</a:t>
+            </a:r>
+            <a:r>
+              <a:rPr lang="en-US" altLang="zh-TW" sz="2400" dirty="0" smtClean="0"/>
+              <a:t>(</a:t>
+            </a:r>
+            <a:r>
+              <a:rPr lang="en-US" altLang="zh-TW" sz="2400" b="1" dirty="0" err="1" smtClean="0"/>
+              <a:t>Person.appendWaitingStage</a:t>
+            </a:r>
+            <a:r>
+              <a:rPr lang="en-US" altLang="zh-TW" sz="2400" dirty="0" smtClean="0"/>
+              <a:t>(</a:t>
+            </a:r>
+            <a:r>
+              <a:rPr lang="en-US" altLang="zh-TW" sz="2400" dirty="0" err="1" smtClean="0"/>
+              <a:t>testPersonID</a:t>
+            </a:r>
+            <a:r>
+              <a:rPr lang="en-US" altLang="zh-TW" sz="2400" dirty="0"/>
+              <a:t>, 20, "waiting", </a:t>
+            </a:r>
+            <a:r>
+              <a:rPr lang="en-US" altLang="zh-TW" sz="2400" dirty="0" err="1"/>
+              <a:t>stopID</a:t>
+            </a:r>
+            <a:r>
+              <a:rPr lang="en-US" altLang="zh-TW" sz="2400" dirty="0"/>
+              <a:t>));</a:t>
+            </a:r>
+            <a:endParaRPr lang="zh-TW" altLang="en-US" sz="2400" dirty="0"/>
+          </a:p>
+        </p:txBody>
+      </p:sp>
+      <p:sp>
+        <p:nvSpPr>
+          <p:cNvPr id="5" name="內容版面配置區 2"/>
+          <p:cNvSpPr txBox="1">
+            <a:spLocks/>
+          </p:cNvSpPr>
+          <p:nvPr/>
+        </p:nvSpPr>
+        <p:spPr>
+          <a:xfrm>
+            <a:off x="268941" y="3996297"/>
+            <a:ext cx="10515600" cy="2071128"/>
+          </a:xfrm>
+          <a:prstGeom prst="rect">
+            <a:avLst/>
+          </a:prstGeom>
+        </p:spPr>
+        <p:txBody>
+          <a:bodyPr vert="horz" lIns="91440" tIns="45720" rIns="91440" bIns="45720" rtlCol="0">
+            <a:normAutofit/>
+          </a:bodyPr>
+          <a:lstStyle>
+            <a:lvl1pPr marL="228600" indent="-228600" algn="l" defTabSz="914400" rtl="0" eaLnBrk="1" latinLnBrk="0" hangingPunct="1">
+              <a:lnSpc>
+                <a:spcPct val="90000"/>
+              </a:lnSpc>
+              <a:spcBef>
+                <a:spcPts val="1000"/>
+              </a:spcBef>
+              <a:buFont typeface="Arial" panose="020B0604020202020204" pitchFamily="34" charset="0"/>
+              <a:buChar char="•"/>
+              <a:defRPr sz="2800" kern="1200">
+                <a:solidFill>
+                  <a:schemeClr val="tx1"/>
+                </a:solidFill>
+                <a:latin typeface="+mn-lt"/>
+                <a:ea typeface="+mn-ea"/>
+                <a:cs typeface="+mn-cs"/>
+              </a:defRPr>
+            </a:lvl1pPr>
+            <a:lvl2pPr marL="685800" indent="-228600" algn="l" defTabSz="914400" rtl="0" eaLnBrk="1" latinLnBrk="0" hangingPunct="1">
+              <a:lnSpc>
+                <a:spcPct val="90000"/>
+              </a:lnSpc>
+              <a:spcBef>
+                <a:spcPts val="500"/>
+              </a:spcBef>
+              <a:buFont typeface="Arial" panose="020B0604020202020204" pitchFamily="34" charset="0"/>
+              <a:buChar char="•"/>
+              <a:defRPr sz="2400" kern="1200">
+                <a:solidFill>
+                  <a:schemeClr val="tx1"/>
+                </a:solidFill>
+                <a:latin typeface="+mn-lt"/>
+                <a:ea typeface="+mn-ea"/>
+                <a:cs typeface="+mn-cs"/>
+              </a:defRPr>
+            </a:lvl2pPr>
+            <a:lvl3pPr marL="1143000" indent="-228600" algn="l" defTabSz="914400" rtl="0" eaLnBrk="1" latinLnBrk="0" hangingPunct="1">
+              <a:lnSpc>
+                <a:spcPct val="90000"/>
+              </a:lnSpc>
+              <a:spcBef>
+                <a:spcPts val="500"/>
+              </a:spcBef>
+              <a:buFont typeface="Arial" panose="020B0604020202020204" pitchFamily="34" charset="0"/>
+              <a:buChar char="•"/>
+              <a:defRPr sz="2000" kern="1200">
+                <a:solidFill>
+                  <a:schemeClr val="tx1"/>
+                </a:solidFill>
+                <a:latin typeface="+mn-lt"/>
+                <a:ea typeface="+mn-ea"/>
+                <a:cs typeface="+mn-cs"/>
+              </a:defRPr>
+            </a:lvl3pPr>
+            <a:lvl4pPr marL="1600200" indent="-228600" algn="l" defTabSz="914400" rtl="0" eaLnBrk="1" latinLnBrk="0" hangingPunct="1">
+              <a:lnSpc>
+                <a:spcPct val="90000"/>
+              </a:lnSpc>
+              <a:spcBef>
+                <a:spcPts val="500"/>
+              </a:spcBef>
+              <a:buFont typeface="Arial" panose="020B0604020202020204" pitchFamily="34" charset="0"/>
+              <a:buChar char="•"/>
+              <a:defRPr sz="1800" kern="1200">
+                <a:solidFill>
+                  <a:schemeClr val="tx1"/>
+                </a:solidFill>
+                <a:latin typeface="+mn-lt"/>
+                <a:ea typeface="+mn-ea"/>
+                <a:cs typeface="+mn-cs"/>
+              </a:defRPr>
+            </a:lvl4pPr>
+            <a:lvl5pPr marL="2057400" indent="-228600" algn="l" defTabSz="914400" rtl="0" eaLnBrk="1" latinLnBrk="0" hangingPunct="1">
+              <a:lnSpc>
+                <a:spcPct val="90000"/>
+              </a:lnSpc>
+              <a:spcBef>
+                <a:spcPts val="500"/>
+              </a:spcBef>
+              <a:buFont typeface="Arial" panose="020B0604020202020204" pitchFamily="34" charset="0"/>
+              <a:buChar char="•"/>
+              <a:defRPr sz="1800" kern="1200">
+                <a:solidFill>
+                  <a:schemeClr val="tx1"/>
+                </a:solidFill>
+                <a:latin typeface="+mn-lt"/>
+                <a:ea typeface="+mn-ea"/>
+                <a:cs typeface="+mn-cs"/>
+              </a:defRPr>
+            </a:lvl5pPr>
+            <a:lvl6pPr marL="2514600" indent="-228600" algn="l" defTabSz="914400" rtl="0" eaLnBrk="1" latinLnBrk="0" hangingPunct="1">
+              <a:lnSpc>
+                <a:spcPct val="90000"/>
+              </a:lnSpc>
+              <a:spcBef>
+                <a:spcPts val="500"/>
+              </a:spcBef>
+              <a:buFont typeface="Arial" panose="020B0604020202020204" pitchFamily="34" charset="0"/>
+              <a:buChar char="•"/>
+              <a:defRPr sz="1800" kern="1200">
+                <a:solidFill>
+                  <a:schemeClr val="tx1"/>
+                </a:solidFill>
+                <a:latin typeface="+mn-lt"/>
+                <a:ea typeface="+mn-ea"/>
+                <a:cs typeface="+mn-cs"/>
+              </a:defRPr>
+            </a:lvl6pPr>
+            <a:lvl7pPr marL="2971800" indent="-228600" algn="l" defTabSz="914400" rtl="0" eaLnBrk="1" latinLnBrk="0" hangingPunct="1">
+              <a:lnSpc>
+                <a:spcPct val="90000"/>
+              </a:lnSpc>
+              <a:spcBef>
+                <a:spcPts val="500"/>
+              </a:spcBef>
+              <a:buFont typeface="Arial" panose="020B0604020202020204" pitchFamily="34" charset="0"/>
+              <a:buChar char="•"/>
+              <a:defRPr sz="1800" kern="1200">
+                <a:solidFill>
+                  <a:schemeClr val="tx1"/>
+                </a:solidFill>
+                <a:latin typeface="+mn-lt"/>
+                <a:ea typeface="+mn-ea"/>
+                <a:cs typeface="+mn-cs"/>
+              </a:defRPr>
+            </a:lvl7pPr>
+            <a:lvl8pPr marL="3429000" indent="-228600" algn="l" defTabSz="914400" rtl="0" eaLnBrk="1" latinLnBrk="0" hangingPunct="1">
+              <a:lnSpc>
+                <a:spcPct val="90000"/>
+              </a:lnSpc>
+              <a:spcBef>
+                <a:spcPts val="500"/>
+              </a:spcBef>
+              <a:buFont typeface="Arial" panose="020B0604020202020204" pitchFamily="34" charset="0"/>
+              <a:buChar char="•"/>
+              <a:defRPr sz="1800" kern="1200">
+                <a:solidFill>
+                  <a:schemeClr val="tx1"/>
+                </a:solidFill>
+                <a:latin typeface="+mn-lt"/>
+                <a:ea typeface="+mn-ea"/>
+                <a:cs typeface="+mn-cs"/>
+              </a:defRPr>
+            </a:lvl8pPr>
+            <a:lvl9pPr marL="3886200" indent="-228600" algn="l" defTabSz="914400" rtl="0" eaLnBrk="1" latinLnBrk="0" hangingPunct="1">
+              <a:lnSpc>
+                <a:spcPct val="90000"/>
+              </a:lnSpc>
+              <a:spcBef>
+                <a:spcPts val="500"/>
+              </a:spcBef>
+              <a:buFont typeface="Arial" panose="020B0604020202020204" pitchFamily="34" charset="0"/>
+              <a:buChar char="•"/>
+              <a:defRPr sz="1800" kern="1200">
+                <a:solidFill>
+                  <a:schemeClr val="tx1"/>
+                </a:solidFill>
+                <a:latin typeface="+mn-lt"/>
+                <a:ea typeface="+mn-ea"/>
+                <a:cs typeface="+mn-cs"/>
+              </a:defRPr>
+            </a:lvl9pPr>
+          </a:lstStyle>
+          <a:p>
+            <a:r>
+              <a:rPr lang="en-US" altLang="zh-TW" dirty="0" smtClean="0">
+                <a:solidFill>
+                  <a:srgbClr val="FF0000"/>
+                </a:solidFill>
+              </a:rPr>
+              <a:t>Error</a:t>
+            </a:r>
+            <a:r>
+              <a:rPr lang="en-US" altLang="zh-TW" dirty="0">
+                <a:solidFill>
+                  <a:srgbClr val="FF0000"/>
+                </a:solidFill>
+              </a:rPr>
+              <a:t>: Answered with error to command 0xce: Invalid stopping place id 'containerStop1' for person: '</a:t>
+            </a:r>
+            <a:r>
+              <a:rPr lang="en-US" altLang="zh-TW" dirty="0" err="1">
+                <a:solidFill>
+                  <a:srgbClr val="FF0000"/>
+                </a:solidFill>
+              </a:rPr>
+              <a:t>ffw</a:t>
+            </a:r>
+            <a:r>
+              <a:rPr lang="en-US" altLang="zh-TW" dirty="0">
+                <a:solidFill>
+                  <a:srgbClr val="FF0000"/>
+                </a:solidFill>
+              </a:rPr>
+              <a:t>'</a:t>
+            </a:r>
+            <a:endParaRPr lang="en-US" altLang="zh-TW" dirty="0">
+              <a:solidFill>
+                <a:srgbClr val="FF0000"/>
+              </a:solidFill>
+            </a:endParaRPr>
+          </a:p>
+        </p:txBody>
+      </p:sp>
+    </p:spTree>
+    <p:extLst>
+      <p:ext uri="{BB962C8B-B14F-4D97-AF65-F5344CB8AC3E}">
+        <p14:creationId xmlns:p14="http://schemas.microsoft.com/office/powerpoint/2010/main" val="3721798203"/>
+      </p:ext>
+    </p:extLst>
+  </p:cSld>
+  <p:clrMapOvr>
+    <a:masterClrMapping/>
+  </p:clrMapOvr>
+</p:sld>
+</file>
+
 <file path=ppt/slides/slide5.xml><?xml version="1.0" encoding="utf-8"?>
 <p:sld xmlns:a="http://schemas.openxmlformats.org/drawingml/2006/main" xmlns:r="http://schemas.openxmlformats.org/officeDocument/2006/relationships" xmlns:p="http://schemas.openxmlformats.org/presentationml/2006/main">
   <p:cSld>

</xml_diff>

<commit_message>
add snapshot of isStopped
</commit_message>
<xml_diff>
--- a/eclipse workspace/java_library/sumo_implementation recording.pptx
+++ b/eclipse workspace/java_library/sumo_implementation recording.pptx
@@ -53,6 +53,8 @@
     <p:sldId id="310" r:id="rId47"/>
     <p:sldId id="309" r:id="rId48"/>
     <p:sldId id="311" r:id="rId49"/>
+    <p:sldId id="312" r:id="rId50"/>
+    <p:sldId id="313" r:id="rId51"/>
   </p:sldIdLst>
   <p:sldSz cx="12192000" cy="6858000"/>
   <p:notesSz cx="6858000" cy="9144000"/>
@@ -290,7 +292,7 @@
           <a:p>
             <a:fld id="{0D31214C-D292-456A-85AA-94C340B15432}" type="datetimeFigureOut">
               <a:rPr lang="zh-TW" altLang="en-US" smtClean="0"/>
-              <a:t>2019/5/2</a:t>
+              <a:t>2019/5/3</a:t>
             </a:fld>
             <a:endParaRPr lang="zh-TW" altLang="en-US"/>
           </a:p>
@@ -460,7 +462,7 @@
           <a:p>
             <a:fld id="{0D31214C-D292-456A-85AA-94C340B15432}" type="datetimeFigureOut">
               <a:rPr lang="zh-TW" altLang="en-US" smtClean="0"/>
-              <a:t>2019/5/2</a:t>
+              <a:t>2019/5/3</a:t>
             </a:fld>
             <a:endParaRPr lang="zh-TW" altLang="en-US"/>
           </a:p>
@@ -640,7 +642,7 @@
           <a:p>
             <a:fld id="{0D31214C-D292-456A-85AA-94C340B15432}" type="datetimeFigureOut">
               <a:rPr lang="zh-TW" altLang="en-US" smtClean="0"/>
-              <a:t>2019/5/2</a:t>
+              <a:t>2019/5/3</a:t>
             </a:fld>
             <a:endParaRPr lang="zh-TW" altLang="en-US"/>
           </a:p>
@@ -810,7 +812,7 @@
           <a:p>
             <a:fld id="{0D31214C-D292-456A-85AA-94C340B15432}" type="datetimeFigureOut">
               <a:rPr lang="zh-TW" altLang="en-US" smtClean="0"/>
-              <a:t>2019/5/2</a:t>
+              <a:t>2019/5/3</a:t>
             </a:fld>
             <a:endParaRPr lang="zh-TW" altLang="en-US"/>
           </a:p>
@@ -1056,7 +1058,7 @@
           <a:p>
             <a:fld id="{0D31214C-D292-456A-85AA-94C340B15432}" type="datetimeFigureOut">
               <a:rPr lang="zh-TW" altLang="en-US" smtClean="0"/>
-              <a:t>2019/5/2</a:t>
+              <a:t>2019/5/3</a:t>
             </a:fld>
             <a:endParaRPr lang="zh-TW" altLang="en-US"/>
           </a:p>
@@ -1288,7 +1290,7 @@
           <a:p>
             <a:fld id="{0D31214C-D292-456A-85AA-94C340B15432}" type="datetimeFigureOut">
               <a:rPr lang="zh-TW" altLang="en-US" smtClean="0"/>
-              <a:t>2019/5/2</a:t>
+              <a:t>2019/5/3</a:t>
             </a:fld>
             <a:endParaRPr lang="zh-TW" altLang="en-US"/>
           </a:p>
@@ -1655,7 +1657,7 @@
           <a:p>
             <a:fld id="{0D31214C-D292-456A-85AA-94C340B15432}" type="datetimeFigureOut">
               <a:rPr lang="zh-TW" altLang="en-US" smtClean="0"/>
-              <a:t>2019/5/2</a:t>
+              <a:t>2019/5/3</a:t>
             </a:fld>
             <a:endParaRPr lang="zh-TW" altLang="en-US"/>
           </a:p>
@@ -1773,7 +1775,7 @@
           <a:p>
             <a:fld id="{0D31214C-D292-456A-85AA-94C340B15432}" type="datetimeFigureOut">
               <a:rPr lang="zh-TW" altLang="en-US" smtClean="0"/>
-              <a:t>2019/5/2</a:t>
+              <a:t>2019/5/3</a:t>
             </a:fld>
             <a:endParaRPr lang="zh-TW" altLang="en-US"/>
           </a:p>
@@ -1868,7 +1870,7 @@
           <a:p>
             <a:fld id="{0D31214C-D292-456A-85AA-94C340B15432}" type="datetimeFigureOut">
               <a:rPr lang="zh-TW" altLang="en-US" smtClean="0"/>
-              <a:t>2019/5/2</a:t>
+              <a:t>2019/5/3</a:t>
             </a:fld>
             <a:endParaRPr lang="zh-TW" altLang="en-US"/>
           </a:p>
@@ -2145,7 +2147,7 @@
           <a:p>
             <a:fld id="{0D31214C-D292-456A-85AA-94C340B15432}" type="datetimeFigureOut">
               <a:rPr lang="zh-TW" altLang="en-US" smtClean="0"/>
-              <a:t>2019/5/2</a:t>
+              <a:t>2019/5/3</a:t>
             </a:fld>
             <a:endParaRPr lang="zh-TW" altLang="en-US"/>
           </a:p>
@@ -2398,7 +2400,7 @@
           <a:p>
             <a:fld id="{0D31214C-D292-456A-85AA-94C340B15432}" type="datetimeFigureOut">
               <a:rPr lang="zh-TW" altLang="en-US" smtClean="0"/>
-              <a:t>2019/5/2</a:t>
+              <a:t>2019/5/3</a:t>
             </a:fld>
             <a:endParaRPr lang="zh-TW" altLang="en-US"/>
           </a:p>
@@ -2611,7 +2613,7 @@
           <a:p>
             <a:fld id="{0D31214C-D292-456A-85AA-94C340B15432}" type="datetimeFigureOut">
               <a:rPr lang="zh-TW" altLang="en-US" smtClean="0"/>
-              <a:t>2019/5/2</a:t>
+              <a:t>2019/5/3</a:t>
             </a:fld>
             <a:endParaRPr lang="zh-TW" altLang="en-US"/>
           </a:p>
@@ -12349,7 +12351,7 @@
           <a:lstStyle/>
           <a:p>
             <a:r>
-              <a:rPr lang="en-US" altLang="zh-TW" dirty="0" err="1"/>
+              <a:rPr lang="en-US" altLang="zh-TW" b="1" dirty="0" err="1"/>
               <a:t>newRoute</a:t>
             </a:r>
             <a:r>
@@ -12849,25 +12851,6 @@
       </p:grpSpPr>
       <p:sp>
         <p:nvSpPr>
-          <p:cNvPr id="8" name="標題 7"/>
-          <p:cNvSpPr>
-            <a:spLocks noGrp="1"/>
-          </p:cNvSpPr>
-          <p:nvPr>
-            <p:ph type="title"/>
-          </p:nvPr>
-        </p:nvSpPr>
-        <p:spPr/>
-        <p:txBody>
-          <a:bodyPr/>
-          <a:lstStyle/>
-          <a:p>
-            <a:endParaRPr lang="zh-TW" altLang="en-US"/>
-          </a:p>
-        </p:txBody>
-      </p:sp>
-      <p:sp>
-        <p:nvSpPr>
           <p:cNvPr id="9" name="內容版面配置區 8"/>
           <p:cNvSpPr>
             <a:spLocks noGrp="1"/>
@@ -12876,100 +12859,138 @@
             <p:ph idx="1"/>
           </p:nvPr>
         </p:nvSpPr>
-        <p:spPr/>
+        <p:spPr>
+          <a:xfrm>
+            <a:off x="376518" y="304799"/>
+            <a:ext cx="11600329" cy="6382871"/>
+          </a:xfrm>
+        </p:spPr>
         <p:txBody>
           <a:bodyPr>
-            <a:normAutofit fontScale="62500" lnSpcReduction="20000"/>
+            <a:noAutofit/>
           </a:bodyPr>
           <a:lstStyle/>
           <a:p>
-            <a:r>
-              <a:rPr lang="en-US" altLang="zh-TW" b="1" dirty="0" err="1"/>
+            <a:pPr marL="0" indent="0">
+              <a:buNone/>
+            </a:pPr>
+            <a:r>
+              <a:rPr lang="en-US" altLang="zh-TW" sz="2400" b="1" dirty="0" err="1"/>
               <a:t>defaultRouteList</a:t>
             </a:r>
             <a:r>
-              <a:rPr lang="en-US" altLang="zh-TW" dirty="0"/>
+              <a:rPr lang="en-US" altLang="zh-TW" sz="2400" dirty="0"/>
               <a:t>:[</a:t>
             </a:r>
-            <a:endParaRPr lang="zh-TW" altLang="zh-TW" dirty="0"/>
-          </a:p>
-          <a:p>
-            <a:r>
-              <a:rPr lang="en-US" altLang="zh-TW" dirty="0"/>
+            <a:endParaRPr lang="zh-TW" altLang="zh-TW" sz="2400" dirty="0"/>
+          </a:p>
+          <a:p>
+            <a:pPr marL="0" indent="0">
+              <a:buNone/>
+            </a:pPr>
+            <a:r>
+              <a:rPr lang="en-US" altLang="zh-TW" sz="2400" dirty="0"/>
               <a:t>313194185#3, 313194185#6, 313194185#11, 313194185#14, 496257370#0, 405115648#1, 313194390#0, 675775398, 496257372, -315702598#2, </a:t>
             </a:r>
-            <a:endParaRPr lang="zh-TW" altLang="zh-TW" dirty="0"/>
-          </a:p>
-          <a:p>
-            <a:r>
-              <a:rPr lang="en-US" altLang="zh-TW" dirty="0"/>
+            <a:endParaRPr lang="zh-TW" altLang="zh-TW" sz="2400" dirty="0"/>
+          </a:p>
+          <a:p>
+            <a:pPr marL="0" indent="0">
+              <a:buNone/>
+            </a:pPr>
+            <a:r>
+              <a:rPr lang="en-US" altLang="zh-TW" sz="2400" dirty="0"/>
               <a:t>-228022792#6, -228022792#2, 72871344, 72871329#2, 72871329#3, 27067581, 228022808#0, 228022808#2, 228022808#4, 228022808#6, 306974310#0, 306974310#1]</a:t>
             </a:r>
-            <a:endParaRPr lang="zh-TW" altLang="zh-TW" dirty="0"/>
-          </a:p>
-          <a:p>
-            <a:r>
-              <a:rPr lang="en-US" altLang="zh-TW" dirty="0"/>
+            <a:endParaRPr lang="zh-TW" altLang="zh-TW" sz="2400" dirty="0"/>
+          </a:p>
+          <a:p>
+            <a:pPr marL="0" indent="0">
+              <a:buNone/>
+            </a:pPr>
+            <a:r>
+              <a:rPr lang="en-US" altLang="zh-TW" sz="2400" dirty="0"/>
               <a:t> </a:t>
             </a:r>
-            <a:endParaRPr lang="zh-TW" altLang="zh-TW" dirty="0"/>
-          </a:p>
-          <a:p>
-            <a:r>
-              <a:rPr lang="en-US" altLang="zh-TW" b="1" dirty="0"/>
+            <a:endParaRPr lang="zh-TW" altLang="zh-TW" sz="2400" dirty="0"/>
+          </a:p>
+          <a:p>
+            <a:pPr marL="0" indent="0">
+              <a:buNone/>
+            </a:pPr>
+            <a:r>
+              <a:rPr lang="en-US" altLang="zh-TW" sz="2400" b="1" dirty="0"/>
               <a:t>changing Route:</a:t>
             </a:r>
-            <a:endParaRPr lang="zh-TW" altLang="zh-TW" dirty="0"/>
-          </a:p>
-          <a:p>
-            <a:r>
-              <a:rPr lang="en-US" altLang="zh-TW" b="1" dirty="0" err="1"/>
+            <a:endParaRPr lang="zh-TW" altLang="zh-TW" sz="2400" dirty="0"/>
+          </a:p>
+          <a:p>
+            <a:pPr marL="0" indent="0">
+              <a:buNone/>
+            </a:pPr>
+            <a:r>
+              <a:rPr lang="en-US" altLang="zh-TW" sz="2400" b="1" dirty="0" err="1"/>
               <a:t>changedRouteList</a:t>
             </a:r>
             <a:r>
-              <a:rPr lang="en-US" altLang="zh-TW" dirty="0"/>
+              <a:rPr lang="en-US" altLang="zh-TW" sz="2400" dirty="0"/>
               <a:t>:[313194185#3, 313194185#6, 313194185#11, 313194185#14, 496257370#0, 405115648#1, -307096543#5, -537706053#4,</a:t>
             </a:r>
             <a:r>
-              <a:rPr lang="en-US" altLang="zh-TW" b="1" dirty="0"/>
+              <a:rPr lang="en-US" altLang="zh-TW" sz="2400" b="1" dirty="0"/>
               <a:t> -537706053#2</a:t>
             </a:r>
             <a:r>
-              <a:rPr lang="en-US" altLang="zh-TW" dirty="0"/>
+              <a:rPr lang="en-US" altLang="zh-TW" sz="2400" dirty="0"/>
               <a:t>]</a:t>
             </a:r>
-            <a:endParaRPr lang="zh-TW" altLang="zh-TW" dirty="0"/>
-          </a:p>
-          <a:p>
-            <a:r>
-              <a:rPr lang="en-US" altLang="zh-TW" dirty="0"/>
+            <a:endParaRPr lang="zh-TW" altLang="zh-TW" sz="2400" dirty="0"/>
+          </a:p>
+          <a:p>
+            <a:pPr marL="0" indent="0">
+              <a:buNone/>
+            </a:pPr>
+            <a:r>
+              <a:rPr lang="en-US" altLang="zh-TW" sz="2400" dirty="0"/>
               <a:t> </a:t>
             </a:r>
-            <a:endParaRPr lang="zh-TW" altLang="zh-TW" dirty="0"/>
-          </a:p>
-          <a:p>
-            <a:r>
-              <a:rPr lang="en-US" altLang="zh-TW" b="1" dirty="0"/>
+            <a:endParaRPr lang="zh-TW" altLang="zh-TW" sz="2400" dirty="0"/>
+          </a:p>
+          <a:p>
+            <a:pPr marL="0" indent="0">
+              <a:buNone/>
+            </a:pPr>
+            <a:r>
+              <a:rPr lang="en-US" altLang="zh-TW" sz="2400" b="1" dirty="0"/>
               <a:t>route from rou.xml</a:t>
             </a:r>
-            <a:endParaRPr lang="zh-TW" altLang="zh-TW" dirty="0"/>
-          </a:p>
-          <a:p>
-            <a:r>
-              <a:rPr lang="en-US" altLang="zh-TW" dirty="0"/>
+            <a:endParaRPr lang="zh-TW" altLang="zh-TW" sz="2400" dirty="0"/>
+          </a:p>
+          <a:p>
+            <a:pPr marL="0" indent="0">
+              <a:buNone/>
+            </a:pPr>
+            <a:r>
+              <a:rPr lang="en-US" altLang="zh-TW" sz="2400" dirty="0"/>
               <a:t>"313194185#3 313194185#6 313194185#11 313194185#14 496257370#0 405115648#1 313194390#0 675775398 496257372 -315702598#2 </a:t>
             </a:r>
-            <a:endParaRPr lang="zh-TW" altLang="zh-TW" dirty="0"/>
-          </a:p>
-          <a:p>
-            <a:r>
-              <a:rPr lang="en-US" altLang="zh-TW" dirty="0"/>
+            <a:endParaRPr lang="zh-TW" altLang="zh-TW" sz="2400" dirty="0"/>
+          </a:p>
+          <a:p>
+            <a:pPr marL="0" indent="0">
+              <a:buNone/>
+            </a:pPr>
+            <a:r>
+              <a:rPr lang="en-US" altLang="zh-TW" sz="2400" dirty="0"/>
               <a:t>-228022792#6 -228022792#2 72871344 72871329#2 72871329#3 27067581 228022808#0 228022808#2 228022808#4 228022808#6 306974310#0 306974310#1"</a:t>
             </a:r>
-            <a:endParaRPr lang="zh-TW" altLang="zh-TW" dirty="0"/>
-          </a:p>
-          <a:p>
-            <a:endParaRPr lang="zh-TW" altLang="en-US" dirty="0"/>
+            <a:endParaRPr lang="zh-TW" altLang="zh-TW" sz="2400" dirty="0"/>
+          </a:p>
+          <a:p>
+            <a:pPr marL="0" indent="0">
+              <a:buNone/>
+            </a:pPr>
+            <a:endParaRPr lang="zh-TW" altLang="en-US" sz="2400" dirty="0"/>
           </a:p>
         </p:txBody>
       </p:sp>
@@ -13005,29 +13026,6 @@
       </p:grpSpPr>
       <p:sp>
         <p:nvSpPr>
-          <p:cNvPr id="2" name="標題 1"/>
-          <p:cNvSpPr>
-            <a:spLocks noGrp="1"/>
-          </p:cNvSpPr>
-          <p:nvPr>
-            <p:ph type="title"/>
-          </p:nvPr>
-        </p:nvSpPr>
-        <p:spPr/>
-        <p:txBody>
-          <a:bodyPr/>
-          <a:lstStyle/>
-          <a:p>
-            <a:r>
-              <a:rPr lang="en-US" altLang="zh-TW" b="1" dirty="0" err="1"/>
-              <a:t>setContainerStop</a:t>
-            </a:r>
-            <a:endParaRPr lang="zh-TW" altLang="en-US" b="1" dirty="0"/>
-          </a:p>
-        </p:txBody>
-      </p:sp>
-      <p:sp>
-        <p:nvSpPr>
           <p:cNvPr id="3" name="內容版面配置區 2"/>
           <p:cNvSpPr>
             <a:spLocks noGrp="1"/>
@@ -13036,7 +13034,12 @@
             <p:ph idx="1"/>
           </p:nvPr>
         </p:nvSpPr>
-        <p:spPr/>
+        <p:spPr>
+          <a:xfrm>
+            <a:off x="838200" y="304800"/>
+            <a:ext cx="10515600" cy="5872163"/>
+          </a:xfrm>
+        </p:spPr>
         <p:txBody>
           <a:bodyPr>
             <a:normAutofit fontScale="47500" lnSpcReduction="20000"/>
@@ -13044,229 +13047,237 @@
           <a:lstStyle/>
           <a:p>
             <a:r>
-              <a:rPr lang="en-US" altLang="zh-TW" sz="3300" dirty="0"/>
+              <a:rPr lang="en-US" altLang="zh-TW" sz="4400" dirty="0"/>
               <a:t>/**</a:t>
             </a:r>
-            <a:endParaRPr lang="zh-TW" altLang="zh-TW" sz="3300" dirty="0"/>
-          </a:p>
-          <a:p>
-            <a:r>
-              <a:rPr lang="en-US" altLang="zh-TW" sz="3300" dirty="0"/>
+            <a:endParaRPr lang="zh-TW" altLang="zh-TW" sz="4400" dirty="0"/>
+          </a:p>
+          <a:p>
+            <a:r>
+              <a:rPr lang="en-US" altLang="zh-TW" sz="4400" dirty="0"/>
               <a:t>	 *  Adds or modifies a container stop with the given parameters. The duration and the until attribute are</a:t>
             </a:r>
-            <a:endParaRPr lang="zh-TW" altLang="zh-TW" sz="3300" dirty="0"/>
-          </a:p>
-          <a:p>
-            <a:r>
-              <a:rPr lang="en-US" altLang="zh-TW" sz="3300" dirty="0"/>
+            <a:endParaRPr lang="zh-TW" altLang="zh-TW" sz="4400" dirty="0"/>
+          </a:p>
+          <a:p>
+            <a:r>
+              <a:rPr lang="en-US" altLang="zh-TW" sz="4400" dirty="0"/>
               <a:t>	    in milliseconds.</a:t>
             </a:r>
-            <a:endParaRPr lang="zh-TW" altLang="zh-TW" sz="3300" dirty="0"/>
-          </a:p>
-          <a:p>
-            <a:r>
-              <a:rPr lang="en-US" altLang="zh-TW" sz="3300" dirty="0"/>
+            <a:endParaRPr lang="zh-TW" altLang="zh-TW" sz="4400" dirty="0"/>
+          </a:p>
+          <a:p>
+            <a:r>
+              <a:rPr lang="en-US" altLang="zh-TW" sz="4400" dirty="0"/>
               <a:t> </a:t>
             </a:r>
-            <a:endParaRPr lang="zh-TW" altLang="zh-TW" sz="3300" dirty="0"/>
-          </a:p>
-          <a:p>
-            <a:r>
-              <a:rPr lang="en-US" altLang="zh-TW" sz="3300" dirty="0"/>
+            <a:endParaRPr lang="zh-TW" altLang="zh-TW" sz="4400" dirty="0"/>
+          </a:p>
+          <a:p>
+            <a:r>
+              <a:rPr lang="en-US" altLang="zh-TW" sz="4400" dirty="0"/>
               <a:t>	 * @</a:t>
             </a:r>
             <a:r>
-              <a:rPr lang="en-US" altLang="zh-TW" sz="3300" dirty="0" err="1"/>
+              <a:rPr lang="en-US" altLang="zh-TW" sz="4400" dirty="0" err="1"/>
               <a:t>param</a:t>
             </a:r>
             <a:r>
-              <a:rPr lang="en-US" altLang="zh-TW" sz="3300" dirty="0"/>
+              <a:rPr lang="en-US" altLang="zh-TW" sz="4400" dirty="0"/>
               <a:t> </a:t>
             </a:r>
             <a:r>
-              <a:rPr lang="en-US" altLang="zh-TW" sz="3300" dirty="0" err="1"/>
+              <a:rPr lang="en-US" altLang="zh-TW" sz="4400" dirty="0" err="1"/>
               <a:t>vehID</a:t>
             </a:r>
             <a:r>
-              <a:rPr lang="en-US" altLang="zh-TW" sz="3300" dirty="0"/>
+              <a:rPr lang="en-US" altLang="zh-TW" sz="4400" dirty="0"/>
               <a:t> id of the vehicle</a:t>
             </a:r>
-            <a:endParaRPr lang="zh-TW" altLang="zh-TW" sz="3300" dirty="0"/>
-          </a:p>
-          <a:p>
-            <a:r>
-              <a:rPr lang="en-US" altLang="zh-TW" sz="3300" dirty="0"/>
+            <a:endParaRPr lang="zh-TW" altLang="zh-TW" sz="4400" dirty="0"/>
+          </a:p>
+          <a:p>
+            <a:r>
+              <a:rPr lang="en-US" altLang="zh-TW" sz="4400" dirty="0"/>
               <a:t>	 * @</a:t>
             </a:r>
             <a:r>
-              <a:rPr lang="en-US" altLang="zh-TW" sz="3300" dirty="0" err="1"/>
+              <a:rPr lang="en-US" altLang="zh-TW" sz="4400" dirty="0" err="1"/>
               <a:t>param</a:t>
             </a:r>
             <a:r>
-              <a:rPr lang="en-US" altLang="zh-TW" sz="3300" dirty="0"/>
+              <a:rPr lang="en-US" altLang="zh-TW" sz="4400" dirty="0"/>
               <a:t> </a:t>
             </a:r>
             <a:r>
-              <a:rPr lang="en-US" altLang="zh-TW" sz="3300" dirty="0" err="1"/>
+              <a:rPr lang="en-US" altLang="zh-TW" sz="4400" dirty="0" err="1"/>
               <a:t>stopID</a:t>
             </a:r>
-            <a:endParaRPr lang="zh-TW" altLang="zh-TW" sz="3300" dirty="0"/>
-          </a:p>
-          <a:p>
-            <a:r>
-              <a:rPr lang="en-US" altLang="zh-TW" sz="3300" dirty="0"/>
+            <a:endParaRPr lang="zh-TW" altLang="zh-TW" sz="4400" dirty="0"/>
+          </a:p>
+          <a:p>
+            <a:r>
+              <a:rPr lang="en-US" altLang="zh-TW" sz="4400" dirty="0"/>
               <a:t>	 * @</a:t>
             </a:r>
             <a:r>
-              <a:rPr lang="en-US" altLang="zh-TW" sz="3300" dirty="0" err="1"/>
+              <a:rPr lang="en-US" altLang="zh-TW" sz="4400" dirty="0" err="1"/>
               <a:t>param</a:t>
             </a:r>
             <a:r>
-              <a:rPr lang="en-US" altLang="zh-TW" sz="3300" dirty="0"/>
+              <a:rPr lang="en-US" altLang="zh-TW" sz="4400" dirty="0"/>
               <a:t> duration</a:t>
             </a:r>
-            <a:endParaRPr lang="zh-TW" altLang="zh-TW" sz="3300" dirty="0"/>
-          </a:p>
-          <a:p>
-            <a:r>
-              <a:rPr lang="en-US" altLang="zh-TW" sz="3300" dirty="0"/>
+            <a:endParaRPr lang="zh-TW" altLang="zh-TW" sz="4400" dirty="0"/>
+          </a:p>
+          <a:p>
+            <a:r>
+              <a:rPr lang="en-US" altLang="zh-TW" sz="4400" dirty="0"/>
               <a:t>	 * @</a:t>
             </a:r>
             <a:r>
-              <a:rPr lang="en-US" altLang="zh-TW" sz="3300" dirty="0" err="1"/>
+              <a:rPr lang="en-US" altLang="zh-TW" sz="4400" dirty="0" err="1"/>
               <a:t>param</a:t>
             </a:r>
             <a:r>
-              <a:rPr lang="en-US" altLang="zh-TW" sz="3300" dirty="0"/>
+              <a:rPr lang="en-US" altLang="zh-TW" sz="4400" dirty="0"/>
               <a:t> until</a:t>
             </a:r>
-            <a:endParaRPr lang="zh-TW" altLang="zh-TW" sz="3300" dirty="0"/>
-          </a:p>
-          <a:p>
-            <a:r>
-              <a:rPr lang="en-US" altLang="zh-TW" sz="3300" dirty="0"/>
+            <a:endParaRPr lang="zh-TW" altLang="zh-TW" sz="4400" dirty="0"/>
+          </a:p>
+          <a:p>
+            <a:r>
+              <a:rPr lang="en-US" altLang="zh-TW" sz="4400" dirty="0"/>
               <a:t>	 * @return </a:t>
             </a:r>
             <a:r>
-              <a:rPr lang="en-US" altLang="zh-TW" sz="3300" dirty="0" err="1"/>
+              <a:rPr lang="en-US" altLang="zh-TW" sz="4400" dirty="0" err="1"/>
               <a:t>SumoCommand</a:t>
             </a:r>
-            <a:endParaRPr lang="zh-TW" altLang="zh-TW" sz="3300" dirty="0"/>
-          </a:p>
-          <a:p>
-            <a:r>
-              <a:rPr lang="en-US" altLang="zh-TW" sz="3300" dirty="0"/>
+            <a:endParaRPr lang="zh-TW" altLang="zh-TW" sz="4400" dirty="0"/>
+          </a:p>
+          <a:p>
+            <a:r>
+              <a:rPr lang="en-US" altLang="zh-TW" sz="4400" dirty="0"/>
               <a:t>	 */</a:t>
             </a:r>
-            <a:endParaRPr lang="zh-TW" altLang="zh-TW" sz="3300" dirty="0"/>
-          </a:p>
-          <a:p>
-            <a:r>
-              <a:rPr lang="en-US" altLang="zh-TW" sz="3300" dirty="0"/>
+            <a:endParaRPr lang="zh-TW" altLang="zh-TW" sz="4400" dirty="0"/>
+          </a:p>
+          <a:p>
+            <a:r>
+              <a:rPr lang="en-US" altLang="zh-TW" sz="4400" dirty="0"/>
               <a:t>	public static </a:t>
             </a:r>
             <a:r>
-              <a:rPr lang="en-US" altLang="zh-TW" sz="3300" dirty="0" err="1"/>
+              <a:rPr lang="en-US" altLang="zh-TW" sz="4400" dirty="0" err="1"/>
               <a:t>SumoCommand</a:t>
             </a:r>
             <a:r>
-              <a:rPr lang="en-US" altLang="zh-TW" sz="3300" dirty="0"/>
+              <a:rPr lang="en-US" altLang="zh-TW" sz="4400" dirty="0"/>
               <a:t> </a:t>
             </a:r>
             <a:r>
-              <a:rPr lang="en-US" altLang="zh-TW" sz="3300" dirty="0" err="1"/>
+              <a:rPr lang="en-US" altLang="zh-TW" sz="4400" b="1" dirty="0" err="1"/>
               <a:t>setContainerStop</a:t>
             </a:r>
             <a:r>
-              <a:rPr lang="en-US" altLang="zh-TW" sz="3300" dirty="0"/>
+              <a:rPr lang="en-US" altLang="zh-TW" sz="4400" dirty="0"/>
               <a:t>(String </a:t>
             </a:r>
             <a:r>
-              <a:rPr lang="en-US" altLang="zh-TW" sz="3300" dirty="0" err="1"/>
+              <a:rPr lang="en-US" altLang="zh-TW" sz="4400" dirty="0" err="1"/>
               <a:t>vehID</a:t>
             </a:r>
             <a:r>
-              <a:rPr lang="en-US" altLang="zh-TW" sz="3300" dirty="0"/>
+              <a:rPr lang="en-US" altLang="zh-TW" sz="4400" dirty="0"/>
               <a:t>, String </a:t>
             </a:r>
             <a:r>
-              <a:rPr lang="en-US" altLang="zh-TW" sz="3300" dirty="0" err="1"/>
+              <a:rPr lang="en-US" altLang="zh-TW" sz="4400" dirty="0" err="1"/>
               <a:t>stopID</a:t>
             </a:r>
             <a:r>
-              <a:rPr lang="en-US" altLang="zh-TW" sz="3300" dirty="0"/>
+              <a:rPr lang="en-US" altLang="zh-TW" sz="4400" dirty="0"/>
               <a:t>, double duration, </a:t>
             </a:r>
             <a:r>
-              <a:rPr lang="en-US" altLang="zh-TW" sz="3300" dirty="0" err="1"/>
+              <a:rPr lang="en-US" altLang="zh-TW" sz="4400" dirty="0" err="1"/>
               <a:t>int</a:t>
             </a:r>
             <a:r>
-              <a:rPr lang="en-US" altLang="zh-TW" sz="3300" dirty="0"/>
+              <a:rPr lang="en-US" altLang="zh-TW" sz="4400" dirty="0"/>
               <a:t> until){</a:t>
             </a:r>
-            <a:endParaRPr lang="zh-TW" altLang="zh-TW" sz="3300" dirty="0"/>
-          </a:p>
-          <a:p>
-            <a:r>
-              <a:rPr lang="en-US" altLang="zh-TW" sz="3300" dirty="0"/>
+            <a:endParaRPr lang="zh-TW" altLang="zh-TW" sz="4400" dirty="0"/>
+          </a:p>
+          <a:p>
+            <a:r>
+              <a:rPr lang="en-US" altLang="zh-TW" sz="4400" dirty="0"/>
               <a:t>		</a:t>
             </a:r>
             <a:r>
-              <a:rPr lang="en-US" altLang="zh-TW" sz="3300" dirty="0" err="1"/>
+              <a:rPr lang="en-US" altLang="zh-TW" sz="4400" dirty="0" err="1"/>
               <a:t>SumoStopFlags</a:t>
             </a:r>
             <a:r>
-              <a:rPr lang="en-US" altLang="zh-TW" sz="3300" dirty="0"/>
+              <a:rPr lang="en-US" altLang="zh-TW" sz="4400" dirty="0"/>
               <a:t> sf = new </a:t>
             </a:r>
             <a:r>
-              <a:rPr lang="en-US" altLang="zh-TW" sz="3300" dirty="0" err="1"/>
+              <a:rPr lang="en-US" altLang="zh-TW" sz="4400" dirty="0" err="1"/>
               <a:t>SumoStopFlags</a:t>
             </a:r>
             <a:r>
-              <a:rPr lang="en-US" altLang="zh-TW" sz="3300" dirty="0"/>
-              <a:t>(false, false, false, false, true);</a:t>
-            </a:r>
-            <a:endParaRPr lang="zh-TW" altLang="zh-TW" sz="3300" dirty="0"/>
-          </a:p>
-          <a:p>
-            <a:r>
-              <a:rPr lang="en-US" altLang="zh-TW" sz="3300" dirty="0"/>
+              <a:rPr lang="en-US" altLang="zh-TW" sz="4400" dirty="0"/>
+              <a:t>(false, false, false, false, </a:t>
+            </a:r>
+            <a:r>
+              <a:rPr lang="en-US" altLang="zh-TW" sz="4400" b="1" dirty="0"/>
+              <a:t>true</a:t>
+            </a:r>
+            <a:r>
+              <a:rPr lang="en-US" altLang="zh-TW" sz="4400" dirty="0"/>
+              <a:t>);</a:t>
+            </a:r>
+            <a:endParaRPr lang="zh-TW" altLang="zh-TW" sz="4400" dirty="0"/>
+          </a:p>
+          <a:p>
+            <a:r>
+              <a:rPr lang="en-US" altLang="zh-TW" sz="4400" dirty="0"/>
               <a:t>		return </a:t>
             </a:r>
             <a:r>
-              <a:rPr lang="en-US" altLang="zh-TW" sz="3300" dirty="0" err="1"/>
+              <a:rPr lang="en-US" altLang="zh-TW" sz="4400" dirty="0" err="1"/>
               <a:t>setStop</a:t>
             </a:r>
             <a:r>
-              <a:rPr lang="en-US" altLang="zh-TW" sz="3300" dirty="0"/>
+              <a:rPr lang="en-US" altLang="zh-TW" sz="4400" dirty="0"/>
               <a:t>(</a:t>
             </a:r>
             <a:r>
-              <a:rPr lang="en-US" altLang="zh-TW" sz="3300" dirty="0" err="1"/>
+              <a:rPr lang="en-US" altLang="zh-TW" sz="4400" dirty="0" err="1"/>
               <a:t>vehID</a:t>
             </a:r>
             <a:r>
-              <a:rPr lang="en-US" altLang="zh-TW" sz="3300" dirty="0"/>
+              <a:rPr lang="en-US" altLang="zh-TW" sz="4400" dirty="0"/>
               <a:t>, </a:t>
             </a:r>
             <a:r>
-              <a:rPr lang="en-US" altLang="zh-TW" sz="3300" dirty="0" err="1"/>
+              <a:rPr lang="en-US" altLang="zh-TW" sz="4400" b="1" dirty="0" err="1"/>
               <a:t>stopID</a:t>
             </a:r>
             <a:r>
-              <a:rPr lang="en-US" altLang="zh-TW" sz="3300" dirty="0"/>
+              <a:rPr lang="en-US" altLang="zh-TW" sz="4400" dirty="0"/>
               <a:t>, 1, (byte) 0, duration, sf);</a:t>
             </a:r>
-            <a:endParaRPr lang="zh-TW" altLang="zh-TW" sz="3300" dirty="0"/>
-          </a:p>
-          <a:p>
-            <a:r>
-              <a:rPr lang="en-US" altLang="zh-TW" sz="3300" dirty="0"/>
+            <a:endParaRPr lang="zh-TW" altLang="zh-TW" sz="4400" dirty="0"/>
+          </a:p>
+          <a:p>
+            <a:r>
+              <a:rPr lang="en-US" altLang="zh-TW" sz="4400" dirty="0"/>
               <a:t>	}</a:t>
             </a:r>
-            <a:endParaRPr lang="zh-TW" altLang="zh-TW" sz="3300" dirty="0"/>
+            <a:endParaRPr lang="zh-TW" altLang="zh-TW" sz="4400" dirty="0"/>
           </a:p>
           <a:p>
             <a:endParaRPr lang="zh-TW" altLang="en-US" dirty="0"/>
@@ -13334,8 +13345,8 @@
         </p:nvSpPr>
         <p:spPr>
           <a:xfrm>
-            <a:off x="838200" y="4231341"/>
-            <a:ext cx="10515600" cy="1945622"/>
+            <a:off x="838200" y="3388659"/>
+            <a:ext cx="10515600" cy="2788304"/>
           </a:xfrm>
         </p:spPr>
         <p:txBody>
@@ -13344,15 +13355,35 @@
           <a:p>
             <a:r>
               <a:rPr lang="en-US" altLang="zh-TW" dirty="0"/>
-              <a:t>SUMO error for command 196: The </a:t>
-            </a:r>
-            <a:r>
-              <a:rPr lang="en-US" altLang="zh-TW" dirty="0" err="1"/>
+              <a:t>SUMO error for command 196: </a:t>
+            </a:r>
+            <a:r>
+              <a:rPr lang="en-US" altLang="zh-TW" b="1" dirty="0">
+                <a:solidFill>
+                  <a:srgbClr val="FF0000"/>
+                </a:solidFill>
+              </a:rPr>
+              <a:t>The </a:t>
+            </a:r>
+            <a:r>
+              <a:rPr lang="en-US" altLang="zh-TW" b="1" dirty="0" err="1">
+                <a:solidFill>
+                  <a:srgbClr val="FF0000"/>
+                </a:solidFill>
+              </a:rPr>
               <a:t>containerStop</a:t>
             </a:r>
             <a:r>
+              <a:rPr lang="en-US" altLang="zh-TW" b="1" dirty="0">
+                <a:solidFill>
+                  <a:srgbClr val="FF0000"/>
+                </a:solidFill>
+              </a:rPr>
+              <a:t> '-537706053#2' is not known</a:t>
+            </a:r>
+            <a:r>
               <a:rPr lang="en-US" altLang="zh-TW" dirty="0"/>
-              <a:t> '-537706053#2' is not known for vehicle '8'</a:t>
+              <a:t> for vehicle '8'</a:t>
             </a:r>
             <a:endParaRPr lang="zh-TW" altLang="en-US" dirty="0"/>
           </a:p>
@@ -13554,7 +13585,11 @@
             </a:r>
             <a:r>
               <a:rPr lang="en-US" altLang="zh-TW" dirty="0" err="1"/>
-              <a:t>Vehicle.setContainerStop</a:t>
+              <a:t>Vehicle.</a:t>
+            </a:r>
+            <a:r>
+              <a:rPr lang="en-US" altLang="zh-TW" b="1" dirty="0" err="1"/>
+              <a:t>setContainerStop</a:t>
             </a:r>
             <a:r>
               <a:rPr lang="en-US" altLang="zh-TW" dirty="0"/>
@@ -14117,11 +14152,6 @@
               </a:rPr>
               <a:t>'</a:t>
             </a:r>
-            <a:endParaRPr lang="en-US" altLang="zh-TW" dirty="0">
-              <a:solidFill>
-                <a:srgbClr val="FF0000"/>
-              </a:solidFill>
-            </a:endParaRPr>
           </a:p>
         </p:txBody>
       </p:sp>
@@ -14129,6 +14159,66 @@
     <p:extLst>
       <p:ext uri="{BB962C8B-B14F-4D97-AF65-F5344CB8AC3E}">
         <p14:creationId xmlns:p14="http://schemas.microsoft.com/office/powerpoint/2010/main" val="3721798203"/>
+      </p:ext>
+    </p:extLst>
+  </p:cSld>
+  <p:clrMapOvr>
+    <a:masterClrMapping/>
+  </p:clrMapOvr>
+</p:sld>
+</file>
+
+<file path=ppt/slides/slide49.xml><?xml version="1.0" encoding="utf-8"?>
+<p:sld xmlns:a="http://schemas.openxmlformats.org/drawingml/2006/main" xmlns:r="http://schemas.openxmlformats.org/officeDocument/2006/relationships" xmlns:p="http://schemas.openxmlformats.org/presentationml/2006/main">
+  <p:cSld>
+    <p:spTree>
+      <p:nvGrpSpPr>
+        <p:cNvPr id="1" name=""/>
+        <p:cNvGrpSpPr/>
+        <p:nvPr/>
+      </p:nvGrpSpPr>
+      <p:grpSpPr>
+        <a:xfrm>
+          <a:off x="0" y="0"/>
+          <a:ext cx="0" cy="0"/>
+          <a:chOff x="0" y="0"/>
+          <a:chExt cx="0" cy="0"/>
+        </a:xfrm>
+      </p:grpSpPr>
+      <p:pic>
+        <p:nvPicPr>
+          <p:cNvPr id="4" name="圖片 3"/>
+          <p:cNvPicPr>
+            <a:picLocks noChangeAspect="1"/>
+          </p:cNvPicPr>
+          <p:nvPr/>
+        </p:nvPicPr>
+        <p:blipFill>
+          <a:blip r:embed="rId2">
+            <a:extLst>
+              <a:ext uri="{28A0092B-C50C-407E-A947-70E740481C1C}">
+                <a14:useLocalDpi xmlns:a14="http://schemas.microsoft.com/office/drawing/2010/main" val="0"/>
+              </a:ext>
+            </a:extLst>
+          </a:blip>
+          <a:stretch>
+            <a:fillRect/>
+          </a:stretch>
+        </p:blipFill>
+        <p:spPr>
+          <a:xfrm>
+            <a:off x="1193394" y="268234"/>
+            <a:ext cx="8478433" cy="6106377"/>
+          </a:xfrm>
+          <a:prstGeom prst="rect">
+            <a:avLst/>
+          </a:prstGeom>
+        </p:spPr>
+      </p:pic>
+    </p:spTree>
+    <p:extLst>
+      <p:ext uri="{BB962C8B-B14F-4D97-AF65-F5344CB8AC3E}">
+        <p14:creationId xmlns:p14="http://schemas.microsoft.com/office/powerpoint/2010/main" val="196005692"/>
       </p:ext>
     </p:extLst>
   </p:cSld>
@@ -14481,6 +14571,66 @@
       </p:par>
     </p:tnLst>
   </p:timing>
+</p:sld>
+</file>
+
+<file path=ppt/slides/slide50.xml><?xml version="1.0" encoding="utf-8"?>
+<p:sld xmlns:a="http://schemas.openxmlformats.org/drawingml/2006/main" xmlns:r="http://schemas.openxmlformats.org/officeDocument/2006/relationships" xmlns:p="http://schemas.openxmlformats.org/presentationml/2006/main">
+  <p:cSld>
+    <p:spTree>
+      <p:nvGrpSpPr>
+        <p:cNvPr id="1" name=""/>
+        <p:cNvGrpSpPr/>
+        <p:nvPr/>
+      </p:nvGrpSpPr>
+      <p:grpSpPr>
+        <a:xfrm>
+          <a:off x="0" y="0"/>
+          <a:ext cx="0" cy="0"/>
+          <a:chOff x="0" y="0"/>
+          <a:chExt cx="0" cy="0"/>
+        </a:xfrm>
+      </p:grpSpPr>
+      <p:pic>
+        <p:nvPicPr>
+          <p:cNvPr id="2" name="圖片 1"/>
+          <p:cNvPicPr>
+            <a:picLocks noChangeAspect="1"/>
+          </p:cNvPicPr>
+          <p:nvPr/>
+        </p:nvPicPr>
+        <p:blipFill>
+          <a:blip r:embed="rId2">
+            <a:extLst>
+              <a:ext uri="{28A0092B-C50C-407E-A947-70E740481C1C}">
+                <a14:useLocalDpi xmlns:a14="http://schemas.microsoft.com/office/drawing/2010/main" val="0"/>
+              </a:ext>
+            </a:extLst>
+          </a:blip>
+          <a:stretch>
+            <a:fillRect/>
+          </a:stretch>
+        </p:blipFill>
+        <p:spPr>
+          <a:xfrm>
+            <a:off x="2200504" y="285080"/>
+            <a:ext cx="6298037" cy="6232262"/>
+          </a:xfrm>
+          <a:prstGeom prst="rect">
+            <a:avLst/>
+          </a:prstGeom>
+        </p:spPr>
+      </p:pic>
+    </p:spTree>
+    <p:extLst>
+      <p:ext uri="{BB962C8B-B14F-4D97-AF65-F5344CB8AC3E}">
+        <p14:creationId xmlns:p14="http://schemas.microsoft.com/office/powerpoint/2010/main" val="1715384422"/>
+      </p:ext>
+    </p:extLst>
+  </p:cSld>
+  <p:clrMapOvr>
+    <a:masterClrMapping/>
+  </p:clrMapOvr>
 </p:sld>
 </file>
 

</xml_diff>

<commit_message>
add person who is in walk stage
</commit_message>
<xml_diff>
--- a/eclipse workspace/java_library/sumo_implementation recording.pptx
+++ b/eclipse workspace/java_library/sumo_implementation recording.pptx
@@ -58,6 +58,8 @@
     <p:sldId id="315" r:id="rId52"/>
     <p:sldId id="316" r:id="rId53"/>
     <p:sldId id="317" r:id="rId54"/>
+    <p:sldId id="318" r:id="rId55"/>
+    <p:sldId id="319" r:id="rId56"/>
   </p:sldIdLst>
   <p:sldSz cx="12192000" cy="6858000"/>
   <p:notesSz cx="6858000" cy="9144000"/>
@@ -295,7 +297,7 @@
           <a:p>
             <a:fld id="{0D31214C-D292-456A-85AA-94C340B15432}" type="datetimeFigureOut">
               <a:rPr lang="zh-TW" altLang="en-US" smtClean="0"/>
-              <a:t>2019/5/3</a:t>
+              <a:t>2019/5/4</a:t>
             </a:fld>
             <a:endParaRPr lang="zh-TW" altLang="en-US"/>
           </a:p>
@@ -465,7 +467,7 @@
           <a:p>
             <a:fld id="{0D31214C-D292-456A-85AA-94C340B15432}" type="datetimeFigureOut">
               <a:rPr lang="zh-TW" altLang="en-US" smtClean="0"/>
-              <a:t>2019/5/3</a:t>
+              <a:t>2019/5/4</a:t>
             </a:fld>
             <a:endParaRPr lang="zh-TW" altLang="en-US"/>
           </a:p>
@@ -645,7 +647,7 @@
           <a:p>
             <a:fld id="{0D31214C-D292-456A-85AA-94C340B15432}" type="datetimeFigureOut">
               <a:rPr lang="zh-TW" altLang="en-US" smtClean="0"/>
-              <a:t>2019/5/3</a:t>
+              <a:t>2019/5/4</a:t>
             </a:fld>
             <a:endParaRPr lang="zh-TW" altLang="en-US"/>
           </a:p>
@@ -815,7 +817,7 @@
           <a:p>
             <a:fld id="{0D31214C-D292-456A-85AA-94C340B15432}" type="datetimeFigureOut">
               <a:rPr lang="zh-TW" altLang="en-US" smtClean="0"/>
-              <a:t>2019/5/3</a:t>
+              <a:t>2019/5/4</a:t>
             </a:fld>
             <a:endParaRPr lang="zh-TW" altLang="en-US"/>
           </a:p>
@@ -1061,7 +1063,7 @@
           <a:p>
             <a:fld id="{0D31214C-D292-456A-85AA-94C340B15432}" type="datetimeFigureOut">
               <a:rPr lang="zh-TW" altLang="en-US" smtClean="0"/>
-              <a:t>2019/5/3</a:t>
+              <a:t>2019/5/4</a:t>
             </a:fld>
             <a:endParaRPr lang="zh-TW" altLang="en-US"/>
           </a:p>
@@ -1293,7 +1295,7 @@
           <a:p>
             <a:fld id="{0D31214C-D292-456A-85AA-94C340B15432}" type="datetimeFigureOut">
               <a:rPr lang="zh-TW" altLang="en-US" smtClean="0"/>
-              <a:t>2019/5/3</a:t>
+              <a:t>2019/5/4</a:t>
             </a:fld>
             <a:endParaRPr lang="zh-TW" altLang="en-US"/>
           </a:p>
@@ -1660,7 +1662,7 @@
           <a:p>
             <a:fld id="{0D31214C-D292-456A-85AA-94C340B15432}" type="datetimeFigureOut">
               <a:rPr lang="zh-TW" altLang="en-US" smtClean="0"/>
-              <a:t>2019/5/3</a:t>
+              <a:t>2019/5/4</a:t>
             </a:fld>
             <a:endParaRPr lang="zh-TW" altLang="en-US"/>
           </a:p>
@@ -1778,7 +1780,7 @@
           <a:p>
             <a:fld id="{0D31214C-D292-456A-85AA-94C340B15432}" type="datetimeFigureOut">
               <a:rPr lang="zh-TW" altLang="en-US" smtClean="0"/>
-              <a:t>2019/5/3</a:t>
+              <a:t>2019/5/4</a:t>
             </a:fld>
             <a:endParaRPr lang="zh-TW" altLang="en-US"/>
           </a:p>
@@ -1873,7 +1875,7 @@
           <a:p>
             <a:fld id="{0D31214C-D292-456A-85AA-94C340B15432}" type="datetimeFigureOut">
               <a:rPr lang="zh-TW" altLang="en-US" smtClean="0"/>
-              <a:t>2019/5/3</a:t>
+              <a:t>2019/5/4</a:t>
             </a:fld>
             <a:endParaRPr lang="zh-TW" altLang="en-US"/>
           </a:p>
@@ -2150,7 +2152,7 @@
           <a:p>
             <a:fld id="{0D31214C-D292-456A-85AA-94C340B15432}" type="datetimeFigureOut">
               <a:rPr lang="zh-TW" altLang="en-US" smtClean="0"/>
-              <a:t>2019/5/3</a:t>
+              <a:t>2019/5/4</a:t>
             </a:fld>
             <a:endParaRPr lang="zh-TW" altLang="en-US"/>
           </a:p>
@@ -2403,7 +2405,7 @@
           <a:p>
             <a:fld id="{0D31214C-D292-456A-85AA-94C340B15432}" type="datetimeFigureOut">
               <a:rPr lang="zh-TW" altLang="en-US" smtClean="0"/>
-              <a:t>2019/5/3</a:t>
+              <a:t>2019/5/4</a:t>
             </a:fld>
             <a:endParaRPr lang="zh-TW" altLang="en-US"/>
           </a:p>
@@ -2616,7 +2618,7 @@
           <a:p>
             <a:fld id="{0D31214C-D292-456A-85AA-94C340B15432}" type="datetimeFigureOut">
               <a:rPr lang="zh-TW" altLang="en-US" smtClean="0"/>
-              <a:t>2019/5/3</a:t>
+              <a:t>2019/5/4</a:t>
             </a:fld>
             <a:endParaRPr lang="zh-TW" altLang="en-US"/>
           </a:p>
@@ -14997,6 +14999,192 @@
 </p:sld>
 </file>
 
+<file path=ppt/slides/slide54.xml><?xml version="1.0" encoding="utf-8"?>
+<p:sld xmlns:a="http://schemas.openxmlformats.org/drawingml/2006/main" xmlns:r="http://schemas.openxmlformats.org/officeDocument/2006/relationships" xmlns:p="http://schemas.openxmlformats.org/presentationml/2006/main">
+  <p:cSld>
+    <p:spTree>
+      <p:nvGrpSpPr>
+        <p:cNvPr id="1" name=""/>
+        <p:cNvGrpSpPr/>
+        <p:nvPr/>
+      </p:nvGrpSpPr>
+      <p:grpSpPr>
+        <a:xfrm>
+          <a:off x="0" y="0"/>
+          <a:ext cx="0" cy="0"/>
+          <a:chOff x="0" y="0"/>
+          <a:chExt cx="0" cy="0"/>
+        </a:xfrm>
+      </p:grpSpPr>
+      <p:sp>
+        <p:nvSpPr>
+          <p:cNvPr id="2" name="矩形 1"/>
+          <p:cNvSpPr/>
+          <p:nvPr/>
+        </p:nvSpPr>
+        <p:spPr>
+          <a:xfrm>
+            <a:off x="2830286" y="188464"/>
+            <a:ext cx="6096000" cy="646331"/>
+          </a:xfrm>
+          <a:prstGeom prst="rect">
+            <a:avLst/>
+          </a:prstGeom>
+          <a:solidFill>
+            <a:schemeClr val="accent6">
+              <a:lumMod val="40000"/>
+              <a:lumOff val="60000"/>
+            </a:schemeClr>
+          </a:solidFill>
+        </p:spPr>
+        <p:txBody>
+          <a:bodyPr>
+            <a:spAutoFit/>
+          </a:bodyPr>
+          <a:lstStyle/>
+          <a:p>
+            <a:r>
+              <a:rPr lang="zh-TW" altLang="en-US" dirty="0">
+                <a:solidFill>
+                  <a:srgbClr val="FF0000"/>
+                </a:solidFill>
+              </a:rPr>
+              <a:t>Error: element 'person' is not allowed for content model '(personTrip|ride|walk|stop|param)'</a:t>
+            </a:r>
+          </a:p>
+        </p:txBody>
+      </p:sp>
+      <p:pic>
+        <p:nvPicPr>
+          <p:cNvPr id="3" name="圖片 2"/>
+          <p:cNvPicPr>
+            <a:picLocks noChangeAspect="1"/>
+          </p:cNvPicPr>
+          <p:nvPr/>
+        </p:nvPicPr>
+        <p:blipFill>
+          <a:blip r:embed="rId2">
+            <a:extLst>
+              <a:ext uri="{28A0092B-C50C-407E-A947-70E740481C1C}">
+                <a14:useLocalDpi xmlns:a14="http://schemas.microsoft.com/office/drawing/2010/main" val="0"/>
+              </a:ext>
+            </a:extLst>
+          </a:blip>
+          <a:stretch>
+            <a:fillRect/>
+          </a:stretch>
+        </p:blipFill>
+        <p:spPr>
+          <a:xfrm>
+            <a:off x="370114" y="1106661"/>
+            <a:ext cx="11016343" cy="5467670"/>
+          </a:xfrm>
+          <a:prstGeom prst="rect">
+            <a:avLst/>
+          </a:prstGeom>
+        </p:spPr>
+      </p:pic>
+    </p:spTree>
+    <p:extLst>
+      <p:ext uri="{BB962C8B-B14F-4D97-AF65-F5344CB8AC3E}">
+        <p14:creationId xmlns:p14="http://schemas.microsoft.com/office/powerpoint/2010/main" val="753696516"/>
+      </p:ext>
+    </p:extLst>
+  </p:cSld>
+  <p:clrMapOvr>
+    <a:masterClrMapping/>
+  </p:clrMapOvr>
+</p:sld>
+</file>
+
+<file path=ppt/slides/slide55.xml><?xml version="1.0" encoding="utf-8"?>
+<p:sld xmlns:a="http://schemas.openxmlformats.org/drawingml/2006/main" xmlns:r="http://schemas.openxmlformats.org/officeDocument/2006/relationships" xmlns:p="http://schemas.openxmlformats.org/presentationml/2006/main">
+  <p:cSld>
+    <p:spTree>
+      <p:nvGrpSpPr>
+        <p:cNvPr id="1" name=""/>
+        <p:cNvGrpSpPr/>
+        <p:nvPr/>
+      </p:nvGrpSpPr>
+      <p:grpSpPr>
+        <a:xfrm>
+          <a:off x="0" y="0"/>
+          <a:ext cx="0" cy="0"/>
+          <a:chOff x="0" y="0"/>
+          <a:chExt cx="0" cy="0"/>
+        </a:xfrm>
+      </p:grpSpPr>
+      <p:pic>
+        <p:nvPicPr>
+          <p:cNvPr id="2" name="圖片 1"/>
+          <p:cNvPicPr>
+            <a:picLocks noChangeAspect="1"/>
+          </p:cNvPicPr>
+          <p:nvPr/>
+        </p:nvPicPr>
+        <p:blipFill rotWithShape="1">
+          <a:blip r:embed="rId2">
+            <a:extLst>
+              <a:ext uri="{28A0092B-C50C-407E-A947-70E740481C1C}">
+                <a14:useLocalDpi xmlns:a14="http://schemas.microsoft.com/office/drawing/2010/main" val="0"/>
+              </a:ext>
+            </a:extLst>
+          </a:blip>
+          <a:srcRect l="34449" r="11395"/>
+          <a:stretch/>
+        </p:blipFill>
+        <p:spPr>
+          <a:xfrm>
+            <a:off x="8196943" y="0"/>
+            <a:ext cx="4397829" cy="6076229"/>
+          </a:xfrm>
+          <a:prstGeom prst="rect">
+            <a:avLst/>
+          </a:prstGeom>
+        </p:spPr>
+      </p:pic>
+      <p:pic>
+        <p:nvPicPr>
+          <p:cNvPr id="3" name="圖片 2"/>
+          <p:cNvPicPr>
+            <a:picLocks noChangeAspect="1"/>
+          </p:cNvPicPr>
+          <p:nvPr/>
+        </p:nvPicPr>
+        <p:blipFill rotWithShape="1">
+          <a:blip r:embed="rId3">
+            <a:extLst>
+              <a:ext uri="{28A0092B-C50C-407E-A947-70E740481C1C}">
+                <a14:useLocalDpi xmlns:a14="http://schemas.microsoft.com/office/drawing/2010/main" val="0"/>
+              </a:ext>
+            </a:extLst>
+          </a:blip>
+          <a:srcRect r="17947"/>
+          <a:stretch/>
+        </p:blipFill>
+        <p:spPr>
+          <a:xfrm>
+            <a:off x="203200" y="1599559"/>
+            <a:ext cx="7821544" cy="2877109"/>
+          </a:xfrm>
+          <a:prstGeom prst="rect">
+            <a:avLst/>
+          </a:prstGeom>
+        </p:spPr>
+      </p:pic>
+    </p:spTree>
+    <p:extLst>
+      <p:ext uri="{BB962C8B-B14F-4D97-AF65-F5344CB8AC3E}">
+        <p14:creationId xmlns:p14="http://schemas.microsoft.com/office/powerpoint/2010/main" val="3878762515"/>
+      </p:ext>
+    </p:extLst>
+  </p:cSld>
+  <p:clrMapOvr>
+    <a:masterClrMapping/>
+  </p:clrMapOvr>
+</p:sld>
+</file>
+
 <file path=ppt/slides/slide6.xml><?xml version="1.0" encoding="utf-8"?>
 <p:sld xmlns:a="http://schemas.openxmlformats.org/drawingml/2006/main" xmlns:r="http://schemas.openxmlformats.org/officeDocument/2006/relationships" xmlns:p="http://schemas.openxmlformats.org/presentationml/2006/main">
   <p:cSld>

</xml_diff>